<commit_message>
More SFINAE code and META slides in pre-check version
git-svn-id: https://svn.code.sf.net/p/cpp-lects-rus/code/trunk@191 39143b06-f351-456c-9f92-4cd32fad6823
</commit_message>
<xml_diff>
--- a/slides/lec2-9-meta.pptx
+++ b/slides/lec2-9-meta.pptx
@@ -19,8 +19,27 @@
     <p:sldId id="266" r:id="rId13"/>
     <p:sldId id="267" r:id="rId14"/>
     <p:sldId id="268" r:id="rId15"/>
-    <p:sldId id="269" r:id="rId16"/>
-    <p:sldId id="271" r:id="rId17"/>
+    <p:sldId id="272" r:id="rId16"/>
+    <p:sldId id="273" r:id="rId17"/>
+    <p:sldId id="269" r:id="rId18"/>
+    <p:sldId id="284" r:id="rId19"/>
+    <p:sldId id="285" r:id="rId20"/>
+    <p:sldId id="289" r:id="rId21"/>
+    <p:sldId id="274" r:id="rId22"/>
+    <p:sldId id="279" r:id="rId23"/>
+    <p:sldId id="275" r:id="rId24"/>
+    <p:sldId id="278" r:id="rId25"/>
+    <p:sldId id="280" r:id="rId26"/>
+    <p:sldId id="281" r:id="rId27"/>
+    <p:sldId id="276" r:id="rId28"/>
+    <p:sldId id="277" r:id="rId29"/>
+    <p:sldId id="282" r:id="rId30"/>
+    <p:sldId id="283" r:id="rId31"/>
+    <p:sldId id="286" r:id="rId32"/>
+    <p:sldId id="287" r:id="rId33"/>
+    <p:sldId id="288" r:id="rId34"/>
+    <p:sldId id="290" r:id="rId35"/>
+    <p:sldId id="271" r:id="rId36"/>
   </p:sldIdLst>
   <p:sldSz cx="12192000" cy="6858000"/>
   <p:notesSz cx="6858000" cy="9144000"/>
@@ -4409,7 +4428,7 @@
           <a:p>
             <a:fld id="{48A87A34-81AB-432B-8DAE-1953F412C126}" type="datetimeFigureOut">
               <a:rPr lang="en-US" dirty="0"/>
-              <a:t>3/30/2017</a:t>
+              <a:t>4/3/2017</a:t>
             </a:fld>
             <a:endParaRPr lang="en-US" dirty="0"/>
           </a:p>
@@ -4671,7 +4690,7 @@
           <a:p>
             <a:fld id="{48A87A34-81AB-432B-8DAE-1953F412C126}" type="datetimeFigureOut">
               <a:rPr lang="en-US" dirty="0"/>
-              <a:t>3/30/2017</a:t>
+              <a:t>4/3/2017</a:t>
             </a:fld>
             <a:endParaRPr lang="en-US" dirty="0"/>
           </a:p>
@@ -4862,7 +4881,7 @@
           <a:p>
             <a:fld id="{48A87A34-81AB-432B-8DAE-1953F412C126}" type="datetimeFigureOut">
               <a:rPr lang="en-US" dirty="0"/>
-              <a:t>3/30/2017</a:t>
+              <a:t>4/3/2017</a:t>
             </a:fld>
             <a:endParaRPr lang="en-US" dirty="0"/>
           </a:p>
@@ -5120,7 +5139,7 @@
           <a:p>
             <a:fld id="{48A87A34-81AB-432B-8DAE-1953F412C126}" type="datetimeFigureOut">
               <a:rPr lang="en-US" dirty="0"/>
-              <a:t>3/30/2017</a:t>
+              <a:t>4/3/2017</a:t>
             </a:fld>
             <a:endParaRPr lang="en-US" dirty="0"/>
           </a:p>
@@ -5549,7 +5568,7 @@
           <a:p>
             <a:fld id="{48A87A34-81AB-432B-8DAE-1953F412C126}" type="datetimeFigureOut">
               <a:rPr lang="en-US" dirty="0"/>
-              <a:t>3/30/2017</a:t>
+              <a:t>4/3/2017</a:t>
             </a:fld>
             <a:endParaRPr lang="en-US" dirty="0"/>
           </a:p>
@@ -6090,7 +6109,7 @@
           <a:p>
             <a:fld id="{48A87A34-81AB-432B-8DAE-1953F412C126}" type="datetimeFigureOut">
               <a:rPr lang="en-US" dirty="0"/>
-              <a:t>3/30/2017</a:t>
+              <a:t>4/3/2017</a:t>
             </a:fld>
             <a:endParaRPr lang="en-US" dirty="0"/>
           </a:p>
@@ -6805,7 +6824,7 @@
           <a:p>
             <a:fld id="{48A87A34-81AB-432B-8DAE-1953F412C126}" type="datetimeFigureOut">
               <a:rPr lang="en-US" dirty="0"/>
-              <a:t>3/30/2017</a:t>
+              <a:t>4/3/2017</a:t>
             </a:fld>
             <a:endParaRPr lang="en-US" dirty="0"/>
           </a:p>
@@ -6970,7 +6989,7 @@
           <a:p>
             <a:fld id="{48A87A34-81AB-432B-8DAE-1953F412C126}" type="datetimeFigureOut">
               <a:rPr lang="en-US" dirty="0"/>
-              <a:t>3/30/2017</a:t>
+              <a:t>4/3/2017</a:t>
             </a:fld>
             <a:endParaRPr lang="en-US" dirty="0"/>
           </a:p>
@@ -7145,7 +7164,7 @@
           <a:p>
             <a:fld id="{48A87A34-81AB-432B-8DAE-1953F412C126}" type="datetimeFigureOut">
               <a:rPr lang="en-US" dirty="0"/>
-              <a:t>3/30/2017</a:t>
+              <a:t>4/3/2017</a:t>
             </a:fld>
             <a:endParaRPr lang="en-US" dirty="0"/>
           </a:p>
@@ -7310,7 +7329,7 @@
           <a:p>
             <a:fld id="{48A87A34-81AB-432B-8DAE-1953F412C126}" type="datetimeFigureOut">
               <a:rPr lang="en-US" dirty="0"/>
-              <a:t>3/30/2017</a:t>
+              <a:t>4/3/2017</a:t>
             </a:fld>
             <a:endParaRPr lang="en-US" dirty="0"/>
           </a:p>
@@ -7555,7 +7574,7 @@
           <a:p>
             <a:fld id="{48A87A34-81AB-432B-8DAE-1953F412C126}" type="datetimeFigureOut">
               <a:rPr lang="en-US" dirty="0"/>
-              <a:t>3/30/2017</a:t>
+              <a:t>4/3/2017</a:t>
             </a:fld>
             <a:endParaRPr lang="en-US" dirty="0"/>
           </a:p>
@@ -7782,7 +7801,7 @@
           <a:p>
             <a:fld id="{48A87A34-81AB-432B-8DAE-1953F412C126}" type="datetimeFigureOut">
               <a:rPr lang="en-US" dirty="0"/>
-              <a:t>3/30/2017</a:t>
+              <a:t>4/3/2017</a:t>
             </a:fld>
             <a:endParaRPr lang="en-US" dirty="0"/>
           </a:p>
@@ -8158,7 +8177,7 @@
           <a:p>
             <a:fld id="{48A87A34-81AB-432B-8DAE-1953F412C126}" type="datetimeFigureOut">
               <a:rPr lang="en-US" dirty="0"/>
-              <a:t>3/30/2017</a:t>
+              <a:t>4/3/2017</a:t>
             </a:fld>
             <a:endParaRPr lang="en-US" dirty="0"/>
           </a:p>
@@ -8271,7 +8290,7 @@
           <a:p>
             <a:fld id="{48A87A34-81AB-432B-8DAE-1953F412C126}" type="datetimeFigureOut">
               <a:rPr lang="en-US" dirty="0"/>
-              <a:t>3/30/2017</a:t>
+              <a:t>4/3/2017</a:t>
             </a:fld>
             <a:endParaRPr lang="en-US" dirty="0"/>
           </a:p>
@@ -8361,7 +8380,7 @@
           <a:p>
             <a:fld id="{48A87A34-81AB-432B-8DAE-1953F412C126}" type="datetimeFigureOut">
               <a:rPr lang="en-US" dirty="0"/>
-              <a:t>3/30/2017</a:t>
+              <a:t>4/3/2017</a:t>
             </a:fld>
             <a:endParaRPr lang="en-US" dirty="0"/>
           </a:p>
@@ -8605,7 +8624,7 @@
           <a:p>
             <a:fld id="{48A87A34-81AB-432B-8DAE-1953F412C126}" type="datetimeFigureOut">
               <a:rPr lang="en-US" dirty="0"/>
-              <a:t>3/30/2017</a:t>
+              <a:t>4/3/2017</a:t>
             </a:fld>
             <a:endParaRPr lang="en-US" dirty="0"/>
           </a:p>
@@ -8880,7 +8899,7 @@
           <a:p>
             <a:fld id="{48A87A34-81AB-432B-8DAE-1953F412C126}" type="datetimeFigureOut">
               <a:rPr lang="en-US" dirty="0"/>
-              <a:t>3/30/2017</a:t>
+              <a:t>4/3/2017</a:t>
             </a:fld>
             <a:endParaRPr lang="en-US" dirty="0"/>
           </a:p>
@@ -11943,7 +11962,7 @@
             <a:fld id="{48A87A34-81AB-432B-8DAE-1953F412C126}" type="datetimeFigureOut">
               <a:rPr lang="en-US" dirty="0"/>
               <a:pPr/>
-              <a:t>3/30/2017</a:t>
+              <a:t>4/3/2017</a:t>
             </a:fld>
             <a:endParaRPr lang="en-US" dirty="0"/>
           </a:p>
@@ -12583,13 +12602,7 @@
               <a:rPr lang="en-US">
                 <a:latin typeface="Consolas" panose="020B0609020204030204" pitchFamily="49" charset="0"/>
               </a:rPr>
-              <a:t>(int N, int lo = 1, int hi = </a:t>
-            </a:r>
-            <a:r>
-              <a:rPr lang="en-US">
-                <a:latin typeface="Consolas" panose="020B0609020204030204" pitchFamily="49" charset="0"/>
-              </a:rPr>
-              <a:t>N</a:t>
+              <a:t>(int N, int lo = 1, int hi = N</a:t>
             </a:r>
             <a:r>
               <a:rPr lang="en-US" smtClean="0">
@@ -12630,13 +12643,7 @@
               <a:rPr lang="en-US">
                 <a:latin typeface="Consolas" panose="020B0609020204030204" pitchFamily="49" charset="0"/>
               </a:rPr>
-              <a:t>int mid = (lo + hi + 1) / </a:t>
-            </a:r>
-            <a:r>
-              <a:rPr lang="en-US">
-                <a:latin typeface="Consolas" panose="020B0609020204030204" pitchFamily="49" charset="0"/>
-              </a:rPr>
-              <a:t>2</a:t>
+              <a:t>int mid = (lo + hi + 1) / 2</a:t>
             </a:r>
             <a:r>
               <a:rPr lang="en-US" smtClean="0">
@@ -12665,31 +12672,19 @@
               <a:rPr lang="en-US">
                 <a:latin typeface="Consolas" panose="020B0609020204030204" pitchFamily="49" charset="0"/>
               </a:rPr>
-              <a:t>if (lo == </a:t>
+              <a:t>if (lo == hi</a:t>
+            </a:r>
+            <a:r>
+              <a:rPr lang="en-US" smtClean="0">
+                <a:latin typeface="Consolas" panose="020B0609020204030204" pitchFamily="49" charset="0"/>
+              </a:rPr>
+              <a:t>) </a:t>
             </a:r>
             <a:r>
               <a:rPr lang="en-US">
                 <a:latin typeface="Consolas" panose="020B0609020204030204" pitchFamily="49" charset="0"/>
               </a:rPr>
-              <a:t>hi</a:t>
-            </a:r>
-            <a:r>
-              <a:rPr lang="en-US" smtClean="0">
-                <a:latin typeface="Consolas" panose="020B0609020204030204" pitchFamily="49" charset="0"/>
-              </a:rPr>
-              <a:t>) </a:t>
-            </a:r>
-            <a:r>
-              <a:rPr lang="en-US">
-                <a:latin typeface="Consolas" panose="020B0609020204030204" pitchFamily="49" charset="0"/>
-              </a:rPr>
-              <a:t>return </a:t>
-            </a:r>
-            <a:r>
-              <a:rPr lang="en-US">
-                <a:latin typeface="Consolas" panose="020B0609020204030204" pitchFamily="49" charset="0"/>
-              </a:rPr>
-              <a:t>lo</a:t>
+              <a:t>return lo</a:t>
             </a:r>
             <a:r>
               <a:rPr lang="en-US" smtClean="0">
@@ -12735,31 +12730,19 @@
               <a:rPr lang="en-US">
                 <a:latin typeface="Consolas" panose="020B0609020204030204" pitchFamily="49" charset="0"/>
               </a:rPr>
-              <a:t>if (N &lt; mid * </a:t>
+              <a:t>if (N &lt; mid * mid</a:t>
+            </a:r>
+            <a:r>
+              <a:rPr lang="en-US" smtClean="0">
+                <a:latin typeface="Consolas" panose="020B0609020204030204" pitchFamily="49" charset="0"/>
+              </a:rPr>
+              <a:t>) </a:t>
             </a:r>
             <a:r>
               <a:rPr lang="en-US">
                 <a:latin typeface="Consolas" panose="020B0609020204030204" pitchFamily="49" charset="0"/>
               </a:rPr>
-              <a:t>mid</a:t>
-            </a:r>
-            <a:r>
-              <a:rPr lang="en-US" smtClean="0">
-                <a:latin typeface="Consolas" panose="020B0609020204030204" pitchFamily="49" charset="0"/>
-              </a:rPr>
-              <a:t>) </a:t>
-            </a:r>
-            <a:r>
-              <a:rPr lang="en-US">
-                <a:latin typeface="Consolas" panose="020B0609020204030204" pitchFamily="49" charset="0"/>
-              </a:rPr>
-              <a:t>return isqrt (N, lo, mid - </a:t>
-            </a:r>
-            <a:r>
-              <a:rPr lang="en-US">
-                <a:latin typeface="Consolas" panose="020B0609020204030204" pitchFamily="49" charset="0"/>
-              </a:rPr>
-              <a:t>1</a:t>
+              <a:t>return isqrt (N, lo, mid - 1</a:t>
             </a:r>
             <a:r>
               <a:rPr lang="en-US" smtClean="0">
@@ -12788,13 +12771,7 @@
               <a:rPr lang="en-US">
                 <a:latin typeface="Consolas" panose="020B0609020204030204" pitchFamily="49" charset="0"/>
               </a:rPr>
-              <a:t>return isqrt (N, mid, </a:t>
-            </a:r>
-            <a:r>
-              <a:rPr lang="en-US">
-                <a:latin typeface="Consolas" panose="020B0609020204030204" pitchFamily="49" charset="0"/>
-              </a:rPr>
-              <a:t>hi</a:t>
+              <a:t>return isqrt (N, mid, hi</a:t>
             </a:r>
             <a:r>
               <a:rPr lang="en-US" smtClean="0">
@@ -12926,13 +12903,7 @@
               <a:rPr lang="en-US">
                 <a:latin typeface="Consolas" panose="020B0609020204030204" pitchFamily="49" charset="0"/>
               </a:rPr>
-              <a:t>template&lt;bool C, typename Ta, typename Tb</a:t>
-            </a:r>
-            <a:r>
-              <a:rPr lang="en-US">
-                <a:latin typeface="Consolas" panose="020B0609020204030204" pitchFamily="49" charset="0"/>
-              </a:rPr>
-              <a:t>&gt; </a:t>
+              <a:t>template&lt;bool C, typename Ta, typename Tb&gt; </a:t>
             </a:r>
             <a:r>
               <a:rPr lang="en-US" smtClean="0">
@@ -12978,13 +12949,7 @@
               <a:rPr lang="en-US">
                 <a:latin typeface="Consolas" panose="020B0609020204030204" pitchFamily="49" charset="0"/>
               </a:rPr>
-              <a:t>Ta, typename Tb</a:t>
-            </a:r>
-            <a:r>
-              <a:rPr lang="en-US">
-                <a:latin typeface="Consolas" panose="020B0609020204030204" pitchFamily="49" charset="0"/>
-              </a:rPr>
-              <a:t>&gt; </a:t>
+              <a:t>Ta, typename Tb&gt; </a:t>
             </a:r>
             <a:r>
               <a:rPr lang="en-US" smtClean="0">
@@ -13007,13 +12972,7 @@
               <a:rPr lang="en-US">
                 <a:latin typeface="Consolas" panose="020B0609020204030204" pitchFamily="49" charset="0"/>
               </a:rPr>
-              <a:t>IfThenElse&lt;true, Ta, Tb</a:t>
-            </a:r>
-            <a:r>
-              <a:rPr lang="en-US">
-                <a:latin typeface="Consolas" panose="020B0609020204030204" pitchFamily="49" charset="0"/>
-              </a:rPr>
-              <a:t>&gt; </a:t>
+              <a:t>IfThenElse&lt;true, Ta, Tb&gt; </a:t>
             </a:r>
             <a:r>
               <a:rPr lang="en-US" smtClean="0">
@@ -13036,13 +12995,7 @@
               <a:rPr lang="en-US">
                 <a:latin typeface="Consolas" panose="020B0609020204030204" pitchFamily="49" charset="0"/>
               </a:rPr>
-              <a:t>typedef Ta ResultT</a:t>
-            </a:r>
-            <a:r>
-              <a:rPr lang="en-US">
-                <a:latin typeface="Consolas" panose="020B0609020204030204" pitchFamily="49" charset="0"/>
-              </a:rPr>
-              <a:t>; </a:t>
+              <a:t>typedef Ta ResultT; </a:t>
             </a:r>
             <a:r>
               <a:rPr lang="en-US" smtClean="0">
@@ -13070,13 +13023,7 @@
               <a:rPr lang="en-US">
                 <a:latin typeface="Consolas" panose="020B0609020204030204" pitchFamily="49" charset="0"/>
               </a:rPr>
-              <a:t>template&lt;typename Ta, typename Tb</a:t>
-            </a:r>
-            <a:r>
-              <a:rPr lang="en-US">
-                <a:latin typeface="Consolas" panose="020B0609020204030204" pitchFamily="49" charset="0"/>
-              </a:rPr>
-              <a:t>&gt; </a:t>
+              <a:t>template&lt;typename Ta, typename Tb&gt; </a:t>
             </a:r>
             <a:r>
               <a:rPr lang="en-US" smtClean="0">
@@ -13099,13 +13046,7 @@
               <a:rPr lang="en-US">
                 <a:latin typeface="Consolas" panose="020B0609020204030204" pitchFamily="49" charset="0"/>
               </a:rPr>
-              <a:t>IfThenElse&lt;false, Ta, Tb&gt; </a:t>
-            </a:r>
-            <a:r>
-              <a:rPr lang="en-US">
-                <a:latin typeface="Consolas" panose="020B0609020204030204" pitchFamily="49" charset="0"/>
-              </a:rPr>
-              <a:t>{ </a:t>
+              <a:t>IfThenElse&lt;false, Ta, Tb&gt; { </a:t>
             </a:r>
             <a:r>
               <a:rPr lang="en-US" smtClean="0">
@@ -13204,13 +13145,7 @@
               <a:rPr lang="en-US" sz="2000">
                 <a:latin typeface="Consolas" panose="020B0609020204030204" pitchFamily="49" charset="0"/>
               </a:rPr>
-              <a:t>template &lt;int N, int LO = 1, int HI = N&gt; </a:t>
-            </a:r>
-            <a:r>
-              <a:rPr lang="en-US" sz="2000">
-                <a:latin typeface="Consolas" panose="020B0609020204030204" pitchFamily="49" charset="0"/>
-              </a:rPr>
-              <a:t>struct </a:t>
+              <a:t>template &lt;int N, int LO = 1, int HI = N&gt; struct </a:t>
             </a:r>
             <a:r>
               <a:rPr lang="en-US" sz="2000" smtClean="0">
@@ -13257,31 +13192,19 @@
               <a:rPr lang="en-US" sz="2000">
                 <a:latin typeface="Consolas" panose="020B0609020204030204" pitchFamily="49" charset="0"/>
               </a:rPr>
-              <a:t>{ mid = </a:t>
+              <a:t>{ mid = (</a:t>
+            </a:r>
+            <a:r>
+              <a:rPr lang="en-US" sz="2000" smtClean="0">
+                <a:latin typeface="Consolas" panose="020B0609020204030204" pitchFamily="49" charset="0"/>
+              </a:rPr>
+              <a:t>LO + HI + 1) / 2 </a:t>
             </a:r>
             <a:r>
               <a:rPr lang="en-US" sz="2000">
                 <a:latin typeface="Consolas" panose="020B0609020204030204" pitchFamily="49" charset="0"/>
               </a:rPr>
-              <a:t>(</a:t>
-            </a:r>
-            <a:r>
-              <a:rPr lang="en-US" sz="2000" smtClean="0">
-                <a:latin typeface="Consolas" panose="020B0609020204030204" pitchFamily="49" charset="0"/>
-              </a:rPr>
-              <a:t>LO + HI + 1) / 2 </a:t>
-            </a:r>
-            <a:r>
-              <a:rPr lang="en-US" sz="2000">
-                <a:latin typeface="Consolas" panose="020B0609020204030204" pitchFamily="49" charset="0"/>
-              </a:rPr>
               <a:t>};</a:t>
-            </a:r>
-            <a:r>
-              <a:rPr lang="en-US" sz="2000">
-                <a:latin typeface="Consolas" panose="020B0609020204030204" pitchFamily="49" charset="0"/>
-              </a:rPr>
-              <a:t/>
             </a:r>
             <a:br>
               <a:rPr lang="en-US" sz="2000">
@@ -13301,16 +13224,7 @@
                 </a:solidFill>
                 <a:latin typeface="Consolas" panose="020B0609020204030204" pitchFamily="49" charset="0"/>
               </a:rPr>
-              <a:t>typename IfThenElse</a:t>
-            </a:r>
-            <a:r>
-              <a:rPr lang="en-US" sz="2000">
-                <a:solidFill>
-                  <a:srgbClr val="FFFF00"/>
-                </a:solidFill>
-                <a:latin typeface="Consolas" panose="020B0609020204030204" pitchFamily="49" charset="0"/>
-              </a:rPr>
-              <a:t>&lt;(</a:t>
+              <a:t>typename IfThenElse&lt;(</a:t>
             </a:r>
             <a:r>
               <a:rPr lang="en-US" sz="2000" smtClean="0">
@@ -13398,40 +13312,25 @@
                 </a:solidFill>
                 <a:latin typeface="Consolas" panose="020B0609020204030204" pitchFamily="49" charset="0"/>
               </a:rPr>
-              <a:t>&gt; &gt;::</a:t>
+              <a:t>&gt; &gt;::ResultT</a:t>
             </a:r>
             <a:r>
               <a:rPr lang="en-US" sz="2000">
-                <a:solidFill>
-                  <a:srgbClr val="FFFF00"/>
-                </a:solidFill>
-                <a:latin typeface="Consolas" panose="020B0609020204030204" pitchFamily="49" charset="0"/>
-              </a:rPr>
-              <a:t>ResultT</a:t>
+                <a:latin typeface="Consolas" panose="020B0609020204030204" pitchFamily="49" charset="0"/>
+              </a:rPr>
+              <a:t> </a:t>
+            </a:r>
+            <a:r>
+              <a:rPr lang="en-US" sz="2000" smtClean="0">
+                <a:latin typeface="Consolas" panose="020B0609020204030204" pitchFamily="49" charset="0"/>
+              </a:rPr>
+              <a:t>SubT</a:t>
             </a:r>
             <a:r>
               <a:rPr lang="en-US" sz="2000">
                 <a:latin typeface="Consolas" panose="020B0609020204030204" pitchFamily="49" charset="0"/>
               </a:rPr>
-              <a:t> </a:t>
-            </a:r>
-            <a:r>
-              <a:rPr lang="en-US" sz="2000" smtClean="0">
-                <a:latin typeface="Consolas" panose="020B0609020204030204" pitchFamily="49" charset="0"/>
-              </a:rPr>
-              <a:t>SubT</a:t>
-            </a:r>
-            <a:r>
-              <a:rPr lang="en-US" sz="2000">
-                <a:latin typeface="Consolas" panose="020B0609020204030204" pitchFamily="49" charset="0"/>
-              </a:rPr>
               <a:t>;</a:t>
-            </a:r>
-            <a:r>
-              <a:rPr lang="en-US" sz="2000">
-                <a:latin typeface="Consolas" panose="020B0609020204030204" pitchFamily="49" charset="0"/>
-              </a:rPr>
-              <a:t/>
             </a:r>
             <a:br>
               <a:rPr lang="en-US" sz="2000">
@@ -13450,12 +13349,6 @@
               </a:rPr>
               <a:t>{ result = SubT::result };</a:t>
             </a:r>
-            <a:r>
-              <a:rPr lang="en-US" sz="2000">
-                <a:latin typeface="Consolas" panose="020B0609020204030204" pitchFamily="49" charset="0"/>
-              </a:rPr>
-              <a:t/>
-            </a:r>
             <a:br>
               <a:rPr lang="en-US" sz="2000">
                 <a:latin typeface="Consolas" panose="020B0609020204030204" pitchFamily="49" charset="0"/>
@@ -13482,19 +13375,7 @@
               <a:rPr lang="en-US" sz="2000">
                 <a:latin typeface="Consolas" panose="020B0609020204030204" pitchFamily="49" charset="0"/>
               </a:rPr>
-              <a:t>&lt;int N, int S&gt; struct Sqrt &lt;N, S, </a:t>
-            </a:r>
-            <a:r>
-              <a:rPr lang="en-US" sz="2000">
-                <a:latin typeface="Consolas" panose="020B0609020204030204" pitchFamily="49" charset="0"/>
-              </a:rPr>
-              <a:t>S</a:t>
-            </a:r>
-            <a:r>
-              <a:rPr lang="en-US" sz="2000">
-                <a:latin typeface="Consolas" panose="020B0609020204030204" pitchFamily="49" charset="0"/>
-              </a:rPr>
-              <a:t>&gt; {</a:t>
+              <a:t>&lt;int N, int S&gt; struct Sqrt &lt;N, S, S&gt; {</a:t>
             </a:r>
             <a:br>
               <a:rPr lang="en-US" sz="2000">
@@ -13663,7 +13544,7 @@
           <a:p>
             <a:r>
               <a:rPr lang="ru-RU" smtClean="0"/>
-              <a:t>обсуждение</a:t>
+              <a:t>интегральные константы</a:t>
             </a:r>
             <a:endParaRPr lang="en-US"/>
           </a:p>
@@ -13684,38 +13565,89 @@
           <a:bodyPr/>
           <a:lstStyle/>
           <a:p>
-            <a:r>
-              <a:rPr lang="ru-RU" smtClean="0"/>
-              <a:t>"Арифметические" метапрограммы хороши, чтобы попрактиковаться, но это забивание гвоздей микроскопом.</a:t>
-            </a:r>
-          </a:p>
-          <a:p>
-            <a:r>
-              <a:rPr lang="ru-RU" smtClean="0"/>
-              <a:t>Уже в ближайших лекциях </a:t>
-            </a:r>
-            <a:r>
-              <a:rPr lang="en-US" smtClean="0"/>
-              <a:t>constexpr </a:t>
-            </a:r>
-            <a:r>
-              <a:rPr lang="ru-RU" smtClean="0"/>
-              <a:t>выражения будут делать то же, но лучше</a:t>
-            </a:r>
-          </a:p>
-          <a:p>
-            <a:r>
-              <a:rPr lang="ru-RU" smtClean="0"/>
-              <a:t>Настоящее метапрограммирование это программирование на типах</a:t>
-            </a:r>
-            <a:endParaRPr lang="en-US"/>
+            <a:pPr marL="0" indent="0">
+              <a:buNone/>
+            </a:pPr>
+            <a:r>
+              <a:rPr lang="en-US">
+                <a:latin typeface="Consolas" panose="020B0609020204030204" pitchFamily="49" charset="0"/>
+              </a:rPr>
+              <a:t>template &lt;typename T, T v</a:t>
+            </a:r>
+            <a:r>
+              <a:rPr lang="en-US" smtClean="0">
+                <a:latin typeface="Consolas" panose="020B0609020204030204" pitchFamily="49" charset="0"/>
+              </a:rPr>
+              <a:t>&gt;</a:t>
+            </a:r>
+            <a:r>
+              <a:rPr lang="ru-RU" smtClean="0">
+                <a:latin typeface="Consolas" panose="020B0609020204030204" pitchFamily="49" charset="0"/>
+              </a:rPr>
+              <a:t/>
+            </a:r>
+            <a:br>
+              <a:rPr lang="ru-RU" smtClean="0">
+                <a:latin typeface="Consolas" panose="020B0609020204030204" pitchFamily="49" charset="0"/>
+              </a:rPr>
+            </a:br>
+            <a:r>
+              <a:rPr lang="en-US" smtClean="0">
+                <a:latin typeface="Consolas" panose="020B0609020204030204" pitchFamily="49" charset="0"/>
+              </a:rPr>
+              <a:t>struct integral_constant</a:t>
+            </a:r>
+            <a:br>
+              <a:rPr lang="en-US" smtClean="0">
+                <a:latin typeface="Consolas" panose="020B0609020204030204" pitchFamily="49" charset="0"/>
+              </a:rPr>
+            </a:br>
+            <a:r>
+              <a:rPr lang="en-US" smtClean="0">
+                <a:latin typeface="Consolas" panose="020B0609020204030204" pitchFamily="49" charset="0"/>
+              </a:rPr>
+              <a:t>{</a:t>
+            </a:r>
+            <a:br>
+              <a:rPr lang="en-US" smtClean="0">
+                <a:latin typeface="Consolas" panose="020B0609020204030204" pitchFamily="49" charset="0"/>
+              </a:rPr>
+            </a:br>
+            <a:r>
+              <a:rPr lang="en-US" smtClean="0">
+                <a:latin typeface="Consolas" panose="020B0609020204030204" pitchFamily="49" charset="0"/>
+              </a:rPr>
+              <a:t>  using type = T;</a:t>
+            </a:r>
+            <a:br>
+              <a:rPr lang="en-US" smtClean="0">
+                <a:latin typeface="Consolas" panose="020B0609020204030204" pitchFamily="49" charset="0"/>
+              </a:rPr>
+            </a:br>
+            <a:r>
+              <a:rPr lang="en-US" smtClean="0">
+                <a:latin typeface="Consolas" panose="020B0609020204030204" pitchFamily="49" charset="0"/>
+              </a:rPr>
+              <a:t>  T value = v;</a:t>
+            </a:r>
+            <a:br>
+              <a:rPr lang="en-US" smtClean="0">
+                <a:latin typeface="Consolas" panose="020B0609020204030204" pitchFamily="49" charset="0"/>
+              </a:rPr>
+            </a:br>
+            <a:r>
+              <a:rPr lang="en-US" smtClean="0">
+                <a:latin typeface="Consolas" panose="020B0609020204030204" pitchFamily="49" charset="0"/>
+              </a:rPr>
+              <a:t>};</a:t>
+            </a:r>
           </a:p>
         </p:txBody>
       </p:sp>
     </p:spTree>
     <p:extLst>
       <p:ext uri="{BB962C8B-B14F-4D97-AF65-F5344CB8AC3E}">
-        <p14:creationId xmlns:p14="http://schemas.microsoft.com/office/powerpoint/2010/main" val="282845692"/>
+        <p14:creationId xmlns:p14="http://schemas.microsoft.com/office/powerpoint/2010/main" val="1272741506"/>
       </p:ext>
     </p:extLst>
   </p:cSld>
@@ -13758,16 +13690,16 @@
           <a:lstStyle/>
           <a:p>
             <a:r>
-              <a:rPr lang="ru-RU" dirty="0" smtClean="0"/>
-              <a:t>литература</a:t>
-            </a:r>
-            <a:endParaRPr lang="en-US" dirty="0"/>
+              <a:rPr lang="ru-RU" smtClean="0"/>
+              <a:t>Ещё одни числа Фибоначчи</a:t>
+            </a:r>
+            <a:endParaRPr lang="en-US"/>
           </a:p>
         </p:txBody>
       </p:sp>
       <p:sp>
         <p:nvSpPr>
-          <p:cNvPr id="6" name="Content Placeholder 5"/>
+          <p:cNvPr id="3" name="Content Placeholder 2"/>
           <p:cNvSpPr>
             <a:spLocks noGrp="1"/>
           </p:cNvSpPr>
@@ -13775,127 +13707,687 @@
             <p:ph idx="1"/>
           </p:nvPr>
         </p:nvSpPr>
-        <p:spPr>
-          <a:xfrm>
-            <a:off x="1141412" y="1956816"/>
-            <a:ext cx="9905999" cy="4663439"/>
-          </a:xfrm>
-        </p:spPr>
+        <p:spPr/>
         <p:txBody>
           <a:bodyPr>
-            <a:normAutofit lnSpcReduction="10000"/>
+            <a:normAutofit/>
           </a:bodyPr>
           <a:lstStyle/>
           <a:p>
-            <a:pPr lvl="0"/>
-            <a:r>
-              <a:rPr lang="en-US" sz="2000" dirty="0"/>
-              <a:t>ISO/IEC, "Information technology -- Programming languages – C++", ISO/IEC 14882:2014, 2014</a:t>
-            </a:r>
-          </a:p>
-          <a:p>
-            <a:pPr lvl="0"/>
-            <a:r>
-              <a:rPr lang="en-US" sz="2000" dirty="0"/>
-              <a:t>The C++ Programming Language (4th Edition)</a:t>
-            </a:r>
-          </a:p>
-          <a:p>
-            <a:r>
-              <a:rPr lang="en-US" sz="2000" dirty="0" err="1"/>
-              <a:t>Davide</a:t>
-            </a:r>
-            <a:r>
-              <a:rPr lang="en-US" sz="2000" dirty="0"/>
-              <a:t> </a:t>
-            </a:r>
-            <a:r>
-              <a:rPr lang="en-US" sz="2000" dirty="0" err="1"/>
-              <a:t>Vandevoorde</a:t>
-            </a:r>
-            <a:r>
-              <a:rPr lang="en-US" sz="2000" dirty="0"/>
-              <a:t>, Nicolai M. </a:t>
-            </a:r>
-            <a:r>
-              <a:rPr lang="en-US" sz="2000" dirty="0" err="1"/>
-              <a:t>Josuttis</a:t>
-            </a:r>
-            <a:r>
-              <a:rPr lang="en-US" sz="2000" dirty="0"/>
-              <a:t>, </a:t>
-            </a:r>
-            <a:r>
-              <a:rPr lang="en-US" sz="2000" dirty="0" smtClean="0"/>
-              <a:t>C</a:t>
-            </a:r>
-            <a:r>
-              <a:rPr lang="en-US" sz="2000" dirty="0"/>
-              <a:t>++ Templates. The Complete </a:t>
-            </a:r>
-            <a:r>
-              <a:rPr lang="en-US" sz="2000" dirty="0" smtClean="0"/>
-              <a:t>Guid</a:t>
-            </a:r>
-            <a:r>
-              <a:rPr lang="en-US" sz="2000" dirty="0"/>
-              <a:t>e</a:t>
-            </a:r>
-            <a:r>
-              <a:rPr lang="en-US" sz="2000" dirty="0" smtClean="0"/>
-              <a:t>, </a:t>
-            </a:r>
-            <a:r>
-              <a:rPr lang="en-US" sz="2000" dirty="0"/>
-              <a:t>Pearson Education</a:t>
-            </a:r>
-            <a:r>
-              <a:rPr lang="en-US" sz="2000"/>
-              <a:t>, </a:t>
-            </a:r>
-            <a:r>
-              <a:rPr lang="en-US" sz="2000" smtClean="0"/>
-              <a:t>2003</a:t>
-            </a:r>
-            <a:endParaRPr lang="ru-RU" sz="2000" smtClean="0"/>
-          </a:p>
-          <a:p>
-            <a:r>
-              <a:rPr lang="en-US" sz="2000"/>
-              <a:t>Andrei </a:t>
-            </a:r>
-            <a:r>
-              <a:rPr lang="en-US" sz="2000"/>
-              <a:t>Alexandrescu</a:t>
-            </a:r>
-            <a:r>
-              <a:rPr lang="en-US" sz="2000" smtClean="0"/>
+            <a:pPr marL="0" indent="0">
+              <a:buNone/>
+            </a:pPr>
+            <a:r>
+              <a:rPr lang="en-US" sz="2000">
+                <a:latin typeface="Consolas" panose="020B0609020204030204" pitchFamily="49" charset="0"/>
+              </a:rPr>
+              <a:t>template&lt;size_t </a:t>
+            </a:r>
+            <a:r>
+              <a:rPr lang="en-US" sz="2000" smtClean="0">
+                <a:latin typeface="Consolas" panose="020B0609020204030204" pitchFamily="49" charset="0"/>
+              </a:rPr>
+              <a:t>N&gt;</a:t>
+            </a:r>
+            <a:br>
+              <a:rPr lang="en-US" sz="2000" smtClean="0">
+                <a:latin typeface="Consolas" panose="020B0609020204030204" pitchFamily="49" charset="0"/>
+              </a:rPr>
+            </a:br>
+            <a:r>
+              <a:rPr lang="en-US" sz="2000" smtClean="0">
+                <a:latin typeface="Consolas" panose="020B0609020204030204" pitchFamily="49" charset="0"/>
+              </a:rPr>
+              <a:t>struct </a:t>
+            </a:r>
+            <a:r>
+              <a:rPr lang="en-US" sz="2000">
+                <a:latin typeface="Consolas" panose="020B0609020204030204" pitchFamily="49" charset="0"/>
+              </a:rPr>
+              <a:t>fibonacci </a:t>
+            </a:r>
+            <a:r>
+              <a:rPr lang="en-US" sz="2000" smtClean="0">
+                <a:latin typeface="Consolas" panose="020B0609020204030204" pitchFamily="49" charset="0"/>
+              </a:rPr>
+              <a:t>:</a:t>
+            </a:r>
+            <a:r>
+              <a:rPr lang="ru-RU" sz="2000" smtClean="0">
+                <a:latin typeface="Consolas" panose="020B0609020204030204" pitchFamily="49" charset="0"/>
+              </a:rPr>
+              <a:t/>
+            </a:r>
+            <a:br>
+              <a:rPr lang="ru-RU" sz="2000" smtClean="0">
+                <a:latin typeface="Consolas" panose="020B0609020204030204" pitchFamily="49" charset="0"/>
+              </a:rPr>
+            </a:br>
+            <a:r>
+              <a:rPr lang="en-US" sz="2000" smtClean="0">
+                <a:latin typeface="Consolas" panose="020B0609020204030204" pitchFamily="49" charset="0"/>
+              </a:rPr>
+              <a:t>     </a:t>
+            </a:r>
+            <a:r>
+              <a:rPr lang="en-US" sz="2000">
+                <a:latin typeface="Consolas" panose="020B0609020204030204" pitchFamily="49" charset="0"/>
+              </a:rPr>
+              <a:t>integral_constant&lt; size_t</a:t>
+            </a:r>
+            <a:r>
+              <a:rPr lang="en-US" sz="2000" smtClean="0">
+                <a:latin typeface="Consolas" panose="020B0609020204030204" pitchFamily="49" charset="0"/>
+              </a:rPr>
               <a:t>,</a:t>
             </a:r>
             <a:r>
-              <a:rPr lang="ru-RU" sz="2000" smtClean="0"/>
-              <a:t> </a:t>
-            </a:r>
-            <a:r>
-              <a:rPr lang="en-US" sz="2000"/>
-              <a:t>Modern C++ Design. Generic programming and design </a:t>
-            </a:r>
-            <a:r>
-              <a:rPr lang="en-US" sz="2000"/>
-              <a:t>patterns </a:t>
-            </a:r>
-            <a:r>
-              <a:rPr lang="en-US" sz="2000" smtClean="0"/>
-              <a:t>applied, 2001</a:t>
-            </a:r>
-            <a:endParaRPr lang="en-US" sz="2000" smtClean="0"/>
+              <a:rPr lang="ru-RU" sz="2000" smtClean="0">
+                <a:latin typeface="Consolas" panose="020B0609020204030204" pitchFamily="49" charset="0"/>
+              </a:rPr>
+              <a:t/>
+            </a:r>
+            <a:br>
+              <a:rPr lang="ru-RU" sz="2000" smtClean="0">
+                <a:latin typeface="Consolas" panose="020B0609020204030204" pitchFamily="49" charset="0"/>
+              </a:rPr>
+            </a:br>
+            <a:r>
+              <a:rPr lang="en-US" sz="2000" smtClean="0">
+                <a:latin typeface="Consolas" panose="020B0609020204030204" pitchFamily="49" charset="0"/>
+              </a:rPr>
+              <a:t>                        </a:t>
+            </a:r>
+            <a:r>
+              <a:rPr lang="en-US" sz="2000">
+                <a:latin typeface="Consolas" panose="020B0609020204030204" pitchFamily="49" charset="0"/>
+              </a:rPr>
+              <a:t>fibonacci&lt;N-1&gt;{} </a:t>
+            </a:r>
+            <a:r>
+              <a:rPr lang="en-US" sz="2000" smtClean="0">
+                <a:latin typeface="Consolas" panose="020B0609020204030204" pitchFamily="49" charset="0"/>
+              </a:rPr>
+              <a:t>+</a:t>
+            </a:r>
+            <a:r>
+              <a:rPr lang="ru-RU" sz="2000" smtClean="0">
+                <a:latin typeface="Consolas" panose="020B0609020204030204" pitchFamily="49" charset="0"/>
+              </a:rPr>
+              <a:t/>
+            </a:r>
+            <a:br>
+              <a:rPr lang="ru-RU" sz="2000" smtClean="0">
+                <a:latin typeface="Consolas" panose="020B0609020204030204" pitchFamily="49" charset="0"/>
+              </a:rPr>
+            </a:br>
+            <a:r>
+              <a:rPr lang="en-US" sz="2000" smtClean="0">
+                <a:latin typeface="Consolas" panose="020B0609020204030204" pitchFamily="49" charset="0"/>
+              </a:rPr>
+              <a:t>                        </a:t>
+            </a:r>
+            <a:r>
+              <a:rPr lang="en-US" sz="2000">
+                <a:latin typeface="Consolas" panose="020B0609020204030204" pitchFamily="49" charset="0"/>
+              </a:rPr>
+              <a:t>fibonacci&lt;N-2&gt;{}&gt; </a:t>
+            </a:r>
+            <a:r>
+              <a:rPr lang="en-US" sz="2000" smtClean="0">
+                <a:latin typeface="Consolas" panose="020B0609020204030204" pitchFamily="49" charset="0"/>
+              </a:rPr>
+              <a:t>{};</a:t>
+            </a:r>
+            <a:r>
+              <a:rPr lang="ru-RU" sz="2000" smtClean="0">
+                <a:latin typeface="Consolas" panose="020B0609020204030204" pitchFamily="49" charset="0"/>
+              </a:rPr>
+              <a:t/>
+            </a:r>
+            <a:br>
+              <a:rPr lang="ru-RU" sz="2000" smtClean="0">
+                <a:latin typeface="Consolas" panose="020B0609020204030204" pitchFamily="49" charset="0"/>
+              </a:rPr>
+            </a:br>
+            <a:r>
+              <a:rPr lang="en-US" sz="2000" smtClean="0">
+                <a:latin typeface="Consolas" panose="020B0609020204030204" pitchFamily="49" charset="0"/>
+              </a:rPr>
+              <a:t>template</a:t>
+            </a:r>
+            <a:r>
+              <a:rPr lang="en-US" sz="2000">
+                <a:latin typeface="Consolas" panose="020B0609020204030204" pitchFamily="49" charset="0"/>
+              </a:rPr>
+              <a:t>&lt;&gt; struct fibonacci&lt;1&gt; </a:t>
+            </a:r>
+            <a:r>
+              <a:rPr lang="en-US" sz="2000" smtClean="0">
+                <a:latin typeface="Consolas" panose="020B0609020204030204" pitchFamily="49" charset="0"/>
+              </a:rPr>
+              <a:t>: </a:t>
+            </a:r>
+            <a:r>
+              <a:rPr lang="en-US" sz="2000">
+                <a:latin typeface="Consolas" panose="020B0609020204030204" pitchFamily="49" charset="0"/>
+              </a:rPr>
+              <a:t>integral_constant&lt;size_t,1&gt; </a:t>
+            </a:r>
+            <a:r>
+              <a:rPr lang="en-US" sz="2000" smtClean="0">
+                <a:latin typeface="Consolas" panose="020B0609020204030204" pitchFamily="49" charset="0"/>
+              </a:rPr>
+              <a:t>{};</a:t>
+            </a:r>
+            <a:r>
+              <a:rPr lang="ru-RU" sz="2000" smtClean="0">
+                <a:latin typeface="Consolas" panose="020B0609020204030204" pitchFamily="49" charset="0"/>
+              </a:rPr>
+              <a:t/>
+            </a:r>
+            <a:br>
+              <a:rPr lang="ru-RU" sz="2000" smtClean="0">
+                <a:latin typeface="Consolas" panose="020B0609020204030204" pitchFamily="49" charset="0"/>
+              </a:rPr>
+            </a:br>
+            <a:r>
+              <a:rPr lang="en-US" sz="2000" smtClean="0">
+                <a:latin typeface="Consolas" panose="020B0609020204030204" pitchFamily="49" charset="0"/>
+              </a:rPr>
+              <a:t>template</a:t>
+            </a:r>
+            <a:r>
+              <a:rPr lang="en-US" sz="2000">
+                <a:latin typeface="Consolas" panose="020B0609020204030204" pitchFamily="49" charset="0"/>
+              </a:rPr>
+              <a:t>&lt;&gt; struct fibonacci&lt;0&gt; </a:t>
+            </a:r>
+            <a:r>
+              <a:rPr lang="en-US" sz="2000" smtClean="0">
+                <a:latin typeface="Consolas" panose="020B0609020204030204" pitchFamily="49" charset="0"/>
+              </a:rPr>
+              <a:t>: </a:t>
+            </a:r>
+            <a:r>
+              <a:rPr lang="en-US" sz="2000">
+                <a:latin typeface="Consolas" panose="020B0609020204030204" pitchFamily="49" charset="0"/>
+              </a:rPr>
+              <a:t>integral_constant&lt;size_t,0&gt; {};</a:t>
+            </a:r>
           </a:p>
         </p:txBody>
       </p:sp>
     </p:spTree>
     <p:extLst>
       <p:ext uri="{BB962C8B-B14F-4D97-AF65-F5344CB8AC3E}">
-        <p14:creationId xmlns:p14="http://schemas.microsoft.com/office/powerpoint/2010/main" val="1455879159"/>
+        <p14:creationId xmlns:p14="http://schemas.microsoft.com/office/powerpoint/2010/main" val="3959915781"/>
+      </p:ext>
+    </p:extLst>
+  </p:cSld>
+  <p:clrMapOvr>
+    <a:masterClrMapping/>
+  </p:clrMapOvr>
+</p:sld>
+</file>
+
+<file path=ppt/slides/slide17.xml><?xml version="1.0" encoding="utf-8"?>
+<p:sld xmlns:a="http://schemas.openxmlformats.org/drawingml/2006/main" xmlns:r="http://schemas.openxmlformats.org/officeDocument/2006/relationships" xmlns:p="http://schemas.openxmlformats.org/presentationml/2006/main">
+  <p:cSld>
+    <p:spTree>
+      <p:nvGrpSpPr>
+        <p:cNvPr id="1" name=""/>
+        <p:cNvGrpSpPr/>
+        <p:nvPr/>
+      </p:nvGrpSpPr>
+      <p:grpSpPr>
+        <a:xfrm>
+          <a:off x="0" y="0"/>
+          <a:ext cx="0" cy="0"/>
+          <a:chOff x="0" y="0"/>
+          <a:chExt cx="0" cy="0"/>
+        </a:xfrm>
+      </p:grpSpPr>
+      <p:sp>
+        <p:nvSpPr>
+          <p:cNvPr id="2" name="Title 1"/>
+          <p:cNvSpPr>
+            <a:spLocks noGrp="1"/>
+          </p:cNvSpPr>
+          <p:nvPr>
+            <p:ph type="title"/>
+          </p:nvPr>
+        </p:nvSpPr>
+        <p:spPr/>
+        <p:txBody>
+          <a:bodyPr/>
+          <a:lstStyle/>
+          <a:p>
+            <a:r>
+              <a:rPr lang="ru-RU" smtClean="0"/>
+              <a:t>обсуждение</a:t>
+            </a:r>
+            <a:endParaRPr lang="en-US"/>
+          </a:p>
+        </p:txBody>
+      </p:sp>
+      <p:sp>
+        <p:nvSpPr>
+          <p:cNvPr id="3" name="Content Placeholder 2"/>
+          <p:cNvSpPr>
+            <a:spLocks noGrp="1"/>
+          </p:cNvSpPr>
+          <p:nvPr>
+            <p:ph idx="1"/>
+          </p:nvPr>
+        </p:nvSpPr>
+        <p:spPr/>
+        <p:txBody>
+          <a:bodyPr/>
+          <a:lstStyle/>
+          <a:p>
+            <a:r>
+              <a:rPr lang="ru-RU" smtClean="0"/>
+              <a:t>"Арифметические" метапрограммы хороши, чтобы попрактиковаться, но это забивание гвоздей микроскопом.</a:t>
+            </a:r>
+          </a:p>
+          <a:p>
+            <a:r>
+              <a:rPr lang="ru-RU" smtClean="0"/>
+              <a:t>Уже в ближайших лекциях </a:t>
+            </a:r>
+            <a:r>
+              <a:rPr lang="en-US" smtClean="0"/>
+              <a:t>constexpr </a:t>
+            </a:r>
+            <a:r>
+              <a:rPr lang="ru-RU" smtClean="0"/>
+              <a:t>выражения будут делать то же, но лучше</a:t>
+            </a:r>
+          </a:p>
+          <a:p>
+            <a:r>
+              <a:rPr lang="ru-RU" smtClean="0"/>
+              <a:t>Настоящее метапрограммирование это программирование на типах</a:t>
+            </a:r>
+            <a:endParaRPr lang="en-US"/>
+          </a:p>
+        </p:txBody>
+      </p:sp>
+    </p:spTree>
+    <p:extLst>
+      <p:ext uri="{BB962C8B-B14F-4D97-AF65-F5344CB8AC3E}">
+        <p14:creationId xmlns:p14="http://schemas.microsoft.com/office/powerpoint/2010/main" val="282845692"/>
+      </p:ext>
+    </p:extLst>
+  </p:cSld>
+  <p:clrMapOvr>
+    <a:masterClrMapping/>
+  </p:clrMapOvr>
+</p:sld>
+</file>
+
+<file path=ppt/slides/slide18.xml><?xml version="1.0" encoding="utf-8"?>
+<p:sld xmlns:a="http://schemas.openxmlformats.org/drawingml/2006/main" xmlns:r="http://schemas.openxmlformats.org/officeDocument/2006/relationships" xmlns:p="http://schemas.openxmlformats.org/presentationml/2006/main">
+  <p:cSld>
+    <p:spTree>
+      <p:nvGrpSpPr>
+        <p:cNvPr id="1" name=""/>
+        <p:cNvGrpSpPr/>
+        <p:nvPr/>
+      </p:nvGrpSpPr>
+      <p:grpSpPr>
+        <a:xfrm>
+          <a:off x="0" y="0"/>
+          <a:ext cx="0" cy="0"/>
+          <a:chOff x="0" y="0"/>
+          <a:chExt cx="0" cy="0"/>
+        </a:xfrm>
+      </p:grpSpPr>
+      <p:sp>
+        <p:nvSpPr>
+          <p:cNvPr id="2" name="Title 1"/>
+          <p:cNvSpPr>
+            <a:spLocks noGrp="1"/>
+          </p:cNvSpPr>
+          <p:nvPr>
+            <p:ph type="title"/>
+          </p:nvPr>
+        </p:nvSpPr>
+        <p:spPr/>
+        <p:txBody>
+          <a:bodyPr/>
+          <a:lstStyle/>
+          <a:p>
+            <a:r>
+              <a:rPr lang="ru-RU" smtClean="0"/>
+              <a:t>истина и ложь для типов</a:t>
+            </a:r>
+            <a:endParaRPr lang="en-US"/>
+          </a:p>
+        </p:txBody>
+      </p:sp>
+      <p:sp>
+        <p:nvSpPr>
+          <p:cNvPr id="3" name="Content Placeholder 2"/>
+          <p:cNvSpPr>
+            <a:spLocks noGrp="1"/>
+          </p:cNvSpPr>
+          <p:nvPr>
+            <p:ph idx="1"/>
+          </p:nvPr>
+        </p:nvSpPr>
+        <p:spPr/>
+        <p:txBody>
+          <a:bodyPr/>
+          <a:lstStyle/>
+          <a:p>
+            <a:pPr marL="0" indent="0">
+              <a:buNone/>
+            </a:pPr>
+            <a:r>
+              <a:rPr lang="en-US">
+                <a:latin typeface="Consolas" panose="020B0609020204030204" pitchFamily="49" charset="0"/>
+              </a:rPr>
+              <a:t>template &lt;typename T, T </a:t>
+            </a:r>
+            <a:r>
+              <a:rPr lang="en-US" smtClean="0">
+                <a:latin typeface="Consolas" panose="020B0609020204030204" pitchFamily="49" charset="0"/>
+              </a:rPr>
+              <a:t>v&gt; struct </a:t>
+            </a:r>
+            <a:r>
+              <a:rPr lang="en-US">
+                <a:latin typeface="Consolas" panose="020B0609020204030204" pitchFamily="49" charset="0"/>
+              </a:rPr>
+              <a:t>integral_constant</a:t>
+            </a:r>
+            <a:r>
+              <a:rPr lang="en-US" smtClean="0">
+                <a:latin typeface="Consolas" panose="020B0609020204030204" pitchFamily="49" charset="0"/>
+              </a:rPr>
+              <a:t>;</a:t>
+            </a:r>
+            <a:endParaRPr lang="ru-RU" smtClean="0">
+              <a:latin typeface="Consolas" panose="020B0609020204030204" pitchFamily="49" charset="0"/>
+            </a:endParaRPr>
+          </a:p>
+          <a:p>
+            <a:pPr marL="0" indent="0">
+              <a:buNone/>
+            </a:pPr>
+            <a:r>
+              <a:rPr lang="en-US">
+                <a:latin typeface="Consolas" panose="020B0609020204030204" pitchFamily="49" charset="0"/>
+              </a:rPr>
+              <a:t>using </a:t>
+            </a:r>
+            <a:r>
+              <a:rPr lang="en-US">
+                <a:solidFill>
+                  <a:srgbClr val="FFFF00"/>
+                </a:solidFill>
+                <a:latin typeface="Consolas" panose="020B0609020204030204" pitchFamily="49" charset="0"/>
+              </a:rPr>
+              <a:t>true_type</a:t>
+            </a:r>
+            <a:r>
+              <a:rPr lang="en-US">
+                <a:latin typeface="Consolas" panose="020B0609020204030204" pitchFamily="49" charset="0"/>
+              </a:rPr>
+              <a:t> = integral_constant&lt;bool, </a:t>
+            </a:r>
+            <a:r>
+              <a:rPr lang="en-US" smtClean="0">
+                <a:latin typeface="Consolas" panose="020B0609020204030204" pitchFamily="49" charset="0"/>
+              </a:rPr>
+              <a:t>true&gt;</a:t>
+            </a:r>
+            <a:r>
+              <a:rPr lang="en-US">
+                <a:latin typeface="Consolas" panose="020B0609020204030204" pitchFamily="49" charset="0"/>
+              </a:rPr>
+              <a:t>;</a:t>
+            </a:r>
+            <a:endParaRPr lang="en-US" smtClean="0">
+              <a:latin typeface="Consolas" panose="020B0609020204030204" pitchFamily="49" charset="0"/>
+            </a:endParaRPr>
+          </a:p>
+          <a:p>
+            <a:pPr marL="0" indent="0">
+              <a:buNone/>
+            </a:pPr>
+            <a:r>
+              <a:rPr lang="en-US">
+                <a:latin typeface="Consolas" panose="020B0609020204030204" pitchFamily="49" charset="0"/>
+              </a:rPr>
+              <a:t>using </a:t>
+            </a:r>
+            <a:r>
+              <a:rPr lang="en-US" smtClean="0">
+                <a:solidFill>
+                  <a:srgbClr val="FFFF00"/>
+                </a:solidFill>
+                <a:latin typeface="Consolas" panose="020B0609020204030204" pitchFamily="49" charset="0"/>
+              </a:rPr>
+              <a:t>false_type</a:t>
+            </a:r>
+            <a:r>
+              <a:rPr lang="en-US" smtClean="0">
+                <a:latin typeface="Consolas" panose="020B0609020204030204" pitchFamily="49" charset="0"/>
+              </a:rPr>
+              <a:t> </a:t>
+            </a:r>
+            <a:r>
+              <a:rPr lang="en-US">
+                <a:latin typeface="Consolas" panose="020B0609020204030204" pitchFamily="49" charset="0"/>
+              </a:rPr>
+              <a:t>= integral_constant&lt;bool, </a:t>
+            </a:r>
+            <a:r>
+              <a:rPr lang="en-US" smtClean="0">
+                <a:latin typeface="Consolas" panose="020B0609020204030204" pitchFamily="49" charset="0"/>
+              </a:rPr>
+              <a:t>false&gt;;</a:t>
+            </a:r>
+            <a:endParaRPr lang="en-US">
+              <a:latin typeface="Consolas" panose="020B0609020204030204" pitchFamily="49" charset="0"/>
+            </a:endParaRPr>
+          </a:p>
+        </p:txBody>
+      </p:sp>
+    </p:spTree>
+    <p:extLst>
+      <p:ext uri="{BB962C8B-B14F-4D97-AF65-F5344CB8AC3E}">
+        <p14:creationId xmlns:p14="http://schemas.microsoft.com/office/powerpoint/2010/main" val="2247114216"/>
+      </p:ext>
+    </p:extLst>
+  </p:cSld>
+  <p:clrMapOvr>
+    <a:masterClrMapping/>
+  </p:clrMapOvr>
+</p:sld>
+</file>
+
+<file path=ppt/slides/slide19.xml><?xml version="1.0" encoding="utf-8"?>
+<p:sld xmlns:a="http://schemas.openxmlformats.org/drawingml/2006/main" xmlns:r="http://schemas.openxmlformats.org/officeDocument/2006/relationships" xmlns:p="http://schemas.openxmlformats.org/presentationml/2006/main">
+  <p:cSld>
+    <p:spTree>
+      <p:nvGrpSpPr>
+        <p:cNvPr id="1" name=""/>
+        <p:cNvGrpSpPr/>
+        <p:nvPr/>
+      </p:nvGrpSpPr>
+      <p:grpSpPr>
+        <a:xfrm>
+          <a:off x="0" y="0"/>
+          <a:ext cx="0" cy="0"/>
+          <a:chOff x="0" y="0"/>
+          <a:chExt cx="0" cy="0"/>
+        </a:xfrm>
+      </p:grpSpPr>
+      <p:sp>
+        <p:nvSpPr>
+          <p:cNvPr id="2" name="Title 1"/>
+          <p:cNvSpPr>
+            <a:spLocks noGrp="1"/>
+          </p:cNvSpPr>
+          <p:nvPr>
+            <p:ph type="title"/>
+          </p:nvPr>
+        </p:nvSpPr>
+        <p:spPr/>
+        <p:txBody>
+          <a:bodyPr/>
+          <a:lstStyle/>
+          <a:p>
+            <a:r>
+              <a:rPr lang="ru-RU" smtClean="0"/>
+              <a:t>Простой пример: </a:t>
+            </a:r>
+            <a:r>
+              <a:rPr lang="en-US" smtClean="0"/>
+              <a:t>is_SAME</a:t>
+            </a:r>
+            <a:endParaRPr lang="en-US"/>
+          </a:p>
+        </p:txBody>
+      </p:sp>
+      <p:sp>
+        <p:nvSpPr>
+          <p:cNvPr id="3" name="Content Placeholder 2"/>
+          <p:cNvSpPr>
+            <a:spLocks noGrp="1"/>
+          </p:cNvSpPr>
+          <p:nvPr>
+            <p:ph idx="1"/>
+          </p:nvPr>
+        </p:nvSpPr>
+        <p:spPr/>
+        <p:txBody>
+          <a:bodyPr/>
+          <a:lstStyle/>
+          <a:p>
+            <a:r>
+              <a:rPr lang="ru-RU" smtClean="0"/>
+              <a:t>Общий случай: типы разные</a:t>
+            </a:r>
+            <a:endParaRPr lang="en-US" smtClean="0"/>
+          </a:p>
+          <a:p>
+            <a:pPr marL="0" indent="0">
+              <a:buNone/>
+            </a:pPr>
+            <a:r>
+              <a:rPr lang="en-US" smtClean="0">
+                <a:latin typeface="Consolas" panose="020B0609020204030204" pitchFamily="49" charset="0"/>
+              </a:rPr>
+              <a:t>template&lt;typename </a:t>
+            </a:r>
+            <a:r>
+              <a:rPr lang="en-US">
+                <a:latin typeface="Consolas" panose="020B0609020204030204" pitchFamily="49" charset="0"/>
+              </a:rPr>
+              <a:t>T, typename U</a:t>
+            </a:r>
+            <a:r>
+              <a:rPr lang="en-US" smtClean="0">
+                <a:latin typeface="Consolas" panose="020B0609020204030204" pitchFamily="49" charset="0"/>
+              </a:rPr>
+              <a:t>&gt;</a:t>
+            </a:r>
+            <a:br>
+              <a:rPr lang="en-US" smtClean="0">
+                <a:latin typeface="Consolas" panose="020B0609020204030204" pitchFamily="49" charset="0"/>
+              </a:rPr>
+            </a:br>
+            <a:r>
+              <a:rPr lang="en-US" smtClean="0">
+                <a:latin typeface="Consolas" panose="020B0609020204030204" pitchFamily="49" charset="0"/>
+              </a:rPr>
+              <a:t>struct </a:t>
+            </a:r>
+            <a:r>
+              <a:rPr lang="en-US">
+                <a:latin typeface="Consolas" panose="020B0609020204030204" pitchFamily="49" charset="0"/>
+              </a:rPr>
+              <a:t>is_same : </a:t>
+            </a:r>
+            <a:r>
+              <a:rPr lang="en-US" smtClean="0">
+                <a:latin typeface="Consolas" panose="020B0609020204030204" pitchFamily="49" charset="0"/>
+              </a:rPr>
+              <a:t>false_type {};</a:t>
+            </a:r>
+            <a:endParaRPr lang="en-US">
+              <a:latin typeface="Consolas" panose="020B0609020204030204" pitchFamily="49" charset="0"/>
+            </a:endParaRPr>
+          </a:p>
+          <a:p>
+            <a:r>
+              <a:rPr lang="ru-RU" smtClean="0"/>
+              <a:t>Частный случай: типы одинаковые</a:t>
+            </a:r>
+          </a:p>
+          <a:p>
+            <a:pPr marL="0" indent="0">
+              <a:buNone/>
+            </a:pPr>
+            <a:r>
+              <a:rPr lang="en-US" smtClean="0">
+                <a:latin typeface="Consolas" panose="020B0609020204030204" pitchFamily="49" charset="0"/>
+              </a:rPr>
+              <a:t>template&lt;typename </a:t>
+            </a:r>
+            <a:r>
+              <a:rPr lang="en-US">
+                <a:latin typeface="Consolas" panose="020B0609020204030204" pitchFamily="49" charset="0"/>
+              </a:rPr>
+              <a:t>T</a:t>
+            </a:r>
+            <a:r>
+              <a:rPr lang="en-US" smtClean="0">
+                <a:latin typeface="Consolas" panose="020B0609020204030204" pitchFamily="49" charset="0"/>
+              </a:rPr>
+              <a:t>&gt;</a:t>
+            </a:r>
+            <a:br>
+              <a:rPr lang="en-US" smtClean="0">
+                <a:latin typeface="Consolas" panose="020B0609020204030204" pitchFamily="49" charset="0"/>
+              </a:rPr>
+            </a:br>
+            <a:r>
+              <a:rPr lang="en-US" smtClean="0">
+                <a:latin typeface="Consolas" panose="020B0609020204030204" pitchFamily="49" charset="0"/>
+              </a:rPr>
+              <a:t>struct </a:t>
+            </a:r>
+            <a:r>
+              <a:rPr lang="en-US">
+                <a:latin typeface="Consolas" panose="020B0609020204030204" pitchFamily="49" charset="0"/>
+              </a:rPr>
+              <a:t>is_same&lt;T, T&gt; : </a:t>
+            </a:r>
+            <a:r>
+              <a:rPr lang="en-US" smtClean="0">
+                <a:latin typeface="Consolas" panose="020B0609020204030204" pitchFamily="49" charset="0"/>
+              </a:rPr>
+              <a:t>true_type </a:t>
+            </a:r>
+            <a:r>
+              <a:rPr lang="en-US">
+                <a:latin typeface="Consolas" panose="020B0609020204030204" pitchFamily="49" charset="0"/>
+              </a:rPr>
+              <a:t>{};</a:t>
+            </a:r>
+          </a:p>
+        </p:txBody>
+      </p:sp>
+    </p:spTree>
+    <p:extLst>
+      <p:ext uri="{BB962C8B-B14F-4D97-AF65-F5344CB8AC3E}">
+        <p14:creationId xmlns:p14="http://schemas.microsoft.com/office/powerpoint/2010/main" val="3347560882"/>
       </p:ext>
     </p:extLst>
   </p:cSld>
@@ -13966,13 +14458,8 @@
             </a:pPr>
             <a:r>
               <a:rPr lang="ru-RU" sz="4000" smtClean="0"/>
-              <a:t> Определители </a:t>
-            </a:r>
-            <a:r>
-              <a:rPr lang="ru-RU" sz="4000" smtClean="0"/>
-              <a:t>типов</a:t>
-            </a:r>
-            <a:endParaRPr lang="ru-RU" sz="4000" smtClean="0"/>
+              <a:t> Определители типов</a:t>
+            </a:r>
           </a:p>
         </p:txBody>
       </p:sp>
@@ -13980,6 +14467,1763 @@
     <p:extLst>
       <p:ext uri="{BB962C8B-B14F-4D97-AF65-F5344CB8AC3E}">
         <p14:creationId xmlns:p14="http://schemas.microsoft.com/office/powerpoint/2010/main" val="2399746944"/>
+      </p:ext>
+    </p:extLst>
+  </p:cSld>
+  <p:clrMapOvr>
+    <a:masterClrMapping/>
+  </p:clrMapOvr>
+</p:sld>
+</file>
+
+<file path=ppt/slides/slide20.xml><?xml version="1.0" encoding="utf-8"?>
+<p:sld xmlns:a="http://schemas.openxmlformats.org/drawingml/2006/main" xmlns:r="http://schemas.openxmlformats.org/officeDocument/2006/relationships" xmlns:p="http://schemas.openxmlformats.org/presentationml/2006/main">
+  <p:cSld>
+    <p:spTree>
+      <p:nvGrpSpPr>
+        <p:cNvPr id="1" name=""/>
+        <p:cNvGrpSpPr/>
+        <p:nvPr/>
+      </p:nvGrpSpPr>
+      <p:grpSpPr>
+        <a:xfrm>
+          <a:off x="0" y="0"/>
+          <a:ext cx="0" cy="0"/>
+          <a:chOff x="0" y="0"/>
+          <a:chExt cx="0" cy="0"/>
+        </a:xfrm>
+      </p:grpSpPr>
+      <p:sp>
+        <p:nvSpPr>
+          <p:cNvPr id="2" name="Title 1"/>
+          <p:cNvSpPr>
+            <a:spLocks noGrp="1"/>
+          </p:cNvSpPr>
+          <p:nvPr>
+            <p:ph type="title"/>
+          </p:nvPr>
+        </p:nvSpPr>
+        <p:spPr/>
+        <p:txBody>
+          <a:bodyPr/>
+          <a:lstStyle/>
+          <a:p>
+            <a:r>
+              <a:rPr lang="ru-RU" smtClean="0"/>
+              <a:t>простая задача: </a:t>
+            </a:r>
+            <a:r>
+              <a:rPr lang="en-US" smtClean="0"/>
+              <a:t>and_</a:t>
+            </a:r>
+            <a:endParaRPr lang="en-US"/>
+          </a:p>
+        </p:txBody>
+      </p:sp>
+      <p:sp>
+        <p:nvSpPr>
+          <p:cNvPr id="3" name="Content Placeholder 2"/>
+          <p:cNvSpPr>
+            <a:spLocks noGrp="1"/>
+          </p:cNvSpPr>
+          <p:nvPr>
+            <p:ph idx="1"/>
+          </p:nvPr>
+        </p:nvSpPr>
+        <p:spPr/>
+        <p:txBody>
+          <a:bodyPr/>
+          <a:lstStyle/>
+          <a:p>
+            <a:pPr marL="0" indent="0">
+              <a:buNone/>
+            </a:pPr>
+            <a:r>
+              <a:rPr lang="en-US" smtClean="0"/>
+              <a:t>typename and_ &lt;T, U&gt;::type</a:t>
+            </a:r>
+          </a:p>
+          <a:p>
+            <a:r>
+              <a:rPr lang="ru-RU" smtClean="0"/>
+              <a:t>Является </a:t>
+            </a:r>
+            <a:r>
+              <a:rPr lang="en-US" smtClean="0"/>
+              <a:t>true_type </a:t>
+            </a:r>
+            <a:r>
+              <a:rPr lang="ru-RU" smtClean="0"/>
+              <a:t>только если и </a:t>
+            </a:r>
+            <a:r>
+              <a:rPr lang="en-US" smtClean="0"/>
+              <a:t>T </a:t>
+            </a:r>
+            <a:r>
+              <a:rPr lang="ru-RU" smtClean="0"/>
+              <a:t>и </a:t>
+            </a:r>
+            <a:r>
+              <a:rPr lang="en-US" smtClean="0"/>
+              <a:t>U true_type</a:t>
+            </a:r>
+          </a:p>
+          <a:p>
+            <a:r>
+              <a:rPr lang="ru-RU" smtClean="0"/>
+              <a:t>Иначе является </a:t>
+            </a:r>
+            <a:r>
+              <a:rPr lang="en-US" smtClean="0"/>
+              <a:t>false_type</a:t>
+            </a:r>
+            <a:endParaRPr lang="en-US"/>
+          </a:p>
+        </p:txBody>
+      </p:sp>
+    </p:spTree>
+    <p:extLst>
+      <p:ext uri="{BB962C8B-B14F-4D97-AF65-F5344CB8AC3E}">
+        <p14:creationId xmlns:p14="http://schemas.microsoft.com/office/powerpoint/2010/main" val="2923136453"/>
+      </p:ext>
+    </p:extLst>
+  </p:cSld>
+  <p:clrMapOvr>
+    <a:masterClrMapping/>
+  </p:clrMapOvr>
+</p:sld>
+</file>
+
+<file path=ppt/slides/slide21.xml><?xml version="1.0" encoding="utf-8"?>
+<p:sld xmlns:a="http://schemas.openxmlformats.org/drawingml/2006/main" xmlns:r="http://schemas.openxmlformats.org/officeDocument/2006/relationships" xmlns:p="http://schemas.openxmlformats.org/presentationml/2006/main">
+  <p:cSld>
+    <p:spTree>
+      <p:nvGrpSpPr>
+        <p:cNvPr id="1" name=""/>
+        <p:cNvGrpSpPr/>
+        <p:nvPr/>
+      </p:nvGrpSpPr>
+      <p:grpSpPr>
+        <a:xfrm>
+          <a:off x="0" y="0"/>
+          <a:ext cx="0" cy="0"/>
+          <a:chOff x="0" y="0"/>
+          <a:chExt cx="0" cy="0"/>
+        </a:xfrm>
+      </p:grpSpPr>
+      <p:sp>
+        <p:nvSpPr>
+          <p:cNvPr id="2" name="Title 1"/>
+          <p:cNvSpPr>
+            <a:spLocks noGrp="1"/>
+          </p:cNvSpPr>
+          <p:nvPr>
+            <p:ph type="title"/>
+          </p:nvPr>
+        </p:nvSpPr>
+        <p:spPr/>
+        <p:txBody>
+          <a:bodyPr/>
+          <a:lstStyle/>
+          <a:p>
+            <a:r>
+              <a:rPr lang="ru-RU"/>
+              <a:t>пример: определить указатель</a:t>
+            </a:r>
+            <a:endParaRPr lang="en-US"/>
+          </a:p>
+        </p:txBody>
+      </p:sp>
+      <p:sp>
+        <p:nvSpPr>
+          <p:cNvPr id="3" name="Content Placeholder 2"/>
+          <p:cNvSpPr>
+            <a:spLocks noGrp="1"/>
+          </p:cNvSpPr>
+          <p:nvPr>
+            <p:ph idx="1"/>
+          </p:nvPr>
+        </p:nvSpPr>
+        <p:spPr>
+          <a:xfrm>
+            <a:off x="1141412" y="2249487"/>
+            <a:ext cx="10301171" cy="3541714"/>
+          </a:xfrm>
+        </p:spPr>
+        <p:txBody>
+          <a:bodyPr/>
+          <a:lstStyle/>
+          <a:p>
+            <a:pPr marL="0" indent="0">
+              <a:buNone/>
+            </a:pPr>
+            <a:r>
+              <a:rPr lang="en-US">
+                <a:latin typeface="Consolas" panose="020B0609020204030204" pitchFamily="49" charset="0"/>
+              </a:rPr>
+              <a:t>template &lt;typename T&gt; </a:t>
+            </a:r>
+            <a:r>
+              <a:rPr lang="en-US" smtClean="0">
+                <a:latin typeface="Consolas" panose="020B0609020204030204" pitchFamily="49" charset="0"/>
+              </a:rPr>
+              <a:t>struct is_pointer: false_type {};</a:t>
+            </a:r>
+            <a:endParaRPr lang="ru-RU">
+              <a:latin typeface="Consolas" panose="020B0609020204030204" pitchFamily="49" charset="0"/>
+            </a:endParaRPr>
+          </a:p>
+          <a:p>
+            <a:pPr marL="0" indent="0">
+              <a:buNone/>
+            </a:pPr>
+            <a:r>
+              <a:rPr lang="en-US" smtClean="0">
+                <a:latin typeface="Consolas" panose="020B0609020204030204" pitchFamily="49" charset="0"/>
+              </a:rPr>
+              <a:t>template </a:t>
+            </a:r>
+            <a:r>
+              <a:rPr lang="en-US">
+                <a:latin typeface="Consolas" panose="020B0609020204030204" pitchFamily="49" charset="0"/>
+              </a:rPr>
+              <a:t>&lt;typename T&gt; </a:t>
+            </a:r>
+            <a:r>
+              <a:rPr lang="en-US" smtClean="0">
+                <a:latin typeface="Consolas" panose="020B0609020204030204" pitchFamily="49" charset="0"/>
+              </a:rPr>
+              <a:t>struct is_pointer&lt;T*&gt;: true_type {};</a:t>
+            </a:r>
+          </a:p>
+          <a:p>
+            <a:r>
+              <a:rPr lang="ru-RU" smtClean="0"/>
+              <a:t>Что можно и нужно улучшить?</a:t>
+            </a:r>
+          </a:p>
+        </p:txBody>
+      </p:sp>
+    </p:spTree>
+    <p:extLst>
+      <p:ext uri="{BB962C8B-B14F-4D97-AF65-F5344CB8AC3E}">
+        <p14:creationId xmlns:p14="http://schemas.microsoft.com/office/powerpoint/2010/main" val="404190172"/>
+      </p:ext>
+    </p:extLst>
+  </p:cSld>
+  <p:clrMapOvr>
+    <a:masterClrMapping/>
+  </p:clrMapOvr>
+</p:sld>
+</file>
+
+<file path=ppt/slides/slide22.xml><?xml version="1.0" encoding="utf-8"?>
+<p:sld xmlns:a="http://schemas.openxmlformats.org/drawingml/2006/main" xmlns:r="http://schemas.openxmlformats.org/officeDocument/2006/relationships" xmlns:p="http://schemas.openxmlformats.org/presentationml/2006/main">
+  <p:cSld>
+    <p:spTree>
+      <p:nvGrpSpPr>
+        <p:cNvPr id="1" name=""/>
+        <p:cNvGrpSpPr/>
+        <p:nvPr/>
+      </p:nvGrpSpPr>
+      <p:grpSpPr>
+        <a:xfrm>
+          <a:off x="0" y="0"/>
+          <a:ext cx="0" cy="0"/>
+          <a:chOff x="0" y="0"/>
+          <a:chExt cx="0" cy="0"/>
+        </a:xfrm>
+      </p:grpSpPr>
+      <p:sp>
+        <p:nvSpPr>
+          <p:cNvPr id="2" name="Title 1"/>
+          <p:cNvSpPr>
+            <a:spLocks noGrp="1"/>
+          </p:cNvSpPr>
+          <p:nvPr>
+            <p:ph type="title"/>
+          </p:nvPr>
+        </p:nvSpPr>
+        <p:spPr/>
+        <p:txBody>
+          <a:bodyPr/>
+          <a:lstStyle/>
+          <a:p>
+            <a:r>
+              <a:rPr lang="ru-RU" smtClean="0"/>
+              <a:t>пример: определить указатель</a:t>
+            </a:r>
+            <a:endParaRPr lang="en-US"/>
+          </a:p>
+        </p:txBody>
+      </p:sp>
+      <p:sp>
+        <p:nvSpPr>
+          <p:cNvPr id="3" name="Content Placeholder 2"/>
+          <p:cNvSpPr>
+            <a:spLocks noGrp="1"/>
+          </p:cNvSpPr>
+          <p:nvPr>
+            <p:ph idx="1"/>
+          </p:nvPr>
+        </p:nvSpPr>
+        <p:spPr>
+          <a:xfrm>
+            <a:off x="1141412" y="2249487"/>
+            <a:ext cx="10301171" cy="3541714"/>
+          </a:xfrm>
+        </p:spPr>
+        <p:txBody>
+          <a:bodyPr/>
+          <a:lstStyle/>
+          <a:p>
+            <a:pPr marL="0" indent="0">
+              <a:buNone/>
+            </a:pPr>
+            <a:r>
+              <a:rPr lang="en-US">
+                <a:latin typeface="Consolas" panose="020B0609020204030204" pitchFamily="49" charset="0"/>
+              </a:rPr>
+              <a:t>template &lt;typename T&gt; </a:t>
+            </a:r>
+            <a:r>
+              <a:rPr lang="en-US" smtClean="0">
+                <a:latin typeface="Consolas" panose="020B0609020204030204" pitchFamily="49" charset="0"/>
+              </a:rPr>
+              <a:t>struct is_pointer: false_type {};</a:t>
+            </a:r>
+            <a:endParaRPr lang="ru-RU">
+              <a:latin typeface="Consolas" panose="020B0609020204030204" pitchFamily="49" charset="0"/>
+            </a:endParaRPr>
+          </a:p>
+          <a:p>
+            <a:pPr marL="0" indent="0">
+              <a:buNone/>
+            </a:pPr>
+            <a:r>
+              <a:rPr lang="en-US" smtClean="0">
+                <a:latin typeface="Consolas" panose="020B0609020204030204" pitchFamily="49" charset="0"/>
+              </a:rPr>
+              <a:t>template </a:t>
+            </a:r>
+            <a:r>
+              <a:rPr lang="en-US">
+                <a:latin typeface="Consolas" panose="020B0609020204030204" pitchFamily="49" charset="0"/>
+              </a:rPr>
+              <a:t>&lt;typename T&gt; </a:t>
+            </a:r>
+            <a:r>
+              <a:rPr lang="en-US" smtClean="0">
+                <a:latin typeface="Consolas" panose="020B0609020204030204" pitchFamily="49" charset="0"/>
+              </a:rPr>
+              <a:t>struct is_pointer&lt;T*&gt;: true_type {};</a:t>
+            </a:r>
+          </a:p>
+          <a:p>
+            <a:r>
+              <a:rPr lang="ru-RU" smtClean="0"/>
+              <a:t>Что можно и нужно улучшить?</a:t>
+            </a:r>
+          </a:p>
+          <a:p>
+            <a:r>
+              <a:rPr lang="en-US" smtClean="0"/>
+              <a:t>is_pointer </a:t>
+            </a:r>
+            <a:r>
+              <a:rPr lang="ru-RU" smtClean="0"/>
+              <a:t>должен быть </a:t>
+            </a:r>
+            <a:r>
+              <a:rPr lang="en-US" smtClean="0"/>
+              <a:t>true_type </a:t>
+            </a:r>
+            <a:r>
+              <a:rPr lang="ru-RU" smtClean="0"/>
+              <a:t>для константных и волатильных указателей</a:t>
+            </a:r>
+          </a:p>
+        </p:txBody>
+      </p:sp>
+    </p:spTree>
+    <p:extLst>
+      <p:ext uri="{BB962C8B-B14F-4D97-AF65-F5344CB8AC3E}">
+        <p14:creationId xmlns:p14="http://schemas.microsoft.com/office/powerpoint/2010/main" val="1033784317"/>
+      </p:ext>
+    </p:extLst>
+  </p:cSld>
+  <p:clrMapOvr>
+    <a:masterClrMapping/>
+  </p:clrMapOvr>
+</p:sld>
+</file>
+
+<file path=ppt/slides/slide23.xml><?xml version="1.0" encoding="utf-8"?>
+<p:sld xmlns:a="http://schemas.openxmlformats.org/drawingml/2006/main" xmlns:r="http://schemas.openxmlformats.org/officeDocument/2006/relationships" xmlns:p="http://schemas.openxmlformats.org/presentationml/2006/main">
+  <p:cSld>
+    <p:spTree>
+      <p:nvGrpSpPr>
+        <p:cNvPr id="1" name=""/>
+        <p:cNvGrpSpPr/>
+        <p:nvPr/>
+      </p:nvGrpSpPr>
+      <p:grpSpPr>
+        <a:xfrm>
+          <a:off x="0" y="0"/>
+          <a:ext cx="0" cy="0"/>
+          <a:chOff x="0" y="0"/>
+          <a:chExt cx="0" cy="0"/>
+        </a:xfrm>
+      </p:grpSpPr>
+      <p:sp>
+        <p:nvSpPr>
+          <p:cNvPr id="2" name="Title 1"/>
+          <p:cNvSpPr>
+            <a:spLocks noGrp="1"/>
+          </p:cNvSpPr>
+          <p:nvPr>
+            <p:ph type="title"/>
+          </p:nvPr>
+        </p:nvSpPr>
+        <p:spPr/>
+        <p:txBody>
+          <a:bodyPr/>
+          <a:lstStyle/>
+          <a:p>
+            <a:r>
+              <a:rPr lang="ru-RU" smtClean="0"/>
+              <a:t>Идея: </a:t>
+            </a:r>
+            <a:r>
+              <a:rPr lang="en-US" smtClean="0"/>
+              <a:t>remove_cv_t</a:t>
+            </a:r>
+            <a:endParaRPr lang="en-US"/>
+          </a:p>
+        </p:txBody>
+      </p:sp>
+      <p:sp>
+        <p:nvSpPr>
+          <p:cNvPr id="3" name="Content Placeholder 2"/>
+          <p:cNvSpPr>
+            <a:spLocks noGrp="1"/>
+          </p:cNvSpPr>
+          <p:nvPr>
+            <p:ph idx="1"/>
+          </p:nvPr>
+        </p:nvSpPr>
+        <p:spPr>
+          <a:xfrm>
+            <a:off x="1141412" y="2249487"/>
+            <a:ext cx="10301171" cy="3541714"/>
+          </a:xfrm>
+        </p:spPr>
+        <p:txBody>
+          <a:bodyPr/>
+          <a:lstStyle/>
+          <a:p>
+            <a:pPr marL="0" indent="0">
+              <a:buNone/>
+            </a:pPr>
+            <a:r>
+              <a:rPr lang="en-US">
+                <a:latin typeface="Consolas" panose="020B0609020204030204" pitchFamily="49" charset="0"/>
+              </a:rPr>
+              <a:t>template &lt;typename T&gt; </a:t>
+            </a:r>
+            <a:r>
+              <a:rPr lang="en-US" smtClean="0">
+                <a:latin typeface="Consolas" panose="020B0609020204030204" pitchFamily="49" charset="0"/>
+              </a:rPr>
+              <a:t/>
+            </a:r>
+            <a:br>
+              <a:rPr lang="en-US" smtClean="0">
+                <a:latin typeface="Consolas" panose="020B0609020204030204" pitchFamily="49" charset="0"/>
+              </a:rPr>
+            </a:br>
+            <a:r>
+              <a:rPr lang="en-US" smtClean="0">
+                <a:latin typeface="Consolas" panose="020B0609020204030204" pitchFamily="49" charset="0"/>
+              </a:rPr>
+              <a:t>struct is_pointer_helper : false_type {};</a:t>
+            </a:r>
+            <a:endParaRPr lang="ru-RU">
+              <a:latin typeface="Consolas" panose="020B0609020204030204" pitchFamily="49" charset="0"/>
+            </a:endParaRPr>
+          </a:p>
+          <a:p>
+            <a:pPr marL="0" indent="0">
+              <a:buNone/>
+            </a:pPr>
+            <a:r>
+              <a:rPr lang="en-US" smtClean="0">
+                <a:latin typeface="Consolas" panose="020B0609020204030204" pitchFamily="49" charset="0"/>
+              </a:rPr>
+              <a:t>template </a:t>
+            </a:r>
+            <a:r>
+              <a:rPr lang="en-US">
+                <a:latin typeface="Consolas" panose="020B0609020204030204" pitchFamily="49" charset="0"/>
+              </a:rPr>
+              <a:t>&lt;typename T&gt; </a:t>
+            </a:r>
+            <a:r>
+              <a:rPr lang="en-US" smtClean="0">
+                <a:latin typeface="Consolas" panose="020B0609020204030204" pitchFamily="49" charset="0"/>
+              </a:rPr>
+              <a:t/>
+            </a:r>
+            <a:br>
+              <a:rPr lang="en-US" smtClean="0">
+                <a:latin typeface="Consolas" panose="020B0609020204030204" pitchFamily="49" charset="0"/>
+              </a:rPr>
+            </a:br>
+            <a:r>
+              <a:rPr lang="en-US" smtClean="0">
+                <a:latin typeface="Consolas" panose="020B0609020204030204" pitchFamily="49" charset="0"/>
+              </a:rPr>
+              <a:t>struct is_pointer_helper&lt;T*&gt; : true_type {};</a:t>
+            </a:r>
+            <a:endParaRPr lang="ru-RU" smtClean="0">
+              <a:latin typeface="Consolas" panose="020B0609020204030204" pitchFamily="49" charset="0"/>
+            </a:endParaRPr>
+          </a:p>
+          <a:p>
+            <a:pPr marL="0" indent="0">
+              <a:buNone/>
+            </a:pPr>
+            <a:r>
+              <a:rPr lang="en-US">
+                <a:latin typeface="Consolas" panose="020B0609020204030204" pitchFamily="49" charset="0"/>
+              </a:rPr>
+              <a:t>template &lt;typename T&gt; </a:t>
+            </a:r>
+            <a:r>
+              <a:rPr lang="ru-RU" smtClean="0">
+                <a:latin typeface="Consolas" panose="020B0609020204030204" pitchFamily="49" charset="0"/>
+              </a:rPr>
+              <a:t/>
+            </a:r>
+            <a:br>
+              <a:rPr lang="ru-RU" smtClean="0">
+                <a:latin typeface="Consolas" panose="020B0609020204030204" pitchFamily="49" charset="0"/>
+              </a:rPr>
+            </a:br>
+            <a:r>
+              <a:rPr lang="en-US" smtClean="0">
+                <a:latin typeface="Consolas" panose="020B0609020204030204" pitchFamily="49" charset="0"/>
+              </a:rPr>
+              <a:t>struct </a:t>
+            </a:r>
+            <a:r>
+              <a:rPr lang="en-US">
+                <a:latin typeface="Consolas" panose="020B0609020204030204" pitchFamily="49" charset="0"/>
+              </a:rPr>
+              <a:t>is_pointer : </a:t>
+            </a:r>
+            <a:r>
+              <a:rPr lang="en-US" smtClean="0">
+                <a:latin typeface="Consolas" panose="020B0609020204030204" pitchFamily="49" charset="0"/>
+              </a:rPr>
+              <a:t>is_pointer_helper &lt;</a:t>
+            </a:r>
+            <a:r>
+              <a:rPr lang="en-US" smtClean="0">
+                <a:solidFill>
+                  <a:srgbClr val="FFFF00"/>
+                </a:solidFill>
+                <a:latin typeface="Consolas" panose="020B0609020204030204" pitchFamily="49" charset="0"/>
+              </a:rPr>
+              <a:t>remove_cv</a:t>
+            </a:r>
+            <a:r>
+              <a:rPr lang="ru-RU" smtClean="0">
+                <a:solidFill>
+                  <a:srgbClr val="FFFF00"/>
+                </a:solidFill>
+                <a:latin typeface="Consolas" panose="020B0609020204030204" pitchFamily="49" charset="0"/>
+              </a:rPr>
+              <a:t>_</a:t>
+            </a:r>
+            <a:r>
+              <a:rPr lang="en-US" smtClean="0">
+                <a:solidFill>
+                  <a:srgbClr val="FFFF00"/>
+                </a:solidFill>
+                <a:latin typeface="Consolas" panose="020B0609020204030204" pitchFamily="49" charset="0"/>
+              </a:rPr>
+              <a:t>t&lt;T&gt;</a:t>
+            </a:r>
+            <a:r>
+              <a:rPr lang="en-US" smtClean="0">
+                <a:latin typeface="Consolas" panose="020B0609020204030204" pitchFamily="49" charset="0"/>
+              </a:rPr>
+              <a:t>&gt; {};</a:t>
+            </a:r>
+            <a:endParaRPr lang="en-US">
+              <a:latin typeface="Consolas" panose="020B0609020204030204" pitchFamily="49" charset="0"/>
+            </a:endParaRPr>
+          </a:p>
+        </p:txBody>
+      </p:sp>
+    </p:spTree>
+    <p:extLst>
+      <p:ext uri="{BB962C8B-B14F-4D97-AF65-F5344CB8AC3E}">
+        <p14:creationId xmlns:p14="http://schemas.microsoft.com/office/powerpoint/2010/main" val="2922875702"/>
+      </p:ext>
+    </p:extLst>
+  </p:cSld>
+  <p:clrMapOvr>
+    <a:masterClrMapping/>
+  </p:clrMapOvr>
+</p:sld>
+</file>
+
+<file path=ppt/slides/slide24.xml><?xml version="1.0" encoding="utf-8"?>
+<p:sld xmlns:a="http://schemas.openxmlformats.org/drawingml/2006/main" xmlns:r="http://schemas.openxmlformats.org/officeDocument/2006/relationships" xmlns:p="http://schemas.openxmlformats.org/presentationml/2006/main">
+  <p:cSld>
+    <p:spTree>
+      <p:nvGrpSpPr>
+        <p:cNvPr id="1" name=""/>
+        <p:cNvGrpSpPr/>
+        <p:nvPr/>
+      </p:nvGrpSpPr>
+      <p:grpSpPr>
+        <a:xfrm>
+          <a:off x="0" y="0"/>
+          <a:ext cx="0" cy="0"/>
+          <a:chOff x="0" y="0"/>
+          <a:chExt cx="0" cy="0"/>
+        </a:xfrm>
+      </p:grpSpPr>
+      <p:sp>
+        <p:nvSpPr>
+          <p:cNvPr id="2" name="Title 1"/>
+          <p:cNvSpPr>
+            <a:spLocks noGrp="1"/>
+          </p:cNvSpPr>
+          <p:nvPr>
+            <p:ph type="title"/>
+          </p:nvPr>
+        </p:nvSpPr>
+        <p:spPr/>
+        <p:txBody>
+          <a:bodyPr/>
+          <a:lstStyle/>
+          <a:p>
+            <a:r>
+              <a:rPr lang="ru-RU" smtClean="0"/>
+              <a:t>Задача: </a:t>
+            </a:r>
+            <a:r>
+              <a:rPr lang="en-US" smtClean="0"/>
+              <a:t>remove_CV_t</a:t>
+            </a:r>
+            <a:endParaRPr lang="en-US"/>
+          </a:p>
+        </p:txBody>
+      </p:sp>
+      <p:sp>
+        <p:nvSpPr>
+          <p:cNvPr id="3" name="Content Placeholder 2"/>
+          <p:cNvSpPr>
+            <a:spLocks noGrp="1"/>
+          </p:cNvSpPr>
+          <p:nvPr>
+            <p:ph idx="1"/>
+          </p:nvPr>
+        </p:nvSpPr>
+        <p:spPr/>
+        <p:txBody>
+          <a:bodyPr/>
+          <a:lstStyle/>
+          <a:p>
+            <a:r>
+              <a:rPr lang="ru-RU" smtClean="0"/>
+              <a:t>Как бы вы реализовали </a:t>
+            </a:r>
+            <a:r>
+              <a:rPr lang="en-US" smtClean="0"/>
+              <a:t>remove_const_t </a:t>
+            </a:r>
+            <a:r>
+              <a:rPr lang="ru-RU" smtClean="0"/>
+              <a:t>и </a:t>
+            </a:r>
+            <a:r>
+              <a:rPr lang="en-US" smtClean="0"/>
+              <a:t>remove_volatile_t?</a:t>
+            </a:r>
+          </a:p>
+          <a:p>
+            <a:r>
+              <a:rPr lang="ru-RU" smtClean="0"/>
+              <a:t>Тогда </a:t>
+            </a:r>
+            <a:r>
+              <a:rPr lang="en-US" smtClean="0"/>
+              <a:t>remove_cv_t </a:t>
+            </a:r>
+            <a:r>
+              <a:rPr lang="ru-RU" smtClean="0"/>
+              <a:t>это очень просто:</a:t>
+            </a:r>
+          </a:p>
+          <a:p>
+            <a:pPr marL="0" indent="0">
+              <a:buNone/>
+            </a:pPr>
+            <a:r>
+              <a:rPr lang="en-US" smtClean="0">
+                <a:latin typeface="Consolas" panose="020B0609020204030204" pitchFamily="49" charset="0"/>
+              </a:rPr>
+              <a:t>template &lt;typename T&gt;</a:t>
+            </a:r>
+            <a:br>
+              <a:rPr lang="en-US" smtClean="0">
+                <a:latin typeface="Consolas" panose="020B0609020204030204" pitchFamily="49" charset="0"/>
+              </a:rPr>
+            </a:br>
+            <a:r>
+              <a:rPr lang="en-US" smtClean="0">
+                <a:latin typeface="Consolas" panose="020B0609020204030204" pitchFamily="49" charset="0"/>
+              </a:rPr>
+              <a:t>using remove_cv_t =</a:t>
+            </a:r>
+            <a:r>
+              <a:rPr lang="ru-RU" smtClean="0">
+                <a:latin typeface="Consolas" panose="020B0609020204030204" pitchFamily="49" charset="0"/>
+              </a:rPr>
+              <a:t> </a:t>
+            </a:r>
+            <a:r>
+              <a:rPr lang="en-US" smtClean="0">
+                <a:latin typeface="Consolas" panose="020B0609020204030204" pitchFamily="49" charset="0"/>
+              </a:rPr>
+              <a:t/>
+            </a:r>
+            <a:br>
+              <a:rPr lang="en-US" smtClean="0">
+                <a:latin typeface="Consolas" panose="020B0609020204030204" pitchFamily="49" charset="0"/>
+              </a:rPr>
+            </a:br>
+            <a:r>
+              <a:rPr lang="en-US" smtClean="0">
+                <a:latin typeface="Consolas" panose="020B0609020204030204" pitchFamily="49" charset="0"/>
+              </a:rPr>
+              <a:t>  remove_const_t &lt; remove_volatile_t &lt;T&gt; &gt;;</a:t>
+            </a:r>
+          </a:p>
+          <a:p>
+            <a:endParaRPr lang="en-US"/>
+          </a:p>
+        </p:txBody>
+      </p:sp>
+    </p:spTree>
+    <p:extLst>
+      <p:ext uri="{BB962C8B-B14F-4D97-AF65-F5344CB8AC3E}">
+        <p14:creationId xmlns:p14="http://schemas.microsoft.com/office/powerpoint/2010/main" val="459582295"/>
+      </p:ext>
+    </p:extLst>
+  </p:cSld>
+  <p:clrMapOvr>
+    <a:masterClrMapping/>
+  </p:clrMapOvr>
+</p:sld>
+</file>
+
+<file path=ppt/slides/slide25.xml><?xml version="1.0" encoding="utf-8"?>
+<p:sld xmlns:a="http://schemas.openxmlformats.org/drawingml/2006/main" xmlns:r="http://schemas.openxmlformats.org/officeDocument/2006/relationships" xmlns:p="http://schemas.openxmlformats.org/presentationml/2006/main">
+  <p:cSld>
+    <p:spTree>
+      <p:nvGrpSpPr>
+        <p:cNvPr id="1" name=""/>
+        <p:cNvGrpSpPr/>
+        <p:nvPr/>
+      </p:nvGrpSpPr>
+      <p:grpSpPr>
+        <a:xfrm>
+          <a:off x="0" y="0"/>
+          <a:ext cx="0" cy="0"/>
+          <a:chOff x="0" y="0"/>
+          <a:chExt cx="0" cy="0"/>
+        </a:xfrm>
+      </p:grpSpPr>
+      <p:sp>
+        <p:nvSpPr>
+          <p:cNvPr id="2" name="Title 1"/>
+          <p:cNvSpPr>
+            <a:spLocks noGrp="1"/>
+          </p:cNvSpPr>
+          <p:nvPr>
+            <p:ph type="title"/>
+          </p:nvPr>
+        </p:nvSpPr>
+        <p:spPr/>
+        <p:txBody>
+          <a:bodyPr/>
+          <a:lstStyle/>
+          <a:p>
+            <a:r>
+              <a:rPr lang="ru-RU" smtClean="0"/>
+              <a:t>идея для решения</a:t>
+            </a:r>
+            <a:endParaRPr lang="en-US"/>
+          </a:p>
+        </p:txBody>
+      </p:sp>
+      <p:sp>
+        <p:nvSpPr>
+          <p:cNvPr id="3" name="Content Placeholder 2"/>
+          <p:cNvSpPr>
+            <a:spLocks noGrp="1"/>
+          </p:cNvSpPr>
+          <p:nvPr>
+            <p:ph idx="1"/>
+          </p:nvPr>
+        </p:nvSpPr>
+        <p:spPr/>
+        <p:txBody>
+          <a:bodyPr/>
+          <a:lstStyle/>
+          <a:p>
+            <a:pPr marL="0" indent="0">
+              <a:buNone/>
+            </a:pPr>
+            <a:r>
+              <a:rPr lang="en-US">
+                <a:latin typeface="Consolas" panose="020B0609020204030204" pitchFamily="49" charset="0"/>
+              </a:rPr>
+              <a:t>template &lt;typename T&gt; </a:t>
+            </a:r>
+            <a:r>
+              <a:rPr lang="en-US" smtClean="0">
+                <a:latin typeface="Consolas" panose="020B0609020204030204" pitchFamily="49" charset="0"/>
+              </a:rPr>
+              <a:t/>
+            </a:r>
+            <a:br>
+              <a:rPr lang="en-US" smtClean="0">
+                <a:latin typeface="Consolas" panose="020B0609020204030204" pitchFamily="49" charset="0"/>
+              </a:rPr>
+            </a:br>
+            <a:r>
+              <a:rPr lang="en-US" smtClean="0">
+                <a:latin typeface="Consolas" panose="020B0609020204030204" pitchFamily="49" charset="0"/>
+              </a:rPr>
+              <a:t>struct </a:t>
+            </a:r>
+            <a:r>
+              <a:rPr lang="en-US">
+                <a:latin typeface="Consolas" panose="020B0609020204030204" pitchFamily="49" charset="0"/>
+              </a:rPr>
+              <a:t>remove_const { typedef T type; </a:t>
+            </a:r>
+            <a:r>
+              <a:rPr lang="en-US" smtClean="0">
+                <a:latin typeface="Consolas" panose="020B0609020204030204" pitchFamily="49" charset="0"/>
+              </a:rPr>
+              <a:t>};</a:t>
+            </a:r>
+          </a:p>
+          <a:p>
+            <a:pPr marL="0" indent="0">
+              <a:buNone/>
+            </a:pPr>
+            <a:r>
+              <a:rPr lang="en-US" smtClean="0">
+                <a:latin typeface="Consolas" panose="020B0609020204030204" pitchFamily="49" charset="0"/>
+              </a:rPr>
+              <a:t>template </a:t>
+            </a:r>
+            <a:r>
+              <a:rPr lang="en-US">
+                <a:latin typeface="Consolas" panose="020B0609020204030204" pitchFamily="49" charset="0"/>
+              </a:rPr>
+              <a:t>&lt;typename T&gt; </a:t>
+            </a:r>
+            <a:r>
+              <a:rPr lang="en-US" smtClean="0">
+                <a:latin typeface="Consolas" panose="020B0609020204030204" pitchFamily="49" charset="0"/>
+              </a:rPr>
+              <a:t/>
+            </a:r>
+            <a:br>
+              <a:rPr lang="en-US" smtClean="0">
+                <a:latin typeface="Consolas" panose="020B0609020204030204" pitchFamily="49" charset="0"/>
+              </a:rPr>
+            </a:br>
+            <a:r>
+              <a:rPr lang="en-US" smtClean="0">
+                <a:latin typeface="Consolas" panose="020B0609020204030204" pitchFamily="49" charset="0"/>
+              </a:rPr>
+              <a:t>struct </a:t>
+            </a:r>
+            <a:r>
+              <a:rPr lang="en-US">
+                <a:latin typeface="Consolas" panose="020B0609020204030204" pitchFamily="49" charset="0"/>
+              </a:rPr>
+              <a:t>remove_const&lt;const T&gt; { typedef T type; </a:t>
+            </a:r>
+            <a:r>
+              <a:rPr lang="en-US" smtClean="0">
+                <a:latin typeface="Consolas" panose="020B0609020204030204" pitchFamily="49" charset="0"/>
+              </a:rPr>
+              <a:t>};</a:t>
+            </a:r>
+          </a:p>
+          <a:p>
+            <a:pPr marL="0" indent="0">
+              <a:buNone/>
+            </a:pPr>
+            <a:r>
+              <a:rPr lang="en-US" smtClean="0">
+                <a:latin typeface="Consolas" panose="020B0609020204030204" pitchFamily="49" charset="0"/>
+              </a:rPr>
+              <a:t>template &lt;typename T&gt;</a:t>
+            </a:r>
+            <a:br>
+              <a:rPr lang="en-US" smtClean="0">
+                <a:latin typeface="Consolas" panose="020B0609020204030204" pitchFamily="49" charset="0"/>
+              </a:rPr>
+            </a:br>
+            <a:r>
+              <a:rPr lang="en-US" smtClean="0">
+                <a:latin typeface="Consolas" panose="020B0609020204030204" pitchFamily="49" charset="0"/>
+              </a:rPr>
+              <a:t>using remove_const_t = typename remove_const&lt;T&gt;::type;</a:t>
+            </a:r>
+            <a:endParaRPr lang="en-US">
+              <a:latin typeface="Consolas" panose="020B0609020204030204" pitchFamily="49" charset="0"/>
+            </a:endParaRPr>
+          </a:p>
+        </p:txBody>
+      </p:sp>
+    </p:spTree>
+    <p:extLst>
+      <p:ext uri="{BB962C8B-B14F-4D97-AF65-F5344CB8AC3E}">
+        <p14:creationId xmlns:p14="http://schemas.microsoft.com/office/powerpoint/2010/main" val="2718628760"/>
+      </p:ext>
+    </p:extLst>
+  </p:cSld>
+  <p:clrMapOvr>
+    <a:masterClrMapping/>
+  </p:clrMapOvr>
+</p:sld>
+</file>
+
+<file path=ppt/slides/slide26.xml><?xml version="1.0" encoding="utf-8"?>
+<p:sld xmlns:a="http://schemas.openxmlformats.org/drawingml/2006/main" xmlns:r="http://schemas.openxmlformats.org/officeDocument/2006/relationships" xmlns:p="http://schemas.openxmlformats.org/presentationml/2006/main">
+  <p:cSld>
+    <p:spTree>
+      <p:nvGrpSpPr>
+        <p:cNvPr id="1" name=""/>
+        <p:cNvGrpSpPr/>
+        <p:nvPr/>
+      </p:nvGrpSpPr>
+      <p:grpSpPr>
+        <a:xfrm>
+          <a:off x="0" y="0"/>
+          <a:ext cx="0" cy="0"/>
+          <a:chOff x="0" y="0"/>
+          <a:chExt cx="0" cy="0"/>
+        </a:xfrm>
+      </p:grpSpPr>
+      <p:sp>
+        <p:nvSpPr>
+          <p:cNvPr id="2" name="Title 1"/>
+          <p:cNvSpPr>
+            <a:spLocks noGrp="1"/>
+          </p:cNvSpPr>
+          <p:nvPr>
+            <p:ph type="title"/>
+          </p:nvPr>
+        </p:nvSpPr>
+        <p:spPr/>
+        <p:txBody>
+          <a:bodyPr/>
+          <a:lstStyle/>
+          <a:p>
+            <a:r>
+              <a:rPr lang="ru-RU" smtClean="0"/>
+              <a:t>домашняя наработка</a:t>
+            </a:r>
+            <a:endParaRPr lang="en-US"/>
+          </a:p>
+        </p:txBody>
+      </p:sp>
+      <p:sp>
+        <p:nvSpPr>
+          <p:cNvPr id="3" name="Content Placeholder 2"/>
+          <p:cNvSpPr>
+            <a:spLocks noGrp="1"/>
+          </p:cNvSpPr>
+          <p:nvPr>
+            <p:ph idx="1"/>
+          </p:nvPr>
+        </p:nvSpPr>
+        <p:spPr/>
+        <p:txBody>
+          <a:bodyPr/>
+          <a:lstStyle/>
+          <a:p>
+            <a:r>
+              <a:rPr lang="ru-RU" smtClean="0"/>
+              <a:t>Доделать и проверить решение для </a:t>
+            </a:r>
+            <a:r>
+              <a:rPr lang="en-US" smtClean="0"/>
+              <a:t>is_pointer</a:t>
+            </a:r>
+            <a:endParaRPr lang="en-US"/>
+          </a:p>
+        </p:txBody>
+      </p:sp>
+    </p:spTree>
+    <p:extLst>
+      <p:ext uri="{BB962C8B-B14F-4D97-AF65-F5344CB8AC3E}">
+        <p14:creationId xmlns:p14="http://schemas.microsoft.com/office/powerpoint/2010/main" val="3860602077"/>
+      </p:ext>
+    </p:extLst>
+  </p:cSld>
+  <p:clrMapOvr>
+    <a:masterClrMapping/>
+  </p:clrMapOvr>
+</p:sld>
+</file>
+
+<file path=ppt/slides/slide27.xml><?xml version="1.0" encoding="utf-8"?>
+<p:sld xmlns:a="http://schemas.openxmlformats.org/drawingml/2006/main" xmlns:r="http://schemas.openxmlformats.org/officeDocument/2006/relationships" xmlns:p="http://schemas.openxmlformats.org/presentationml/2006/main">
+  <p:cSld>
+    <p:spTree>
+      <p:nvGrpSpPr>
+        <p:cNvPr id="1" name=""/>
+        <p:cNvGrpSpPr/>
+        <p:nvPr/>
+      </p:nvGrpSpPr>
+      <p:grpSpPr>
+        <a:xfrm>
+          <a:off x="0" y="0"/>
+          <a:ext cx="0" cy="0"/>
+          <a:chOff x="0" y="0"/>
+          <a:chExt cx="0" cy="0"/>
+        </a:xfrm>
+      </p:grpSpPr>
+      <p:sp>
+        <p:nvSpPr>
+          <p:cNvPr id="2" name="Title 1"/>
+          <p:cNvSpPr>
+            <a:spLocks noGrp="1"/>
+          </p:cNvSpPr>
+          <p:nvPr>
+            <p:ph type="title"/>
+          </p:nvPr>
+        </p:nvSpPr>
+        <p:spPr/>
+        <p:txBody>
+          <a:bodyPr/>
+          <a:lstStyle/>
+          <a:p>
+            <a:r>
+              <a:rPr lang="ru-RU" smtClean="0"/>
+              <a:t>Фундаментальные категории</a:t>
+            </a:r>
+            <a:endParaRPr lang="en-US"/>
+          </a:p>
+        </p:txBody>
+      </p:sp>
+      <p:sp>
+        <p:nvSpPr>
+          <p:cNvPr id="3" name="Content Placeholder 2"/>
+          <p:cNvSpPr>
+            <a:spLocks noGrp="1"/>
+          </p:cNvSpPr>
+          <p:nvPr>
+            <p:ph sz="half" idx="1"/>
+          </p:nvPr>
+        </p:nvSpPr>
+        <p:spPr/>
+        <p:txBody>
+          <a:bodyPr>
+            <a:noAutofit/>
+          </a:bodyPr>
+          <a:lstStyle/>
+          <a:p>
+            <a:pPr marL="0" indent="0">
+              <a:buNone/>
+            </a:pPr>
+            <a:r>
+              <a:rPr lang="en-US" sz="1400">
+                <a:latin typeface="Consolas" panose="020B0609020204030204" pitchFamily="49" charset="0"/>
+              </a:rPr>
+              <a:t>template &lt;class T&gt; struct is_void;</a:t>
+            </a:r>
+          </a:p>
+          <a:p>
+            <a:pPr marL="0" indent="0">
+              <a:buNone/>
+            </a:pPr>
+            <a:r>
+              <a:rPr lang="en-US" sz="1400">
+                <a:latin typeface="Consolas" panose="020B0609020204030204" pitchFamily="49" charset="0"/>
+              </a:rPr>
+              <a:t>template &lt;class T&gt; struct is_null_pointer;</a:t>
+            </a:r>
+          </a:p>
+          <a:p>
+            <a:pPr marL="0" indent="0">
+              <a:buNone/>
+            </a:pPr>
+            <a:r>
+              <a:rPr lang="en-US" sz="1400">
+                <a:latin typeface="Consolas" panose="020B0609020204030204" pitchFamily="49" charset="0"/>
+              </a:rPr>
+              <a:t>template &lt;class T&gt; struct is_integral;</a:t>
+            </a:r>
+          </a:p>
+          <a:p>
+            <a:pPr marL="0" indent="0">
+              <a:buNone/>
+            </a:pPr>
+            <a:r>
+              <a:rPr lang="en-US" sz="1400">
+                <a:latin typeface="Consolas" panose="020B0609020204030204" pitchFamily="49" charset="0"/>
+              </a:rPr>
+              <a:t>template &lt;class T&gt; struct is_floating_point;</a:t>
+            </a:r>
+          </a:p>
+          <a:p>
+            <a:pPr marL="0" indent="0">
+              <a:buNone/>
+            </a:pPr>
+            <a:r>
+              <a:rPr lang="en-US" sz="1400">
+                <a:latin typeface="Consolas" panose="020B0609020204030204" pitchFamily="49" charset="0"/>
+              </a:rPr>
+              <a:t>template &lt;class T&gt; struct is_array;</a:t>
+            </a:r>
+          </a:p>
+          <a:p>
+            <a:pPr marL="0" indent="0">
+              <a:buNone/>
+            </a:pPr>
+            <a:r>
+              <a:rPr lang="en-US" sz="1400">
+                <a:latin typeface="Consolas" panose="020B0609020204030204" pitchFamily="49" charset="0"/>
+              </a:rPr>
+              <a:t>template &lt;class T&gt; struct is_pointer;</a:t>
+            </a:r>
+          </a:p>
+          <a:p>
+            <a:pPr marL="0" indent="0">
+              <a:buNone/>
+            </a:pPr>
+            <a:r>
+              <a:rPr lang="en-US" sz="1400">
+                <a:latin typeface="Consolas" panose="020B0609020204030204" pitchFamily="49" charset="0"/>
+              </a:rPr>
+              <a:t>template &lt;class T&gt; struct is_lvalue_reference</a:t>
+            </a:r>
+            <a:r>
+              <a:rPr lang="en-US" sz="1400" smtClean="0">
+                <a:latin typeface="Consolas" panose="020B0609020204030204" pitchFamily="49" charset="0"/>
+              </a:rPr>
+              <a:t>;</a:t>
+            </a:r>
+            <a:endParaRPr lang="en-US" sz="1400">
+              <a:latin typeface="Consolas" panose="020B0609020204030204" pitchFamily="49" charset="0"/>
+            </a:endParaRPr>
+          </a:p>
+        </p:txBody>
+      </p:sp>
+      <p:sp>
+        <p:nvSpPr>
+          <p:cNvPr id="5" name="Content Placeholder 4"/>
+          <p:cNvSpPr>
+            <a:spLocks noGrp="1"/>
+          </p:cNvSpPr>
+          <p:nvPr>
+            <p:ph sz="half" idx="2"/>
+          </p:nvPr>
+        </p:nvSpPr>
+        <p:spPr>
+          <a:xfrm>
+            <a:off x="5923007" y="2249486"/>
+            <a:ext cx="5585252" cy="3541714"/>
+          </a:xfrm>
+        </p:spPr>
+        <p:txBody>
+          <a:bodyPr>
+            <a:noAutofit/>
+          </a:bodyPr>
+          <a:lstStyle/>
+          <a:p>
+            <a:pPr marL="0" indent="0">
+              <a:buNone/>
+            </a:pPr>
+            <a:r>
+              <a:rPr lang="en-US" sz="1400">
+                <a:latin typeface="Consolas" panose="020B0609020204030204" pitchFamily="49" charset="0"/>
+              </a:rPr>
+              <a:t>template &lt;class T&gt; struct is_rvalue_reference;</a:t>
+            </a:r>
+          </a:p>
+          <a:p>
+            <a:pPr marL="0" indent="0">
+              <a:buNone/>
+            </a:pPr>
+            <a:r>
+              <a:rPr lang="en-US" sz="1400">
+                <a:latin typeface="Consolas" panose="020B0609020204030204" pitchFamily="49" charset="0"/>
+              </a:rPr>
+              <a:t>template &lt;class T&gt; struct is_member_object_pointer;</a:t>
+            </a:r>
+          </a:p>
+          <a:p>
+            <a:pPr marL="0" indent="0">
+              <a:buNone/>
+            </a:pPr>
+            <a:r>
+              <a:rPr lang="en-US" sz="1400">
+                <a:latin typeface="Consolas" panose="020B0609020204030204" pitchFamily="49" charset="0"/>
+              </a:rPr>
+              <a:t>template &lt;class T&gt; struct is_member_function_pointer;</a:t>
+            </a:r>
+          </a:p>
+          <a:p>
+            <a:pPr marL="0" indent="0">
+              <a:buNone/>
+            </a:pPr>
+            <a:r>
+              <a:rPr lang="en-US" sz="1400">
+                <a:latin typeface="Consolas" panose="020B0609020204030204" pitchFamily="49" charset="0"/>
+              </a:rPr>
+              <a:t>template &lt;class T&gt; struct is_enum;</a:t>
+            </a:r>
+          </a:p>
+          <a:p>
+            <a:pPr marL="0" indent="0">
+              <a:buNone/>
+            </a:pPr>
+            <a:r>
+              <a:rPr lang="en-US" sz="1400">
+                <a:latin typeface="Consolas" panose="020B0609020204030204" pitchFamily="49" charset="0"/>
+              </a:rPr>
+              <a:t>template &lt;class T&gt; struct is_union;</a:t>
+            </a:r>
+          </a:p>
+          <a:p>
+            <a:pPr marL="0" indent="0">
+              <a:buNone/>
+            </a:pPr>
+            <a:r>
+              <a:rPr lang="en-US" sz="1400">
+                <a:latin typeface="Consolas" panose="020B0609020204030204" pitchFamily="49" charset="0"/>
+              </a:rPr>
+              <a:t>template &lt;class T&gt; struct is_class;</a:t>
+            </a:r>
+          </a:p>
+          <a:p>
+            <a:pPr marL="0" indent="0">
+              <a:buNone/>
+            </a:pPr>
+            <a:r>
+              <a:rPr lang="en-US" sz="1400">
+                <a:latin typeface="Consolas" panose="020B0609020204030204" pitchFamily="49" charset="0"/>
+              </a:rPr>
+              <a:t>template &lt;class T&gt; struct is_function</a:t>
+            </a:r>
+            <a:r>
+              <a:rPr lang="en-US" sz="1400" smtClean="0">
+                <a:latin typeface="Consolas" panose="020B0609020204030204" pitchFamily="49" charset="0"/>
+              </a:rPr>
+              <a:t>;</a:t>
+            </a:r>
+            <a:endParaRPr lang="en-US" sz="1400">
+              <a:latin typeface="Consolas" panose="020B0609020204030204" pitchFamily="49" charset="0"/>
+            </a:endParaRPr>
+          </a:p>
+        </p:txBody>
+      </p:sp>
+    </p:spTree>
+    <p:extLst>
+      <p:ext uri="{BB962C8B-B14F-4D97-AF65-F5344CB8AC3E}">
+        <p14:creationId xmlns:p14="http://schemas.microsoft.com/office/powerpoint/2010/main" val="247556502"/>
+      </p:ext>
+    </p:extLst>
+  </p:cSld>
+  <p:clrMapOvr>
+    <a:masterClrMapping/>
+  </p:clrMapOvr>
+</p:sld>
+</file>
+
+<file path=ppt/slides/slide28.xml><?xml version="1.0" encoding="utf-8"?>
+<p:sld xmlns:a="http://schemas.openxmlformats.org/drawingml/2006/main" xmlns:r="http://schemas.openxmlformats.org/officeDocument/2006/relationships" xmlns:p="http://schemas.openxmlformats.org/presentationml/2006/main">
+  <p:cSld>
+    <p:spTree>
+      <p:nvGrpSpPr>
+        <p:cNvPr id="1" name=""/>
+        <p:cNvGrpSpPr/>
+        <p:nvPr/>
+      </p:nvGrpSpPr>
+      <p:grpSpPr>
+        <a:xfrm>
+          <a:off x="0" y="0"/>
+          <a:ext cx="0" cy="0"/>
+          <a:chOff x="0" y="0"/>
+          <a:chExt cx="0" cy="0"/>
+        </a:xfrm>
+      </p:grpSpPr>
+      <p:sp>
+        <p:nvSpPr>
+          <p:cNvPr id="5" name="Title 4"/>
+          <p:cNvSpPr>
+            <a:spLocks noGrp="1"/>
+          </p:cNvSpPr>
+          <p:nvPr>
+            <p:ph type="title"/>
+          </p:nvPr>
+        </p:nvSpPr>
+        <p:spPr/>
+        <p:txBody>
+          <a:bodyPr/>
+          <a:lstStyle/>
+          <a:p>
+            <a:r>
+              <a:rPr lang="ru-RU" smtClean="0"/>
+              <a:t>Комбинированные определители</a:t>
+            </a:r>
+            <a:endParaRPr lang="en-US"/>
+          </a:p>
+        </p:txBody>
+      </p:sp>
+      <p:sp>
+        <p:nvSpPr>
+          <p:cNvPr id="6" name="Content Placeholder 5"/>
+          <p:cNvSpPr>
+            <a:spLocks noGrp="1"/>
+          </p:cNvSpPr>
+          <p:nvPr>
+            <p:ph idx="1"/>
+          </p:nvPr>
+        </p:nvSpPr>
+        <p:spPr/>
+        <p:txBody>
+          <a:bodyPr/>
+          <a:lstStyle/>
+          <a:p>
+            <a:pPr marL="0" indent="0">
+              <a:buNone/>
+            </a:pPr>
+            <a:r>
+              <a:rPr lang="en-US">
+                <a:latin typeface="Consolas" panose="020B0609020204030204" pitchFamily="49" charset="0"/>
+              </a:rPr>
+              <a:t>template &lt;typename </a:t>
+            </a:r>
+            <a:r>
+              <a:rPr lang="en-US" smtClean="0">
+                <a:latin typeface="Consolas" panose="020B0609020204030204" pitchFamily="49" charset="0"/>
+              </a:rPr>
+              <a:t>T&gt;</a:t>
+            </a:r>
+            <a:r>
+              <a:rPr lang="ru-RU">
+                <a:latin typeface="Consolas" panose="020B0609020204030204" pitchFamily="49" charset="0"/>
+              </a:rPr>
+              <a:t> </a:t>
+            </a:r>
+            <a:r>
+              <a:rPr lang="en-US" smtClean="0">
+                <a:latin typeface="Consolas" panose="020B0609020204030204" pitchFamily="49" charset="0"/>
+              </a:rPr>
+              <a:t>struct </a:t>
+            </a:r>
+            <a:r>
+              <a:rPr lang="en-US">
+                <a:latin typeface="Consolas" panose="020B0609020204030204" pitchFamily="49" charset="0"/>
+              </a:rPr>
+              <a:t>is_arithmetic </a:t>
+            </a:r>
+            <a:r>
+              <a:rPr lang="en-US" smtClean="0">
+                <a:latin typeface="Consolas" panose="020B0609020204030204" pitchFamily="49" charset="0"/>
+              </a:rPr>
+              <a:t>:</a:t>
+            </a:r>
+            <a:r>
+              <a:rPr lang="ru-RU" smtClean="0">
+                <a:latin typeface="Consolas" panose="020B0609020204030204" pitchFamily="49" charset="0"/>
+              </a:rPr>
+              <a:t/>
+            </a:r>
+            <a:br>
+              <a:rPr lang="ru-RU" smtClean="0">
+                <a:latin typeface="Consolas" panose="020B0609020204030204" pitchFamily="49" charset="0"/>
+              </a:rPr>
+            </a:br>
+            <a:r>
+              <a:rPr lang="ru-RU" smtClean="0">
+                <a:latin typeface="Consolas" panose="020B0609020204030204" pitchFamily="49" charset="0"/>
+              </a:rPr>
+              <a:t>    </a:t>
+            </a:r>
+            <a:r>
+              <a:rPr lang="en-US" smtClean="0">
+                <a:latin typeface="Consolas" panose="020B0609020204030204" pitchFamily="49" charset="0"/>
+              </a:rPr>
+              <a:t>integral_constant&lt;bool</a:t>
+            </a:r>
+            <a:r>
+              <a:rPr lang="en-US">
+                <a:latin typeface="Consolas" panose="020B0609020204030204" pitchFamily="49" charset="0"/>
+              </a:rPr>
+              <a:t>,  </a:t>
+            </a:r>
+            <a:r>
+              <a:rPr lang="ru-RU" smtClean="0">
+                <a:latin typeface="Consolas" panose="020B0609020204030204" pitchFamily="49" charset="0"/>
+              </a:rPr>
+              <a:t/>
+            </a:r>
+            <a:br>
+              <a:rPr lang="ru-RU" smtClean="0">
+                <a:latin typeface="Consolas" panose="020B0609020204030204" pitchFamily="49" charset="0"/>
+              </a:rPr>
+            </a:br>
+            <a:r>
+              <a:rPr lang="ru-RU" smtClean="0">
+                <a:latin typeface="Consolas" panose="020B0609020204030204" pitchFamily="49" charset="0"/>
+              </a:rPr>
+              <a:t>        </a:t>
+            </a:r>
+            <a:r>
+              <a:rPr lang="en-US" smtClean="0">
+                <a:latin typeface="Consolas" panose="020B0609020204030204" pitchFamily="49" charset="0"/>
+              </a:rPr>
+              <a:t>is_integral&lt;T</a:t>
+            </a:r>
+            <a:r>
+              <a:rPr lang="en-US">
+                <a:latin typeface="Consolas" panose="020B0609020204030204" pitchFamily="49" charset="0"/>
+              </a:rPr>
+              <a:t>&gt;::value </a:t>
+            </a:r>
+            <a:r>
+              <a:rPr lang="en-US" smtClean="0">
+                <a:latin typeface="Consolas" panose="020B0609020204030204" pitchFamily="49" charset="0"/>
+              </a:rPr>
+              <a:t>||</a:t>
+            </a:r>
+            <a:r>
+              <a:rPr lang="ru-RU" smtClean="0">
+                <a:latin typeface="Consolas" panose="020B0609020204030204" pitchFamily="49" charset="0"/>
+              </a:rPr>
+              <a:t/>
+            </a:r>
+            <a:br>
+              <a:rPr lang="ru-RU" smtClean="0">
+                <a:latin typeface="Consolas" panose="020B0609020204030204" pitchFamily="49" charset="0"/>
+              </a:rPr>
+            </a:br>
+            <a:r>
+              <a:rPr lang="ru-RU" smtClean="0">
+                <a:latin typeface="Consolas" panose="020B0609020204030204" pitchFamily="49" charset="0"/>
+              </a:rPr>
+              <a:t>        </a:t>
+            </a:r>
+            <a:r>
+              <a:rPr lang="en-US" smtClean="0">
+                <a:latin typeface="Consolas" panose="020B0609020204030204" pitchFamily="49" charset="0"/>
+              </a:rPr>
+              <a:t>is_floating_point&lt;T</a:t>
+            </a:r>
+            <a:r>
+              <a:rPr lang="en-US">
+                <a:latin typeface="Consolas" panose="020B0609020204030204" pitchFamily="49" charset="0"/>
+              </a:rPr>
+              <a:t>&gt;::value&gt; </a:t>
+            </a:r>
+            <a:r>
+              <a:rPr lang="en-US" smtClean="0">
+                <a:latin typeface="Consolas" panose="020B0609020204030204" pitchFamily="49" charset="0"/>
+              </a:rPr>
+              <a:t>{};</a:t>
+            </a:r>
+            <a:endParaRPr lang="ru-RU" smtClean="0">
+              <a:latin typeface="Consolas" panose="020B0609020204030204" pitchFamily="49" charset="0"/>
+            </a:endParaRPr>
+          </a:p>
+        </p:txBody>
+      </p:sp>
+    </p:spTree>
+    <p:extLst>
+      <p:ext uri="{BB962C8B-B14F-4D97-AF65-F5344CB8AC3E}">
+        <p14:creationId xmlns:p14="http://schemas.microsoft.com/office/powerpoint/2010/main" val="2203779516"/>
+      </p:ext>
+    </p:extLst>
+  </p:cSld>
+  <p:clrMapOvr>
+    <a:masterClrMapping/>
+  </p:clrMapOvr>
+</p:sld>
+</file>
+
+<file path=ppt/slides/slide29.xml><?xml version="1.0" encoding="utf-8"?>
+<p:sld xmlns:a="http://schemas.openxmlformats.org/drawingml/2006/main" xmlns:r="http://schemas.openxmlformats.org/officeDocument/2006/relationships" xmlns:p="http://schemas.openxmlformats.org/presentationml/2006/main">
+  <p:cSld>
+    <p:spTree>
+      <p:nvGrpSpPr>
+        <p:cNvPr id="1" name=""/>
+        <p:cNvGrpSpPr/>
+        <p:nvPr/>
+      </p:nvGrpSpPr>
+      <p:grpSpPr>
+        <a:xfrm>
+          <a:off x="0" y="0"/>
+          <a:ext cx="0" cy="0"/>
+          <a:chOff x="0" y="0"/>
+          <a:chExt cx="0" cy="0"/>
+        </a:xfrm>
+      </p:grpSpPr>
+      <p:sp>
+        <p:nvSpPr>
+          <p:cNvPr id="5" name="Title 4"/>
+          <p:cNvSpPr>
+            <a:spLocks noGrp="1"/>
+          </p:cNvSpPr>
+          <p:nvPr>
+            <p:ph type="title"/>
+          </p:nvPr>
+        </p:nvSpPr>
+        <p:spPr/>
+        <p:txBody>
+          <a:bodyPr/>
+          <a:lstStyle/>
+          <a:p>
+            <a:r>
+              <a:rPr lang="ru-RU" smtClean="0"/>
+              <a:t>Комбинированные определители</a:t>
+            </a:r>
+            <a:endParaRPr lang="en-US"/>
+          </a:p>
+        </p:txBody>
+      </p:sp>
+      <p:sp>
+        <p:nvSpPr>
+          <p:cNvPr id="6" name="Content Placeholder 5"/>
+          <p:cNvSpPr>
+            <a:spLocks noGrp="1"/>
+          </p:cNvSpPr>
+          <p:nvPr>
+            <p:ph idx="1"/>
+          </p:nvPr>
+        </p:nvSpPr>
+        <p:spPr/>
+        <p:txBody>
+          <a:bodyPr/>
+          <a:lstStyle/>
+          <a:p>
+            <a:pPr marL="0" indent="0">
+              <a:buNone/>
+            </a:pPr>
+            <a:r>
+              <a:rPr lang="en-US">
+                <a:latin typeface="Consolas" panose="020B0609020204030204" pitchFamily="49" charset="0"/>
+              </a:rPr>
+              <a:t>template &lt;typename </a:t>
+            </a:r>
+            <a:r>
+              <a:rPr lang="en-US" smtClean="0">
+                <a:latin typeface="Consolas" panose="020B0609020204030204" pitchFamily="49" charset="0"/>
+              </a:rPr>
+              <a:t>T&gt;</a:t>
+            </a:r>
+            <a:r>
+              <a:rPr lang="ru-RU">
+                <a:latin typeface="Consolas" panose="020B0609020204030204" pitchFamily="49" charset="0"/>
+              </a:rPr>
+              <a:t> </a:t>
+            </a:r>
+            <a:r>
+              <a:rPr lang="en-US" smtClean="0">
+                <a:latin typeface="Consolas" panose="020B0609020204030204" pitchFamily="49" charset="0"/>
+              </a:rPr>
+              <a:t>struct </a:t>
+            </a:r>
+            <a:r>
+              <a:rPr lang="en-US">
+                <a:latin typeface="Consolas" panose="020B0609020204030204" pitchFamily="49" charset="0"/>
+              </a:rPr>
+              <a:t>is_arithmetic </a:t>
+            </a:r>
+            <a:r>
+              <a:rPr lang="en-US" smtClean="0">
+                <a:latin typeface="Consolas" panose="020B0609020204030204" pitchFamily="49" charset="0"/>
+              </a:rPr>
+              <a:t>:</a:t>
+            </a:r>
+            <a:r>
+              <a:rPr lang="ru-RU" smtClean="0">
+                <a:latin typeface="Consolas" panose="020B0609020204030204" pitchFamily="49" charset="0"/>
+              </a:rPr>
+              <a:t/>
+            </a:r>
+            <a:br>
+              <a:rPr lang="ru-RU" smtClean="0">
+                <a:latin typeface="Consolas" panose="020B0609020204030204" pitchFamily="49" charset="0"/>
+              </a:rPr>
+            </a:br>
+            <a:r>
+              <a:rPr lang="ru-RU" smtClean="0">
+                <a:latin typeface="Consolas" panose="020B0609020204030204" pitchFamily="49" charset="0"/>
+              </a:rPr>
+              <a:t>    </a:t>
+            </a:r>
+            <a:r>
+              <a:rPr lang="en-US" smtClean="0">
+                <a:latin typeface="Consolas" panose="020B0609020204030204" pitchFamily="49" charset="0"/>
+              </a:rPr>
+              <a:t>integral_constant&lt;bool</a:t>
+            </a:r>
+            <a:r>
+              <a:rPr lang="en-US">
+                <a:latin typeface="Consolas" panose="020B0609020204030204" pitchFamily="49" charset="0"/>
+              </a:rPr>
+              <a:t>,  </a:t>
+            </a:r>
+            <a:r>
+              <a:rPr lang="ru-RU" smtClean="0">
+                <a:latin typeface="Consolas" panose="020B0609020204030204" pitchFamily="49" charset="0"/>
+              </a:rPr>
+              <a:t/>
+            </a:r>
+            <a:br>
+              <a:rPr lang="ru-RU" smtClean="0">
+                <a:latin typeface="Consolas" panose="020B0609020204030204" pitchFamily="49" charset="0"/>
+              </a:rPr>
+            </a:br>
+            <a:r>
+              <a:rPr lang="ru-RU" smtClean="0">
+                <a:latin typeface="Consolas" panose="020B0609020204030204" pitchFamily="49" charset="0"/>
+              </a:rPr>
+              <a:t>        </a:t>
+            </a:r>
+            <a:r>
+              <a:rPr lang="en-US" smtClean="0">
+                <a:latin typeface="Consolas" panose="020B0609020204030204" pitchFamily="49" charset="0"/>
+              </a:rPr>
+              <a:t>is_integral&lt;T</a:t>
+            </a:r>
+            <a:r>
+              <a:rPr lang="en-US">
+                <a:latin typeface="Consolas" panose="020B0609020204030204" pitchFamily="49" charset="0"/>
+              </a:rPr>
+              <a:t>&gt;::value </a:t>
+            </a:r>
+            <a:r>
+              <a:rPr lang="en-US" smtClean="0">
+                <a:latin typeface="Consolas" panose="020B0609020204030204" pitchFamily="49" charset="0"/>
+              </a:rPr>
+              <a:t>||</a:t>
+            </a:r>
+            <a:r>
+              <a:rPr lang="ru-RU" smtClean="0">
+                <a:latin typeface="Consolas" panose="020B0609020204030204" pitchFamily="49" charset="0"/>
+              </a:rPr>
+              <a:t/>
+            </a:r>
+            <a:br>
+              <a:rPr lang="ru-RU" smtClean="0">
+                <a:latin typeface="Consolas" panose="020B0609020204030204" pitchFamily="49" charset="0"/>
+              </a:rPr>
+            </a:br>
+            <a:r>
+              <a:rPr lang="ru-RU" smtClean="0">
+                <a:latin typeface="Consolas" panose="020B0609020204030204" pitchFamily="49" charset="0"/>
+              </a:rPr>
+              <a:t>        </a:t>
+            </a:r>
+            <a:r>
+              <a:rPr lang="en-US" smtClean="0">
+                <a:latin typeface="Consolas" panose="020B0609020204030204" pitchFamily="49" charset="0"/>
+              </a:rPr>
+              <a:t>is_floating_point&lt;T</a:t>
+            </a:r>
+            <a:r>
+              <a:rPr lang="en-US">
+                <a:latin typeface="Consolas" panose="020B0609020204030204" pitchFamily="49" charset="0"/>
+              </a:rPr>
+              <a:t>&gt;::value&gt; </a:t>
+            </a:r>
+            <a:r>
+              <a:rPr lang="en-US" smtClean="0">
+                <a:latin typeface="Consolas" panose="020B0609020204030204" pitchFamily="49" charset="0"/>
+              </a:rPr>
+              <a:t>{};</a:t>
+            </a:r>
+            <a:endParaRPr lang="ru-RU" smtClean="0">
+              <a:latin typeface="Consolas" panose="020B0609020204030204" pitchFamily="49" charset="0"/>
+            </a:endParaRPr>
+          </a:p>
+          <a:p>
+            <a:r>
+              <a:rPr lang="ru-RU" smtClean="0"/>
+              <a:t>Можно ли имеющимися средствами сделать разумный синоним </a:t>
+            </a:r>
+            <a:r>
+              <a:rPr lang="en-US" smtClean="0">
+                <a:latin typeface="Consolas" panose="020B0609020204030204" pitchFamily="49" charset="0"/>
+              </a:rPr>
+              <a:t>is_integral</a:t>
+            </a:r>
+            <a:r>
+              <a:rPr lang="ru-RU" smtClean="0">
+                <a:latin typeface="Consolas" panose="020B0609020204030204" pitchFamily="49" charset="0"/>
+              </a:rPr>
+              <a:t>_</a:t>
+            </a:r>
+            <a:r>
+              <a:rPr lang="en-US" smtClean="0">
+                <a:latin typeface="Consolas" panose="020B0609020204030204" pitchFamily="49" charset="0"/>
+              </a:rPr>
+              <a:t>v&lt;T&gt; </a:t>
+            </a:r>
+            <a:r>
+              <a:rPr lang="ru-RU" smtClean="0">
+                <a:latin typeface="Consolas" panose="020B0609020204030204" pitchFamily="49" charset="0"/>
+              </a:rPr>
+              <a:t>вместо </a:t>
+            </a:r>
+            <a:r>
+              <a:rPr lang="en-US">
+                <a:latin typeface="Consolas" panose="020B0609020204030204" pitchFamily="49" charset="0"/>
+              </a:rPr>
+              <a:t>is_integral&lt;T&gt;::</a:t>
+            </a:r>
+            <a:r>
+              <a:rPr lang="en-US" smtClean="0">
+                <a:latin typeface="Consolas" panose="020B0609020204030204" pitchFamily="49" charset="0"/>
+              </a:rPr>
+              <a:t>value</a:t>
+            </a:r>
+            <a:r>
+              <a:rPr lang="en-US">
+                <a:latin typeface="Consolas" panose="020B0609020204030204" pitchFamily="49" charset="0"/>
+              </a:rPr>
+              <a:t>?</a:t>
+            </a:r>
+            <a:endParaRPr lang="en-US"/>
+          </a:p>
+        </p:txBody>
+      </p:sp>
+    </p:spTree>
+    <p:extLst>
+      <p:ext uri="{BB962C8B-B14F-4D97-AF65-F5344CB8AC3E}">
+        <p14:creationId xmlns:p14="http://schemas.microsoft.com/office/powerpoint/2010/main" val="3130675705"/>
       </p:ext>
     </p:extLst>
   </p:cSld>
@@ -14479,6 +16723,1412 @@
 </p:sld>
 </file>
 
+<file path=ppt/slides/slide30.xml><?xml version="1.0" encoding="utf-8"?>
+<p:sld xmlns:a="http://schemas.openxmlformats.org/drawingml/2006/main" xmlns:r="http://schemas.openxmlformats.org/officeDocument/2006/relationships" xmlns:p="http://schemas.openxmlformats.org/presentationml/2006/main">
+  <p:cSld>
+    <p:spTree>
+      <p:nvGrpSpPr>
+        <p:cNvPr id="1" name=""/>
+        <p:cNvGrpSpPr/>
+        <p:nvPr/>
+      </p:nvGrpSpPr>
+      <p:grpSpPr>
+        <a:xfrm>
+          <a:off x="0" y="0"/>
+          <a:ext cx="0" cy="0"/>
+          <a:chOff x="0" y="0"/>
+          <a:chExt cx="0" cy="0"/>
+        </a:xfrm>
+      </p:grpSpPr>
+      <p:sp>
+        <p:nvSpPr>
+          <p:cNvPr id="5" name="Title 4"/>
+          <p:cNvSpPr>
+            <a:spLocks noGrp="1"/>
+          </p:cNvSpPr>
+          <p:nvPr>
+            <p:ph type="title"/>
+          </p:nvPr>
+        </p:nvSpPr>
+        <p:spPr/>
+        <p:txBody>
+          <a:bodyPr/>
+          <a:lstStyle/>
+          <a:p>
+            <a:r>
+              <a:rPr lang="ru-RU" smtClean="0"/>
+              <a:t>Комбинированные определители</a:t>
+            </a:r>
+            <a:endParaRPr lang="en-US"/>
+          </a:p>
+        </p:txBody>
+      </p:sp>
+      <p:sp>
+        <p:nvSpPr>
+          <p:cNvPr id="6" name="Content Placeholder 5"/>
+          <p:cNvSpPr>
+            <a:spLocks noGrp="1"/>
+          </p:cNvSpPr>
+          <p:nvPr>
+            <p:ph idx="1"/>
+          </p:nvPr>
+        </p:nvSpPr>
+        <p:spPr/>
+        <p:txBody>
+          <a:bodyPr/>
+          <a:lstStyle/>
+          <a:p>
+            <a:pPr marL="0" indent="0">
+              <a:buNone/>
+            </a:pPr>
+            <a:r>
+              <a:rPr lang="en-US">
+                <a:latin typeface="Consolas" panose="020B0609020204030204" pitchFamily="49" charset="0"/>
+              </a:rPr>
+              <a:t>template &lt;typename </a:t>
+            </a:r>
+            <a:r>
+              <a:rPr lang="en-US" smtClean="0">
+                <a:latin typeface="Consolas" panose="020B0609020204030204" pitchFamily="49" charset="0"/>
+              </a:rPr>
+              <a:t>T&gt;</a:t>
+            </a:r>
+            <a:r>
+              <a:rPr lang="ru-RU">
+                <a:latin typeface="Consolas" panose="020B0609020204030204" pitchFamily="49" charset="0"/>
+              </a:rPr>
+              <a:t> </a:t>
+            </a:r>
+            <a:r>
+              <a:rPr lang="en-US" smtClean="0">
+                <a:latin typeface="Consolas" panose="020B0609020204030204" pitchFamily="49" charset="0"/>
+              </a:rPr>
+              <a:t>struct </a:t>
+            </a:r>
+            <a:r>
+              <a:rPr lang="en-US">
+                <a:latin typeface="Consolas" panose="020B0609020204030204" pitchFamily="49" charset="0"/>
+              </a:rPr>
+              <a:t>is_arithmetic </a:t>
+            </a:r>
+            <a:r>
+              <a:rPr lang="en-US" smtClean="0">
+                <a:latin typeface="Consolas" panose="020B0609020204030204" pitchFamily="49" charset="0"/>
+              </a:rPr>
+              <a:t>:</a:t>
+            </a:r>
+            <a:r>
+              <a:rPr lang="ru-RU" smtClean="0">
+                <a:latin typeface="Consolas" panose="020B0609020204030204" pitchFamily="49" charset="0"/>
+              </a:rPr>
+              <a:t/>
+            </a:r>
+            <a:br>
+              <a:rPr lang="ru-RU" smtClean="0">
+                <a:latin typeface="Consolas" panose="020B0609020204030204" pitchFamily="49" charset="0"/>
+              </a:rPr>
+            </a:br>
+            <a:r>
+              <a:rPr lang="ru-RU" smtClean="0">
+                <a:latin typeface="Consolas" panose="020B0609020204030204" pitchFamily="49" charset="0"/>
+              </a:rPr>
+              <a:t>    </a:t>
+            </a:r>
+            <a:r>
+              <a:rPr lang="en-US" smtClean="0">
+                <a:latin typeface="Consolas" panose="020B0609020204030204" pitchFamily="49" charset="0"/>
+              </a:rPr>
+              <a:t>integral_constant&lt;bool</a:t>
+            </a:r>
+            <a:r>
+              <a:rPr lang="en-US">
+                <a:latin typeface="Consolas" panose="020B0609020204030204" pitchFamily="49" charset="0"/>
+              </a:rPr>
+              <a:t>,  </a:t>
+            </a:r>
+            <a:r>
+              <a:rPr lang="ru-RU" smtClean="0">
+                <a:latin typeface="Consolas" panose="020B0609020204030204" pitchFamily="49" charset="0"/>
+              </a:rPr>
+              <a:t/>
+            </a:r>
+            <a:br>
+              <a:rPr lang="ru-RU" smtClean="0">
+                <a:latin typeface="Consolas" panose="020B0609020204030204" pitchFamily="49" charset="0"/>
+              </a:rPr>
+            </a:br>
+            <a:r>
+              <a:rPr lang="ru-RU" smtClean="0">
+                <a:latin typeface="Consolas" panose="020B0609020204030204" pitchFamily="49" charset="0"/>
+              </a:rPr>
+              <a:t>        </a:t>
+            </a:r>
+            <a:r>
+              <a:rPr lang="en-US" smtClean="0">
+                <a:latin typeface="Consolas" panose="020B0609020204030204" pitchFamily="49" charset="0"/>
+              </a:rPr>
+              <a:t>is_integral&lt;T</a:t>
+            </a:r>
+            <a:r>
+              <a:rPr lang="en-US">
+                <a:latin typeface="Consolas" panose="020B0609020204030204" pitchFamily="49" charset="0"/>
+              </a:rPr>
+              <a:t>&gt;::value </a:t>
+            </a:r>
+            <a:r>
+              <a:rPr lang="en-US" smtClean="0">
+                <a:latin typeface="Consolas" panose="020B0609020204030204" pitchFamily="49" charset="0"/>
+              </a:rPr>
+              <a:t>||</a:t>
+            </a:r>
+            <a:r>
+              <a:rPr lang="ru-RU" smtClean="0">
+                <a:latin typeface="Consolas" panose="020B0609020204030204" pitchFamily="49" charset="0"/>
+              </a:rPr>
+              <a:t/>
+            </a:r>
+            <a:br>
+              <a:rPr lang="ru-RU" smtClean="0">
+                <a:latin typeface="Consolas" panose="020B0609020204030204" pitchFamily="49" charset="0"/>
+              </a:rPr>
+            </a:br>
+            <a:r>
+              <a:rPr lang="ru-RU" smtClean="0">
+                <a:latin typeface="Consolas" panose="020B0609020204030204" pitchFamily="49" charset="0"/>
+              </a:rPr>
+              <a:t>        </a:t>
+            </a:r>
+            <a:r>
+              <a:rPr lang="en-US" smtClean="0">
+                <a:latin typeface="Consolas" panose="020B0609020204030204" pitchFamily="49" charset="0"/>
+              </a:rPr>
+              <a:t>is_floating_point&lt;T</a:t>
+            </a:r>
+            <a:r>
+              <a:rPr lang="en-US">
+                <a:latin typeface="Consolas" panose="020B0609020204030204" pitchFamily="49" charset="0"/>
+              </a:rPr>
+              <a:t>&gt;::value&gt; </a:t>
+            </a:r>
+            <a:r>
+              <a:rPr lang="en-US" smtClean="0">
+                <a:latin typeface="Consolas" panose="020B0609020204030204" pitchFamily="49" charset="0"/>
+              </a:rPr>
+              <a:t>{};</a:t>
+            </a:r>
+            <a:endParaRPr lang="ru-RU" smtClean="0">
+              <a:latin typeface="Consolas" panose="020B0609020204030204" pitchFamily="49" charset="0"/>
+            </a:endParaRPr>
+          </a:p>
+          <a:p>
+            <a:r>
+              <a:rPr lang="ru-RU" smtClean="0"/>
+              <a:t>Можно ли имеющимися средствами сделать разумный синоним </a:t>
+            </a:r>
+            <a:r>
+              <a:rPr lang="en-US" smtClean="0">
+                <a:latin typeface="Consolas" panose="020B0609020204030204" pitchFamily="49" charset="0"/>
+              </a:rPr>
+              <a:t>is_integral</a:t>
+            </a:r>
+            <a:r>
+              <a:rPr lang="ru-RU" smtClean="0">
+                <a:latin typeface="Consolas" panose="020B0609020204030204" pitchFamily="49" charset="0"/>
+              </a:rPr>
+              <a:t>_</a:t>
+            </a:r>
+            <a:r>
+              <a:rPr lang="en-US" smtClean="0">
+                <a:latin typeface="Consolas" panose="020B0609020204030204" pitchFamily="49" charset="0"/>
+              </a:rPr>
+              <a:t>v&lt;T&gt; </a:t>
+            </a:r>
+            <a:r>
+              <a:rPr lang="ru-RU" smtClean="0">
+                <a:latin typeface="Consolas" panose="020B0609020204030204" pitchFamily="49" charset="0"/>
+              </a:rPr>
+              <a:t>вместо </a:t>
+            </a:r>
+            <a:r>
+              <a:rPr lang="en-US">
+                <a:latin typeface="Consolas" panose="020B0609020204030204" pitchFamily="49" charset="0"/>
+              </a:rPr>
+              <a:t>is_integral&lt;T&gt;::</a:t>
+            </a:r>
+            <a:r>
+              <a:rPr lang="en-US" smtClean="0">
+                <a:latin typeface="Consolas" panose="020B0609020204030204" pitchFamily="49" charset="0"/>
+              </a:rPr>
+              <a:t>value?</a:t>
+            </a:r>
+          </a:p>
+          <a:p>
+            <a:r>
+              <a:rPr lang="ru-RU" smtClean="0">
+                <a:latin typeface="Consolas" panose="020B0609020204030204" pitchFamily="49" charset="0"/>
+              </a:rPr>
+              <a:t>Пока что нет. Но вообще можно (см. лекцию по </a:t>
+            </a:r>
+            <a:r>
+              <a:rPr lang="en-US" smtClean="0">
+                <a:latin typeface="Consolas" panose="020B0609020204030204" pitchFamily="49" charset="0"/>
+              </a:rPr>
+              <a:t>constexpr).</a:t>
+            </a:r>
+            <a:endParaRPr lang="en-US"/>
+          </a:p>
+        </p:txBody>
+      </p:sp>
+    </p:spTree>
+    <p:extLst>
+      <p:ext uri="{BB962C8B-B14F-4D97-AF65-F5344CB8AC3E}">
+        <p14:creationId xmlns:p14="http://schemas.microsoft.com/office/powerpoint/2010/main" val="1532939090"/>
+      </p:ext>
+    </p:extLst>
+  </p:cSld>
+  <p:clrMapOvr>
+    <a:masterClrMapping/>
+  </p:clrMapOvr>
+</p:sld>
+</file>
+
+<file path=ppt/slides/slide31.xml><?xml version="1.0" encoding="utf-8"?>
+<p:sld xmlns:a="http://schemas.openxmlformats.org/drawingml/2006/main" xmlns:r="http://schemas.openxmlformats.org/officeDocument/2006/relationships" xmlns:p="http://schemas.openxmlformats.org/presentationml/2006/main">
+  <p:cSld>
+    <p:spTree>
+      <p:nvGrpSpPr>
+        <p:cNvPr id="1" name=""/>
+        <p:cNvGrpSpPr/>
+        <p:nvPr/>
+      </p:nvGrpSpPr>
+      <p:grpSpPr>
+        <a:xfrm>
+          <a:off x="0" y="0"/>
+          <a:ext cx="0" cy="0"/>
+          <a:chOff x="0" y="0"/>
+          <a:chExt cx="0" cy="0"/>
+        </a:xfrm>
+      </p:grpSpPr>
+      <p:sp>
+        <p:nvSpPr>
+          <p:cNvPr id="2" name="Title 1"/>
+          <p:cNvSpPr>
+            <a:spLocks noGrp="1"/>
+          </p:cNvSpPr>
+          <p:nvPr>
+            <p:ph type="title"/>
+          </p:nvPr>
+        </p:nvSpPr>
+        <p:spPr/>
+        <p:txBody>
+          <a:bodyPr/>
+          <a:lstStyle/>
+          <a:p>
+            <a:r>
+              <a:rPr lang="ru-RU" smtClean="0"/>
+              <a:t>Вариабельные определители</a:t>
+            </a:r>
+            <a:endParaRPr lang="en-US"/>
+          </a:p>
+        </p:txBody>
+      </p:sp>
+      <p:sp>
+        <p:nvSpPr>
+          <p:cNvPr id="3" name="Content Placeholder 2"/>
+          <p:cNvSpPr>
+            <a:spLocks noGrp="1"/>
+          </p:cNvSpPr>
+          <p:nvPr>
+            <p:ph idx="1"/>
+          </p:nvPr>
+        </p:nvSpPr>
+        <p:spPr>
+          <a:xfrm>
+            <a:off x="1141412" y="2249487"/>
+            <a:ext cx="9905999" cy="4184264"/>
+          </a:xfrm>
+        </p:spPr>
+        <p:txBody>
+          <a:bodyPr>
+            <a:noAutofit/>
+          </a:bodyPr>
+          <a:lstStyle/>
+          <a:p>
+            <a:pPr marL="0" indent="0">
+              <a:buNone/>
+            </a:pPr>
+            <a:r>
+              <a:rPr lang="en-US" sz="2000">
+                <a:latin typeface="Consolas" panose="020B0609020204030204" pitchFamily="49" charset="0"/>
+              </a:rPr>
+              <a:t>template&lt;typename T, typename... </a:t>
+            </a:r>
+            <a:r>
+              <a:rPr lang="en-US" sz="2000" smtClean="0">
+                <a:latin typeface="Consolas" panose="020B0609020204030204" pitchFamily="49" charset="0"/>
+              </a:rPr>
+              <a:t>List&gt;</a:t>
+            </a:r>
+            <a:r>
+              <a:rPr lang="ru-RU" sz="2000" smtClean="0">
+                <a:latin typeface="Consolas" panose="020B0609020204030204" pitchFamily="49" charset="0"/>
+              </a:rPr>
+              <a:t/>
+            </a:r>
+            <a:br>
+              <a:rPr lang="ru-RU" sz="2000" smtClean="0">
+                <a:latin typeface="Consolas" panose="020B0609020204030204" pitchFamily="49" charset="0"/>
+              </a:rPr>
+            </a:br>
+            <a:r>
+              <a:rPr lang="en-US" sz="2000" smtClean="0">
+                <a:latin typeface="Consolas" panose="020B0609020204030204" pitchFamily="49" charset="0"/>
+              </a:rPr>
+              <a:t>struct </a:t>
+            </a:r>
+            <a:r>
+              <a:rPr lang="en-US" sz="2000">
+                <a:latin typeface="Consolas" panose="020B0609020204030204" pitchFamily="49" charset="0"/>
+              </a:rPr>
+              <a:t>is_one_of</a:t>
+            </a:r>
+            <a:r>
+              <a:rPr lang="en-US" sz="2000" smtClean="0">
+                <a:latin typeface="Consolas" panose="020B0609020204030204" pitchFamily="49" charset="0"/>
+              </a:rPr>
+              <a:t>;</a:t>
+            </a:r>
+            <a:endParaRPr lang="ru-RU" sz="2000" smtClean="0">
+              <a:latin typeface="Consolas" panose="020B0609020204030204" pitchFamily="49" charset="0"/>
+            </a:endParaRPr>
+          </a:p>
+          <a:p>
+            <a:pPr marL="0" indent="0">
+              <a:buNone/>
+            </a:pPr>
+            <a:r>
+              <a:rPr lang="en-US" sz="2000" smtClean="0">
+                <a:latin typeface="Consolas" panose="020B0609020204030204" pitchFamily="49" charset="0"/>
+              </a:rPr>
+              <a:t>template&lt;typename </a:t>
+            </a:r>
+            <a:r>
+              <a:rPr lang="en-US" sz="2000">
+                <a:latin typeface="Consolas" panose="020B0609020204030204" pitchFamily="49" charset="0"/>
+              </a:rPr>
+              <a:t>T</a:t>
+            </a:r>
+            <a:r>
+              <a:rPr lang="en-US" sz="2000" smtClean="0">
+                <a:latin typeface="Consolas" panose="020B0609020204030204" pitchFamily="49" charset="0"/>
+              </a:rPr>
+              <a:t>&gt;</a:t>
+            </a:r>
+            <a:r>
+              <a:rPr lang="ru-RU" sz="2000" smtClean="0">
+                <a:latin typeface="Consolas" panose="020B0609020204030204" pitchFamily="49" charset="0"/>
+              </a:rPr>
+              <a:t/>
+            </a:r>
+            <a:br>
+              <a:rPr lang="ru-RU" sz="2000" smtClean="0">
+                <a:latin typeface="Consolas" panose="020B0609020204030204" pitchFamily="49" charset="0"/>
+              </a:rPr>
+            </a:br>
+            <a:r>
+              <a:rPr lang="en-US" sz="2000" smtClean="0">
+                <a:latin typeface="Consolas" panose="020B0609020204030204" pitchFamily="49" charset="0"/>
+              </a:rPr>
+              <a:t>struct </a:t>
+            </a:r>
+            <a:r>
+              <a:rPr lang="en-US" sz="2000">
+                <a:latin typeface="Consolas" panose="020B0609020204030204" pitchFamily="49" charset="0"/>
+              </a:rPr>
+              <a:t>is_one_of&lt;T&gt; : false_type </a:t>
+            </a:r>
+            <a:r>
+              <a:rPr lang="en-US" sz="2000" smtClean="0">
+                <a:latin typeface="Consolas" panose="020B0609020204030204" pitchFamily="49" charset="0"/>
+              </a:rPr>
+              <a:t>{};</a:t>
+            </a:r>
+            <a:endParaRPr lang="ru-RU" sz="2000" smtClean="0">
+              <a:latin typeface="Consolas" panose="020B0609020204030204" pitchFamily="49" charset="0"/>
+            </a:endParaRPr>
+          </a:p>
+          <a:p>
+            <a:pPr marL="0" indent="0">
+              <a:buNone/>
+            </a:pPr>
+            <a:r>
+              <a:rPr lang="en-US" sz="2000" smtClean="0">
+                <a:latin typeface="Consolas" panose="020B0609020204030204" pitchFamily="49" charset="0"/>
+              </a:rPr>
+              <a:t>template&lt;typename </a:t>
+            </a:r>
+            <a:r>
+              <a:rPr lang="en-US" sz="2000">
+                <a:latin typeface="Consolas" panose="020B0609020204030204" pitchFamily="49" charset="0"/>
+              </a:rPr>
+              <a:t>T, typename... Tail</a:t>
+            </a:r>
+            <a:r>
+              <a:rPr lang="en-US" sz="2000" smtClean="0">
+                <a:latin typeface="Consolas" panose="020B0609020204030204" pitchFamily="49" charset="0"/>
+              </a:rPr>
+              <a:t>&gt;</a:t>
+            </a:r>
+            <a:r>
+              <a:rPr lang="ru-RU" sz="2000" smtClean="0">
+                <a:latin typeface="Consolas" panose="020B0609020204030204" pitchFamily="49" charset="0"/>
+              </a:rPr>
+              <a:t/>
+            </a:r>
+            <a:br>
+              <a:rPr lang="ru-RU" sz="2000" smtClean="0">
+                <a:latin typeface="Consolas" panose="020B0609020204030204" pitchFamily="49" charset="0"/>
+              </a:rPr>
+            </a:br>
+            <a:r>
+              <a:rPr lang="en-US" sz="2000" smtClean="0">
+                <a:latin typeface="Consolas" panose="020B0609020204030204" pitchFamily="49" charset="0"/>
+              </a:rPr>
+              <a:t>struct </a:t>
+            </a:r>
+            <a:r>
+              <a:rPr lang="en-US" sz="2000">
+                <a:latin typeface="Consolas" panose="020B0609020204030204" pitchFamily="49" charset="0"/>
+              </a:rPr>
+              <a:t>is_one_of</a:t>
+            </a:r>
+            <a:r>
+              <a:rPr lang="en-US" sz="2000">
+                <a:solidFill>
+                  <a:srgbClr val="FFFF00"/>
+                </a:solidFill>
+                <a:latin typeface="Consolas" panose="020B0609020204030204" pitchFamily="49" charset="0"/>
+              </a:rPr>
+              <a:t>&lt;T, T, Tail...&gt;</a:t>
+            </a:r>
+            <a:r>
+              <a:rPr lang="en-US" sz="2000">
+                <a:latin typeface="Consolas" panose="020B0609020204030204" pitchFamily="49" charset="0"/>
+              </a:rPr>
+              <a:t> : true_type </a:t>
+            </a:r>
+            <a:r>
+              <a:rPr lang="en-US" sz="2000" smtClean="0">
+                <a:latin typeface="Consolas" panose="020B0609020204030204" pitchFamily="49" charset="0"/>
+              </a:rPr>
+              <a:t>{};</a:t>
+            </a:r>
+            <a:endParaRPr lang="ru-RU" sz="2000" smtClean="0">
+              <a:latin typeface="Consolas" panose="020B0609020204030204" pitchFamily="49" charset="0"/>
+            </a:endParaRPr>
+          </a:p>
+          <a:p>
+            <a:pPr marL="0" indent="0">
+              <a:buNone/>
+            </a:pPr>
+            <a:r>
+              <a:rPr lang="en-US" sz="2000">
+                <a:latin typeface="Consolas" panose="020B0609020204030204" pitchFamily="49" charset="0"/>
+              </a:rPr>
+              <a:t>template&lt;typename T, typename Head, typename... </a:t>
+            </a:r>
+            <a:r>
+              <a:rPr lang="en-US" sz="2000">
+                <a:latin typeface="Consolas" panose="020B0609020204030204" pitchFamily="49" charset="0"/>
+              </a:rPr>
+              <a:t>Tail</a:t>
+            </a:r>
+            <a:r>
+              <a:rPr lang="en-US" sz="2000" smtClean="0">
+                <a:latin typeface="Consolas" panose="020B0609020204030204" pitchFamily="49" charset="0"/>
+              </a:rPr>
+              <a:t>&gt;</a:t>
+            </a:r>
+            <a:r>
+              <a:rPr lang="ru-RU" sz="2000" smtClean="0">
+                <a:latin typeface="Consolas" panose="020B0609020204030204" pitchFamily="49" charset="0"/>
+              </a:rPr>
+              <a:t/>
+            </a:r>
+            <a:br>
+              <a:rPr lang="ru-RU" sz="2000" smtClean="0">
+                <a:latin typeface="Consolas" panose="020B0609020204030204" pitchFamily="49" charset="0"/>
+              </a:rPr>
+            </a:br>
+            <a:r>
+              <a:rPr lang="en-US" sz="2000" smtClean="0">
+                <a:latin typeface="Consolas" panose="020B0609020204030204" pitchFamily="49" charset="0"/>
+              </a:rPr>
+              <a:t>struct </a:t>
+            </a:r>
+            <a:r>
+              <a:rPr lang="en-US" sz="2000">
+                <a:latin typeface="Consolas" panose="020B0609020204030204" pitchFamily="49" charset="0"/>
+              </a:rPr>
+              <a:t>is_one_of</a:t>
+            </a:r>
+            <a:r>
+              <a:rPr lang="en-US" sz="2000">
+                <a:solidFill>
+                  <a:srgbClr val="FFFF00"/>
+                </a:solidFill>
+                <a:latin typeface="Consolas" panose="020B0609020204030204" pitchFamily="49" charset="0"/>
+              </a:rPr>
+              <a:t>&lt;T, Head, Tail...&gt;</a:t>
+            </a:r>
+            <a:r>
+              <a:rPr lang="en-US" sz="2000">
+                <a:latin typeface="Consolas" panose="020B0609020204030204" pitchFamily="49" charset="0"/>
+              </a:rPr>
+              <a:t> </a:t>
+            </a:r>
+            <a:r>
+              <a:rPr lang="en-US" sz="2000">
+                <a:latin typeface="Consolas" panose="020B0609020204030204" pitchFamily="49" charset="0"/>
+              </a:rPr>
+              <a:t>:        </a:t>
+            </a:r>
+            <a:r>
+              <a:rPr lang="ru-RU" sz="2000" smtClean="0">
+                <a:latin typeface="Consolas" panose="020B0609020204030204" pitchFamily="49" charset="0"/>
+              </a:rPr>
+              <a:t/>
+            </a:r>
+            <a:br>
+              <a:rPr lang="ru-RU" sz="2000" smtClean="0">
+                <a:latin typeface="Consolas" panose="020B0609020204030204" pitchFamily="49" charset="0"/>
+              </a:rPr>
+            </a:br>
+            <a:r>
+              <a:rPr lang="ru-RU" sz="2000" smtClean="0">
+                <a:latin typeface="Consolas" panose="020B0609020204030204" pitchFamily="49" charset="0"/>
+              </a:rPr>
+              <a:t>                     </a:t>
+            </a:r>
+            <a:r>
+              <a:rPr lang="en-US" sz="2000" smtClean="0">
+                <a:latin typeface="Consolas" panose="020B0609020204030204" pitchFamily="49" charset="0"/>
+              </a:rPr>
+              <a:t>is_one_of</a:t>
+            </a:r>
+            <a:r>
+              <a:rPr lang="en-US" sz="2000" smtClean="0">
+                <a:solidFill>
+                  <a:srgbClr val="FFFF00"/>
+                </a:solidFill>
+                <a:latin typeface="Consolas" panose="020B0609020204030204" pitchFamily="49" charset="0"/>
+              </a:rPr>
+              <a:t>&lt;Head</a:t>
+            </a:r>
+            <a:r>
+              <a:rPr lang="en-US" sz="2000">
+                <a:solidFill>
+                  <a:srgbClr val="FFFF00"/>
+                </a:solidFill>
+                <a:latin typeface="Consolas" panose="020B0609020204030204" pitchFamily="49" charset="0"/>
+              </a:rPr>
+              <a:t>, Tail...&gt;</a:t>
+            </a:r>
+            <a:r>
+              <a:rPr lang="en-US" sz="2000">
+                <a:latin typeface="Consolas" panose="020B0609020204030204" pitchFamily="49" charset="0"/>
+              </a:rPr>
+              <a:t> {};</a:t>
+            </a:r>
+            <a:endParaRPr lang="en-US" sz="2000">
+              <a:latin typeface="Consolas" panose="020B0609020204030204" pitchFamily="49" charset="0"/>
+            </a:endParaRPr>
+          </a:p>
+        </p:txBody>
+      </p:sp>
+    </p:spTree>
+    <p:extLst>
+      <p:ext uri="{BB962C8B-B14F-4D97-AF65-F5344CB8AC3E}">
+        <p14:creationId xmlns:p14="http://schemas.microsoft.com/office/powerpoint/2010/main" val="956000777"/>
+      </p:ext>
+    </p:extLst>
+  </p:cSld>
+  <p:clrMapOvr>
+    <a:masterClrMapping/>
+  </p:clrMapOvr>
+</p:sld>
+</file>
+
+<file path=ppt/slides/slide32.xml><?xml version="1.0" encoding="utf-8"?>
+<p:sld xmlns:a="http://schemas.openxmlformats.org/drawingml/2006/main" xmlns:r="http://schemas.openxmlformats.org/officeDocument/2006/relationships" xmlns:p="http://schemas.openxmlformats.org/presentationml/2006/main">
+  <p:cSld>
+    <p:spTree>
+      <p:nvGrpSpPr>
+        <p:cNvPr id="1" name=""/>
+        <p:cNvGrpSpPr/>
+        <p:nvPr/>
+      </p:nvGrpSpPr>
+      <p:grpSpPr>
+        <a:xfrm>
+          <a:off x="0" y="0"/>
+          <a:ext cx="0" cy="0"/>
+          <a:chOff x="0" y="0"/>
+          <a:chExt cx="0" cy="0"/>
+        </a:xfrm>
+      </p:grpSpPr>
+      <p:sp>
+        <p:nvSpPr>
+          <p:cNvPr id="2" name="Title 1"/>
+          <p:cNvSpPr>
+            <a:spLocks noGrp="1"/>
+          </p:cNvSpPr>
+          <p:nvPr>
+            <p:ph type="title"/>
+          </p:nvPr>
+        </p:nvSpPr>
+        <p:spPr/>
+        <p:txBody>
+          <a:bodyPr/>
+          <a:lstStyle/>
+          <a:p>
+            <a:r>
+              <a:rPr lang="ru-RU" smtClean="0"/>
+              <a:t>Задача на смекалку: </a:t>
+            </a:r>
+            <a:r>
+              <a:rPr lang="en-US" smtClean="0"/>
+              <a:t>ALL_TRUE</a:t>
+            </a:r>
+            <a:endParaRPr lang="en-US"/>
+          </a:p>
+        </p:txBody>
+      </p:sp>
+      <p:sp>
+        <p:nvSpPr>
+          <p:cNvPr id="3" name="Content Placeholder 2"/>
+          <p:cNvSpPr>
+            <a:spLocks noGrp="1"/>
+          </p:cNvSpPr>
+          <p:nvPr>
+            <p:ph idx="1"/>
+          </p:nvPr>
+        </p:nvSpPr>
+        <p:spPr/>
+        <p:txBody>
+          <a:bodyPr/>
+          <a:lstStyle/>
+          <a:p>
+            <a:pPr marL="0" indent="0">
+              <a:buNone/>
+            </a:pPr>
+            <a:r>
+              <a:rPr lang="en-US">
+                <a:latin typeface="Consolas" panose="020B0609020204030204" pitchFamily="49" charset="0"/>
+              </a:rPr>
+              <a:t>template &lt;typename ...</a:t>
+            </a:r>
+            <a:r>
+              <a:rPr lang="en-US">
+                <a:latin typeface="Consolas" panose="020B0609020204030204" pitchFamily="49" charset="0"/>
+              </a:rPr>
+              <a:t>Ts</a:t>
+            </a:r>
+            <a:r>
+              <a:rPr lang="en-US" smtClean="0">
+                <a:latin typeface="Consolas" panose="020B0609020204030204" pitchFamily="49" charset="0"/>
+              </a:rPr>
+              <a:t>&gt; struct all_true;</a:t>
+            </a:r>
+          </a:p>
+          <a:p>
+            <a:pPr marL="0" indent="0">
+              <a:buNone/>
+            </a:pPr>
+            <a:r>
+              <a:rPr lang="en-US" smtClean="0">
+                <a:latin typeface="Consolas" panose="020B0609020204030204" pitchFamily="49" charset="0"/>
+              </a:rPr>
+              <a:t>template </a:t>
+            </a:r>
+            <a:r>
+              <a:rPr lang="en-US">
+                <a:latin typeface="Consolas" panose="020B0609020204030204" pitchFamily="49" charset="0"/>
+              </a:rPr>
+              <a:t>&lt;typename H, typename ...</a:t>
+            </a:r>
+            <a:r>
+              <a:rPr lang="en-US">
+                <a:latin typeface="Consolas" panose="020B0609020204030204" pitchFamily="49" charset="0"/>
+              </a:rPr>
+              <a:t>Ts</a:t>
+            </a:r>
+            <a:r>
+              <a:rPr lang="en-US" smtClean="0">
+                <a:latin typeface="Consolas" panose="020B0609020204030204" pitchFamily="49" charset="0"/>
+              </a:rPr>
+              <a:t>&gt;</a:t>
+            </a:r>
+            <a:br>
+              <a:rPr lang="en-US" smtClean="0">
+                <a:latin typeface="Consolas" panose="020B0609020204030204" pitchFamily="49" charset="0"/>
+              </a:rPr>
+            </a:br>
+            <a:r>
+              <a:rPr lang="en-US" smtClean="0">
+                <a:latin typeface="Consolas" panose="020B0609020204030204" pitchFamily="49" charset="0"/>
+              </a:rPr>
+              <a:t>struct all_true&lt;H</a:t>
+            </a:r>
+            <a:r>
+              <a:rPr lang="en-US">
+                <a:latin typeface="Consolas" panose="020B0609020204030204" pitchFamily="49" charset="0"/>
+              </a:rPr>
+              <a:t>, Ts</a:t>
+            </a:r>
+            <a:r>
+              <a:rPr lang="en-US">
+                <a:latin typeface="Consolas" panose="020B0609020204030204" pitchFamily="49" charset="0"/>
+              </a:rPr>
+              <a:t>...&gt; </a:t>
+            </a:r>
+            <a:r>
+              <a:rPr lang="en-US" smtClean="0">
+                <a:latin typeface="Consolas" panose="020B0609020204030204" pitchFamily="49" charset="0"/>
+              </a:rPr>
+              <a:t>: </a:t>
+            </a:r>
+            <a:br>
+              <a:rPr lang="en-US" smtClean="0">
+                <a:latin typeface="Consolas" panose="020B0609020204030204" pitchFamily="49" charset="0"/>
+              </a:rPr>
+            </a:br>
+            <a:r>
+              <a:rPr lang="en-US" smtClean="0">
+                <a:latin typeface="Consolas" panose="020B0609020204030204" pitchFamily="49" charset="0"/>
+              </a:rPr>
+              <a:t>   and_&lt;is_same&lt;true_type</a:t>
+            </a:r>
+            <a:r>
+              <a:rPr lang="en-US">
+                <a:latin typeface="Consolas" panose="020B0609020204030204" pitchFamily="49" charset="0"/>
+              </a:rPr>
+              <a:t>, </a:t>
+            </a:r>
+            <a:r>
+              <a:rPr lang="en-US">
+                <a:latin typeface="Consolas" panose="020B0609020204030204" pitchFamily="49" charset="0"/>
+              </a:rPr>
+              <a:t>H</a:t>
+            </a:r>
+            <a:r>
+              <a:rPr lang="en-US" smtClean="0">
+                <a:latin typeface="Consolas" panose="020B0609020204030204" pitchFamily="49" charset="0"/>
+              </a:rPr>
+              <a:t>&gt;, </a:t>
+            </a:r>
+            <a:r>
+              <a:rPr lang="en-US">
+                <a:latin typeface="Consolas" panose="020B0609020204030204" pitchFamily="49" charset="0"/>
+              </a:rPr>
+              <a:t>all_true&lt;Ts</a:t>
+            </a:r>
+            <a:r>
+              <a:rPr lang="en-US">
+                <a:latin typeface="Consolas" panose="020B0609020204030204" pitchFamily="49" charset="0"/>
+              </a:rPr>
+              <a:t>...&gt;&gt; </a:t>
+            </a:r>
+            <a:r>
+              <a:rPr lang="en-US" smtClean="0">
+                <a:latin typeface="Consolas" panose="020B0609020204030204" pitchFamily="49" charset="0"/>
+              </a:rPr>
+              <a:t>{};</a:t>
+            </a:r>
+          </a:p>
+          <a:p>
+            <a:pPr marL="0" indent="0">
+              <a:buNone/>
+            </a:pPr>
+            <a:r>
+              <a:rPr lang="en-US" smtClean="0">
+                <a:latin typeface="Consolas" panose="020B0609020204030204" pitchFamily="49" charset="0"/>
+              </a:rPr>
+              <a:t>template &lt;&gt; struct </a:t>
+            </a:r>
+            <a:r>
+              <a:rPr lang="en-US">
+                <a:latin typeface="Consolas" panose="020B0609020204030204" pitchFamily="49" charset="0"/>
+              </a:rPr>
+              <a:t>all_true&lt;&gt; : </a:t>
+            </a:r>
+            <a:r>
+              <a:rPr lang="en-US">
+                <a:latin typeface="Consolas" panose="020B0609020204030204" pitchFamily="49" charset="0"/>
+              </a:rPr>
+              <a:t>true_type </a:t>
+            </a:r>
+            <a:r>
+              <a:rPr lang="en-US" smtClean="0">
+                <a:latin typeface="Consolas" panose="020B0609020204030204" pitchFamily="49" charset="0"/>
+              </a:rPr>
+              <a:t>{};</a:t>
+            </a:r>
+          </a:p>
+          <a:p>
+            <a:r>
+              <a:rPr lang="ru-RU" smtClean="0"/>
+              <a:t>Решение рабочее, но не слишком изящное. Можно ли сделать проще?</a:t>
+            </a:r>
+            <a:endParaRPr lang="en-US"/>
+          </a:p>
+        </p:txBody>
+      </p:sp>
+    </p:spTree>
+    <p:extLst>
+      <p:ext uri="{BB962C8B-B14F-4D97-AF65-F5344CB8AC3E}">
+        <p14:creationId xmlns:p14="http://schemas.microsoft.com/office/powerpoint/2010/main" val="4218960698"/>
+      </p:ext>
+    </p:extLst>
+  </p:cSld>
+  <p:clrMapOvr>
+    <a:masterClrMapping/>
+  </p:clrMapOvr>
+</p:sld>
+</file>
+
+<file path=ppt/slides/slide33.xml><?xml version="1.0" encoding="utf-8"?>
+<p:sld xmlns:a="http://schemas.openxmlformats.org/drawingml/2006/main" xmlns:r="http://schemas.openxmlformats.org/officeDocument/2006/relationships" xmlns:p="http://schemas.openxmlformats.org/presentationml/2006/main">
+  <p:cSld>
+    <p:spTree>
+      <p:nvGrpSpPr>
+        <p:cNvPr id="1" name=""/>
+        <p:cNvGrpSpPr/>
+        <p:nvPr/>
+      </p:nvGrpSpPr>
+      <p:grpSpPr>
+        <a:xfrm>
+          <a:off x="0" y="0"/>
+          <a:ext cx="0" cy="0"/>
+          <a:chOff x="0" y="0"/>
+          <a:chExt cx="0" cy="0"/>
+        </a:xfrm>
+      </p:grpSpPr>
+      <p:sp>
+        <p:nvSpPr>
+          <p:cNvPr id="2" name="Title 1"/>
+          <p:cNvSpPr>
+            <a:spLocks noGrp="1"/>
+          </p:cNvSpPr>
+          <p:nvPr>
+            <p:ph type="title"/>
+          </p:nvPr>
+        </p:nvSpPr>
+        <p:spPr/>
+        <p:txBody>
+          <a:bodyPr/>
+          <a:lstStyle/>
+          <a:p>
+            <a:r>
+              <a:rPr lang="ru-RU" smtClean="0"/>
+              <a:t>Решение</a:t>
+            </a:r>
+            <a:endParaRPr lang="en-US"/>
+          </a:p>
+        </p:txBody>
+      </p:sp>
+      <p:sp>
+        <p:nvSpPr>
+          <p:cNvPr id="3" name="Content Placeholder 2"/>
+          <p:cNvSpPr>
+            <a:spLocks noGrp="1"/>
+          </p:cNvSpPr>
+          <p:nvPr>
+            <p:ph idx="1"/>
+          </p:nvPr>
+        </p:nvSpPr>
+        <p:spPr/>
+        <p:txBody>
+          <a:bodyPr/>
+          <a:lstStyle/>
+          <a:p>
+            <a:pPr marL="0" indent="0">
+              <a:buNone/>
+            </a:pPr>
+            <a:r>
+              <a:rPr lang="en-US">
+                <a:latin typeface="Consolas" panose="020B0609020204030204" pitchFamily="49" charset="0"/>
+              </a:rPr>
+              <a:t>template &lt;typename H, typename ...</a:t>
+            </a:r>
+            <a:r>
+              <a:rPr lang="en-US">
+                <a:latin typeface="Consolas" panose="020B0609020204030204" pitchFamily="49" charset="0"/>
+              </a:rPr>
+              <a:t>Ts</a:t>
+            </a:r>
+            <a:r>
+              <a:rPr lang="en-US" smtClean="0">
+                <a:latin typeface="Consolas" panose="020B0609020204030204" pitchFamily="49" charset="0"/>
+              </a:rPr>
+              <a:t>&gt;</a:t>
+            </a:r>
+            <a:r>
+              <a:rPr lang="ru-RU" smtClean="0">
+                <a:latin typeface="Consolas" panose="020B0609020204030204" pitchFamily="49" charset="0"/>
+              </a:rPr>
+              <a:t/>
+            </a:r>
+            <a:br>
+              <a:rPr lang="ru-RU" smtClean="0">
+                <a:latin typeface="Consolas" panose="020B0609020204030204" pitchFamily="49" charset="0"/>
+              </a:rPr>
+            </a:br>
+            <a:r>
+              <a:rPr lang="en-US" smtClean="0">
+                <a:latin typeface="Consolas" panose="020B0609020204030204" pitchFamily="49" charset="0"/>
+              </a:rPr>
+              <a:t>struct </a:t>
+            </a:r>
+            <a:r>
+              <a:rPr lang="en-US">
+                <a:latin typeface="Consolas" panose="020B0609020204030204" pitchFamily="49" charset="0"/>
+              </a:rPr>
+              <a:t>all_true&lt;H, Ts...&gt; </a:t>
+            </a:r>
+            <a:r>
+              <a:rPr lang="en-US">
+                <a:latin typeface="Consolas" panose="020B0609020204030204" pitchFamily="49" charset="0"/>
+              </a:rPr>
+              <a:t>: </a:t>
+            </a:r>
+            <a:r>
+              <a:rPr lang="ru-RU" smtClean="0">
+                <a:latin typeface="Consolas" panose="020B0609020204030204" pitchFamily="49" charset="0"/>
+              </a:rPr>
+              <a:t/>
+            </a:r>
+            <a:br>
+              <a:rPr lang="ru-RU" smtClean="0">
+                <a:latin typeface="Consolas" panose="020B0609020204030204" pitchFamily="49" charset="0"/>
+              </a:rPr>
+            </a:br>
+            <a:r>
+              <a:rPr lang="ru-RU" smtClean="0">
+                <a:latin typeface="Consolas" panose="020B0609020204030204" pitchFamily="49" charset="0"/>
+              </a:rPr>
+              <a:t>  </a:t>
+            </a:r>
+            <a:r>
+              <a:rPr lang="en-US" smtClean="0">
+                <a:latin typeface="Consolas" panose="020B0609020204030204" pitchFamily="49" charset="0"/>
+              </a:rPr>
+              <a:t>and_&lt;is_same&lt;true_type</a:t>
+            </a:r>
+            <a:r>
+              <a:rPr lang="en-US">
+                <a:latin typeface="Consolas" panose="020B0609020204030204" pitchFamily="49" charset="0"/>
+              </a:rPr>
+              <a:t>, H</a:t>
+            </a:r>
+            <a:r>
+              <a:rPr lang="en-US">
+                <a:latin typeface="Consolas" panose="020B0609020204030204" pitchFamily="49" charset="0"/>
+              </a:rPr>
+              <a:t>&gt;, </a:t>
+            </a:r>
+            <a:r>
+              <a:rPr lang="en-US" smtClean="0">
+                <a:latin typeface="Consolas" panose="020B0609020204030204" pitchFamily="49" charset="0"/>
+              </a:rPr>
+              <a:t/>
+            </a:r>
+            <a:br>
+              <a:rPr lang="en-US" smtClean="0">
+                <a:latin typeface="Consolas" panose="020B0609020204030204" pitchFamily="49" charset="0"/>
+              </a:rPr>
+            </a:br>
+            <a:r>
+              <a:rPr lang="en-US" smtClean="0">
+                <a:latin typeface="Consolas" panose="020B0609020204030204" pitchFamily="49" charset="0"/>
+              </a:rPr>
+              <a:t>       </a:t>
+            </a:r>
+            <a:r>
+              <a:rPr lang="en-US" smtClean="0">
+                <a:solidFill>
+                  <a:srgbClr val="FFFF00"/>
+                </a:solidFill>
+                <a:latin typeface="Consolas" panose="020B0609020204030204" pitchFamily="49" charset="0"/>
+              </a:rPr>
+              <a:t>is_same&lt;tuple&lt;H,Ts</a:t>
+            </a:r>
+            <a:r>
+              <a:rPr lang="en-US">
+                <a:solidFill>
+                  <a:srgbClr val="FFFF00"/>
+                </a:solidFill>
+                <a:latin typeface="Consolas" panose="020B0609020204030204" pitchFamily="49" charset="0"/>
+              </a:rPr>
+              <a:t>...&gt;, </a:t>
+            </a:r>
+            <a:r>
+              <a:rPr lang="en-US" smtClean="0">
+                <a:solidFill>
+                  <a:srgbClr val="FFFF00"/>
+                </a:solidFill>
+                <a:latin typeface="Consolas" panose="020B0609020204030204" pitchFamily="49" charset="0"/>
+              </a:rPr>
+              <a:t>tuple&lt;Ts</a:t>
+            </a:r>
+            <a:r>
+              <a:rPr lang="en-US">
+                <a:solidFill>
+                  <a:srgbClr val="FFFF00"/>
+                </a:solidFill>
+                <a:latin typeface="Consolas" panose="020B0609020204030204" pitchFamily="49" charset="0"/>
+              </a:rPr>
+              <a:t>...,H</a:t>
+            </a:r>
+            <a:r>
+              <a:rPr lang="en-US">
+                <a:solidFill>
+                  <a:srgbClr val="FFFF00"/>
+                </a:solidFill>
+                <a:latin typeface="Consolas" panose="020B0609020204030204" pitchFamily="49" charset="0"/>
+              </a:rPr>
+              <a:t>&gt;&gt;</a:t>
+            </a:r>
+            <a:r>
+              <a:rPr lang="en-US">
+                <a:latin typeface="Consolas" panose="020B0609020204030204" pitchFamily="49" charset="0"/>
+              </a:rPr>
+              <a:t>&gt; </a:t>
+            </a:r>
+            <a:r>
+              <a:rPr lang="en-US" smtClean="0">
+                <a:latin typeface="Consolas" panose="020B0609020204030204" pitchFamily="49" charset="0"/>
+              </a:rPr>
+              <a:t>{};</a:t>
+            </a:r>
+          </a:p>
+          <a:p>
+            <a:pPr marL="0" indent="0">
+              <a:buNone/>
+            </a:pPr>
+            <a:endParaRPr lang="en-US" smtClean="0"/>
+          </a:p>
+          <a:p>
+            <a:pPr marL="0" indent="0">
+              <a:buNone/>
+            </a:pPr>
+            <a:r>
+              <a:rPr lang="ru-RU" smtClean="0"/>
+              <a:t>Идея решения: </a:t>
+            </a:r>
+            <a:r>
+              <a:rPr lang="en-US" smtClean="0">
+                <a:latin typeface="Consolas" panose="020B0609020204030204" pitchFamily="49" charset="0"/>
+              </a:rPr>
+              <a:t>&lt;H, T1, T2, T3&gt; == &lt;T1, T2, T3, H&gt;</a:t>
+            </a:r>
+            <a:endParaRPr lang="en-US">
+              <a:latin typeface="Consolas" panose="020B0609020204030204" pitchFamily="49" charset="0"/>
+            </a:endParaRPr>
+          </a:p>
+        </p:txBody>
+      </p:sp>
+    </p:spTree>
+    <p:extLst>
+      <p:ext uri="{BB962C8B-B14F-4D97-AF65-F5344CB8AC3E}">
+        <p14:creationId xmlns:p14="http://schemas.microsoft.com/office/powerpoint/2010/main" val="3186645051"/>
+      </p:ext>
+    </p:extLst>
+  </p:cSld>
+  <p:clrMapOvr>
+    <a:masterClrMapping/>
+  </p:clrMapOvr>
+</p:sld>
+</file>
+
+<file path=ppt/slides/slide34.xml><?xml version="1.0" encoding="utf-8"?>
+<p:sld xmlns:a="http://schemas.openxmlformats.org/drawingml/2006/main" xmlns:r="http://schemas.openxmlformats.org/officeDocument/2006/relationships" xmlns:p="http://schemas.openxmlformats.org/presentationml/2006/main">
+  <p:cSld>
+    <p:spTree>
+      <p:nvGrpSpPr>
+        <p:cNvPr id="1" name=""/>
+        <p:cNvGrpSpPr/>
+        <p:nvPr/>
+      </p:nvGrpSpPr>
+      <p:grpSpPr>
+        <a:xfrm>
+          <a:off x="0" y="0"/>
+          <a:ext cx="0" cy="0"/>
+          <a:chOff x="0" y="0"/>
+          <a:chExt cx="0" cy="0"/>
+        </a:xfrm>
+      </p:grpSpPr>
+      <p:sp>
+        <p:nvSpPr>
+          <p:cNvPr id="2" name="Title 1"/>
+          <p:cNvSpPr>
+            <a:spLocks noGrp="1"/>
+          </p:cNvSpPr>
+          <p:nvPr>
+            <p:ph type="title"/>
+          </p:nvPr>
+        </p:nvSpPr>
+        <p:spPr/>
+        <p:txBody>
+          <a:bodyPr/>
+          <a:lstStyle/>
+          <a:p>
+            <a:r>
+              <a:rPr lang="ru-RU" smtClean="0"/>
+              <a:t>обсуждение</a:t>
+            </a:r>
+            <a:endParaRPr lang="en-US"/>
+          </a:p>
+        </p:txBody>
+      </p:sp>
+      <p:sp>
+        <p:nvSpPr>
+          <p:cNvPr id="3" name="Content Placeholder 2"/>
+          <p:cNvSpPr>
+            <a:spLocks noGrp="1"/>
+          </p:cNvSpPr>
+          <p:nvPr>
+            <p:ph idx="1"/>
+          </p:nvPr>
+        </p:nvSpPr>
+        <p:spPr/>
+        <p:txBody>
+          <a:bodyPr/>
+          <a:lstStyle/>
+          <a:p>
+            <a:r>
+              <a:rPr lang="ru-RU" smtClean="0"/>
+              <a:t>В </a:t>
+            </a:r>
+            <a:r>
+              <a:rPr lang="en-US" smtClean="0"/>
+              <a:t>C++17 </a:t>
+            </a:r>
+            <a:r>
+              <a:rPr lang="ru-RU" smtClean="0"/>
+              <a:t>добавлены </a:t>
+            </a:r>
+            <a:r>
+              <a:rPr lang="en-US" smtClean="0">
+                <a:latin typeface="Consolas" panose="020B0609020204030204" pitchFamily="49" charset="0"/>
+              </a:rPr>
+              <a:t>conjunction&lt;Ts...&gt;</a:t>
+            </a:r>
+            <a:r>
+              <a:rPr lang="en-US" smtClean="0"/>
+              <a:t> </a:t>
+            </a:r>
+            <a:r>
+              <a:rPr lang="ru-RU" smtClean="0"/>
+              <a:t>и </a:t>
+            </a:r>
+            <a:r>
+              <a:rPr lang="en-US" smtClean="0">
+                <a:latin typeface="Consolas" panose="020B0609020204030204" pitchFamily="49" charset="0"/>
+              </a:rPr>
+              <a:t>disjunction&lt;Ts...&gt; </a:t>
+            </a:r>
+            <a:r>
+              <a:rPr lang="ru-RU" smtClean="0"/>
+              <a:t>действующие лениво.</a:t>
+            </a:r>
+            <a:endParaRPr lang="en-US"/>
+          </a:p>
+        </p:txBody>
+      </p:sp>
+    </p:spTree>
+    <p:extLst>
+      <p:ext uri="{BB962C8B-B14F-4D97-AF65-F5344CB8AC3E}">
+        <p14:creationId xmlns:p14="http://schemas.microsoft.com/office/powerpoint/2010/main" val="1899410686"/>
+      </p:ext>
+    </p:extLst>
+  </p:cSld>
+  <p:clrMapOvr>
+    <a:masterClrMapping/>
+  </p:clrMapOvr>
+</p:sld>
+</file>
+
+<file path=ppt/slides/slide35.xml><?xml version="1.0" encoding="utf-8"?>
+<p:sld xmlns:a="http://schemas.openxmlformats.org/drawingml/2006/main" xmlns:r="http://schemas.openxmlformats.org/officeDocument/2006/relationships" xmlns:p="http://schemas.openxmlformats.org/presentationml/2006/main">
+  <p:cSld>
+    <p:spTree>
+      <p:nvGrpSpPr>
+        <p:cNvPr id="1" name=""/>
+        <p:cNvGrpSpPr/>
+        <p:nvPr/>
+      </p:nvGrpSpPr>
+      <p:grpSpPr>
+        <a:xfrm>
+          <a:off x="0" y="0"/>
+          <a:ext cx="0" cy="0"/>
+          <a:chOff x="0" y="0"/>
+          <a:chExt cx="0" cy="0"/>
+        </a:xfrm>
+      </p:grpSpPr>
+      <p:sp>
+        <p:nvSpPr>
+          <p:cNvPr id="2" name="Title 1"/>
+          <p:cNvSpPr>
+            <a:spLocks noGrp="1"/>
+          </p:cNvSpPr>
+          <p:nvPr>
+            <p:ph type="title"/>
+          </p:nvPr>
+        </p:nvSpPr>
+        <p:spPr/>
+        <p:txBody>
+          <a:bodyPr/>
+          <a:lstStyle/>
+          <a:p>
+            <a:r>
+              <a:rPr lang="ru-RU" dirty="0" smtClean="0"/>
+              <a:t>литература</a:t>
+            </a:r>
+            <a:endParaRPr lang="en-US" dirty="0"/>
+          </a:p>
+        </p:txBody>
+      </p:sp>
+      <p:sp>
+        <p:nvSpPr>
+          <p:cNvPr id="6" name="Content Placeholder 5"/>
+          <p:cNvSpPr>
+            <a:spLocks noGrp="1"/>
+          </p:cNvSpPr>
+          <p:nvPr>
+            <p:ph idx="1"/>
+          </p:nvPr>
+        </p:nvSpPr>
+        <p:spPr>
+          <a:xfrm>
+            <a:off x="1141412" y="1956816"/>
+            <a:ext cx="9905999" cy="4663439"/>
+          </a:xfrm>
+        </p:spPr>
+        <p:txBody>
+          <a:bodyPr>
+            <a:normAutofit lnSpcReduction="10000"/>
+          </a:bodyPr>
+          <a:lstStyle/>
+          <a:p>
+            <a:pPr lvl="0"/>
+            <a:r>
+              <a:rPr lang="en-US" sz="2000" dirty="0"/>
+              <a:t>ISO/IEC, "Information technology -- Programming languages – C++", ISO/IEC 14882:2014, 2014</a:t>
+            </a:r>
+          </a:p>
+          <a:p>
+            <a:pPr lvl="0"/>
+            <a:r>
+              <a:rPr lang="en-US" sz="2000" dirty="0"/>
+              <a:t>The C++ Programming Language (4th Edition)</a:t>
+            </a:r>
+          </a:p>
+          <a:p>
+            <a:r>
+              <a:rPr lang="en-US" sz="2000" dirty="0" err="1"/>
+              <a:t>Davide</a:t>
+            </a:r>
+            <a:r>
+              <a:rPr lang="en-US" sz="2000" dirty="0"/>
+              <a:t> </a:t>
+            </a:r>
+            <a:r>
+              <a:rPr lang="en-US" sz="2000" dirty="0" err="1"/>
+              <a:t>Vandevoorde</a:t>
+            </a:r>
+            <a:r>
+              <a:rPr lang="en-US" sz="2000" dirty="0"/>
+              <a:t>, Nicolai M. </a:t>
+            </a:r>
+            <a:r>
+              <a:rPr lang="en-US" sz="2000" dirty="0" err="1"/>
+              <a:t>Josuttis</a:t>
+            </a:r>
+            <a:r>
+              <a:rPr lang="en-US" sz="2000" dirty="0"/>
+              <a:t>, </a:t>
+            </a:r>
+            <a:r>
+              <a:rPr lang="en-US" sz="2000" dirty="0" smtClean="0"/>
+              <a:t>C</a:t>
+            </a:r>
+            <a:r>
+              <a:rPr lang="en-US" sz="2000" dirty="0"/>
+              <a:t>++ Templates. The Complete </a:t>
+            </a:r>
+            <a:r>
+              <a:rPr lang="en-US" sz="2000" dirty="0" smtClean="0"/>
+              <a:t>Guid</a:t>
+            </a:r>
+            <a:r>
+              <a:rPr lang="en-US" sz="2000" dirty="0"/>
+              <a:t>e</a:t>
+            </a:r>
+            <a:r>
+              <a:rPr lang="en-US" sz="2000" dirty="0" smtClean="0"/>
+              <a:t>, </a:t>
+            </a:r>
+            <a:r>
+              <a:rPr lang="en-US" sz="2000" dirty="0"/>
+              <a:t>Pearson Education</a:t>
+            </a:r>
+            <a:r>
+              <a:rPr lang="en-US" sz="2000"/>
+              <a:t>, </a:t>
+            </a:r>
+            <a:r>
+              <a:rPr lang="en-US" sz="2000" smtClean="0"/>
+              <a:t>2003</a:t>
+            </a:r>
+            <a:endParaRPr lang="ru-RU" sz="2000" smtClean="0"/>
+          </a:p>
+          <a:p>
+            <a:r>
+              <a:rPr lang="en-US" sz="2000"/>
+              <a:t>Andrei Alexandrescu</a:t>
+            </a:r>
+            <a:r>
+              <a:rPr lang="en-US" sz="2000" smtClean="0"/>
+              <a:t>,</a:t>
+            </a:r>
+            <a:r>
+              <a:rPr lang="ru-RU" sz="2000" smtClean="0"/>
+              <a:t> </a:t>
+            </a:r>
+            <a:r>
+              <a:rPr lang="en-US" sz="2000"/>
+              <a:t>Modern C++ Design. Generic programming and design patterns </a:t>
+            </a:r>
+            <a:r>
+              <a:rPr lang="en-US" sz="2000" smtClean="0"/>
+              <a:t>applied, 2001</a:t>
+            </a:r>
+          </a:p>
+        </p:txBody>
+      </p:sp>
+    </p:spTree>
+    <p:extLst>
+      <p:ext uri="{BB962C8B-B14F-4D97-AF65-F5344CB8AC3E}">
+        <p14:creationId xmlns:p14="http://schemas.microsoft.com/office/powerpoint/2010/main" val="1455879159"/>
+      </p:ext>
+    </p:extLst>
+  </p:cSld>
+  <p:clrMapOvr>
+    <a:masterClrMapping/>
+  </p:clrMapOvr>
+</p:sld>
+</file>
+
 <file path=ppt/slides/slide4.xml><?xml version="1.0" encoding="utf-8"?>
 <p:sld xmlns:a="http://schemas.openxmlformats.org/drawingml/2006/main" xmlns:r="http://schemas.openxmlformats.org/officeDocument/2006/relationships" xmlns:p="http://schemas.openxmlformats.org/presentationml/2006/main">
   <p:cSld>
@@ -14565,13 +18215,7 @@
               <a:rPr lang="en-US" sz="2000" smtClean="0">
                 <a:latin typeface="Consolas" panose="020B0609020204030204" pitchFamily="49" charset="0"/>
               </a:rPr>
-              <a:t>fact_0 </a:t>
-            </a:r>
-            <a:r>
-              <a:rPr lang="en-US" sz="2000" smtClean="0">
-                <a:latin typeface="Consolas" panose="020B0609020204030204" pitchFamily="49" charset="0"/>
-              </a:rPr>
-              <a:t>(int </a:t>
+              <a:t>fact_0 (int </a:t>
             </a:r>
             <a:r>
               <a:rPr lang="en-US" sz="2000">
@@ -14670,19 +18314,7 @@
               <a:rPr lang="en-US" sz="2000">
                 <a:latin typeface="Consolas" panose="020B0609020204030204" pitchFamily="49" charset="0"/>
               </a:rPr>
-              <a:t>for </a:t>
-            </a:r>
-            <a:r>
-              <a:rPr lang="en-US" sz="2000">
-                <a:latin typeface="Consolas" panose="020B0609020204030204" pitchFamily="49" charset="0"/>
-              </a:rPr>
-              <a:t>(int i = 2; </a:t>
-            </a:r>
-            <a:r>
-              <a:rPr lang="en-US" sz="2000">
-                <a:latin typeface="Consolas" panose="020B0609020204030204" pitchFamily="49" charset="0"/>
-              </a:rPr>
-              <a:t>i &lt;= x; ++</a:t>
+              <a:t>for (int i = 2; i &lt;= x; ++</a:t>
             </a:r>
             <a:r>
               <a:rPr lang="en-US" sz="2000" smtClean="0">
@@ -14777,9 +18409,6 @@
               </a:rPr>
               <a:t>}</a:t>
             </a:r>
-            <a:endParaRPr lang="en-US" sz="2000" smtClean="0">
-              <a:latin typeface="Consolas" panose="020B0609020204030204" pitchFamily="49" charset="0"/>
-            </a:endParaRPr>
           </a:p>
         </p:txBody>
       </p:sp>
@@ -14829,24 +18458,18 @@
               <a:rPr lang="en-US" sz="2000" smtClean="0">
                 <a:latin typeface="Consolas" panose="020B0609020204030204" pitchFamily="49" charset="0"/>
               </a:rPr>
-              <a:t>fact_1 </a:t>
+              <a:t>fact_1 (int </a:t>
+            </a:r>
+            <a:r>
+              <a:rPr lang="en-US" sz="2000">
+                <a:latin typeface="Consolas" panose="020B0609020204030204" pitchFamily="49" charset="0"/>
+              </a:rPr>
+              <a:t>x</a:t>
             </a:r>
             <a:r>
               <a:rPr lang="en-US" sz="2000" smtClean="0">
                 <a:latin typeface="Consolas" panose="020B0609020204030204" pitchFamily="49" charset="0"/>
               </a:rPr>
-              <a:t>(int </a:t>
-            </a:r>
-            <a:r>
-              <a:rPr lang="en-US" sz="2000">
-                <a:latin typeface="Consolas" panose="020B0609020204030204" pitchFamily="49" charset="0"/>
-              </a:rPr>
-              <a:t>x</a:t>
-            </a:r>
-            <a:r>
-              <a:rPr lang="en-US" sz="2000" smtClean="0">
-                <a:latin typeface="Consolas" panose="020B0609020204030204" pitchFamily="49" charset="0"/>
-              </a:rPr>
               <a:t>)</a:t>
             </a:r>
             <a:r>
@@ -14854,12 +18477,6 @@
                 <a:latin typeface="Consolas" panose="020B0609020204030204" pitchFamily="49" charset="0"/>
               </a:rPr>
               <a:t> </a:t>
-            </a:r>
-            <a:r>
-              <a:rPr lang="ru-RU" sz="2000" smtClean="0">
-                <a:latin typeface="Consolas" panose="020B0609020204030204" pitchFamily="49" charset="0"/>
-              </a:rPr>
-              <a:t/>
             </a:r>
             <a:br>
               <a:rPr lang="ru-RU" sz="2000" smtClean="0">
@@ -15292,13 +18909,7 @@
               <a:rPr lang="en-US">
                 <a:latin typeface="Consolas" panose="020B0609020204030204" pitchFamily="49" charset="0"/>
               </a:rPr>
-              <a:t>template &lt;int </a:t>
-            </a:r>
-            <a:r>
-              <a:rPr lang="en-US">
-                <a:latin typeface="Consolas" panose="020B0609020204030204" pitchFamily="49" charset="0"/>
-              </a:rPr>
-              <a:t>n</a:t>
+              <a:t>template &lt;int n</a:t>
             </a:r>
             <a:r>
               <a:rPr lang="en-US" smtClean="0">
@@ -15339,13 +18950,7 @@
               <a:rPr lang="en-US">
                 <a:latin typeface="Consolas" panose="020B0609020204030204" pitchFamily="49" charset="0"/>
               </a:rPr>
-              <a:t>enum { value = n * factorial&lt;n - 1&gt;::</a:t>
-            </a:r>
-            <a:r>
-              <a:rPr lang="en-US">
-                <a:latin typeface="Consolas" panose="020B0609020204030204" pitchFamily="49" charset="0"/>
-              </a:rPr>
-              <a:t>value </a:t>
+              <a:t>enum { value = n * factorial&lt;n - 1&gt;::value </a:t>
             </a:r>
             <a:r>
               <a:rPr lang="en-US" smtClean="0">
@@ -15388,13 +18993,7 @@
               <a:rPr lang="en-US">
                 <a:latin typeface="Consolas" panose="020B0609020204030204" pitchFamily="49" charset="0"/>
               </a:rPr>
-              <a:t>factorial&lt;0</a:t>
-            </a:r>
-            <a:r>
-              <a:rPr lang="en-US">
-                <a:latin typeface="Consolas" panose="020B0609020204030204" pitchFamily="49" charset="0"/>
-              </a:rPr>
-              <a:t>&gt; </a:t>
+              <a:t>factorial&lt;0&gt; </a:t>
             </a:r>
             <a:r>
               <a:rPr lang="en-US" smtClean="0">
@@ -15423,13 +19022,7 @@
               <a:rPr lang="en-US">
                 <a:latin typeface="Consolas" panose="020B0609020204030204" pitchFamily="49" charset="0"/>
               </a:rPr>
-              <a:t>enum { value = </a:t>
-            </a:r>
-            <a:r>
-              <a:rPr lang="en-US">
-                <a:latin typeface="Consolas" panose="020B0609020204030204" pitchFamily="49" charset="0"/>
-              </a:rPr>
-              <a:t>1 </a:t>
+              <a:t>enum { value = 1 </a:t>
             </a:r>
             <a:r>
               <a:rPr lang="en-US" smtClean="0">
@@ -16400,13 +19993,7 @@
               <a:rPr lang="en-US" sz="2000">
                 <a:latin typeface="Consolas" panose="020B0609020204030204" pitchFamily="49" charset="0"/>
               </a:rPr>
-              <a:t>template &lt;int n, int idx, int </a:t>
-            </a:r>
-            <a:r>
-              <a:rPr lang="en-US" sz="2000">
-                <a:latin typeface="Consolas" panose="020B0609020204030204" pitchFamily="49" charset="0"/>
-              </a:rPr>
-              <a:t>product</a:t>
+              <a:t>template &lt;int n, int idx, int product</a:t>
             </a:r>
             <a:r>
               <a:rPr lang="en-US" sz="2000" smtClean="0">
@@ -16471,13 +20058,7 @@
               <a:rPr lang="en-US" sz="2000">
                 <a:latin typeface="Consolas" panose="020B0609020204030204" pitchFamily="49" charset="0"/>
               </a:rPr>
-              <a:t>value = fact_rec &lt;n, idx + 1, product * idx&gt;::</a:t>
-            </a:r>
-            <a:r>
-              <a:rPr lang="en-US" sz="2000">
-                <a:latin typeface="Consolas" panose="020B0609020204030204" pitchFamily="49" charset="0"/>
-              </a:rPr>
-              <a:t>value </a:t>
+              <a:t>value = fact_rec &lt;n, idx + 1, product * idx&gt;::value </a:t>
             </a:r>
             <a:r>
               <a:rPr lang="en-US" sz="2000" smtClean="0">
@@ -16520,43 +20101,31 @@
               <a:rPr lang="en-US" sz="2000">
                 <a:latin typeface="Consolas" panose="020B0609020204030204" pitchFamily="49" charset="0"/>
               </a:rPr>
-              <a:t>&lt;int n, int </a:t>
+              <a:t>&lt;int n, int product</a:t>
+            </a:r>
+            <a:r>
+              <a:rPr lang="en-US" sz="2000" smtClean="0">
+                <a:latin typeface="Consolas" panose="020B0609020204030204" pitchFamily="49" charset="0"/>
+              </a:rPr>
+              <a:t>&gt;</a:t>
+            </a:r>
+            <a:r>
+              <a:rPr lang="ru-RU" sz="2000" smtClean="0">
+                <a:latin typeface="Consolas" panose="020B0609020204030204" pitchFamily="49" charset="0"/>
+              </a:rPr>
+              <a:t> </a:t>
+            </a:r>
+            <a:r>
+              <a:rPr lang="en-US" sz="2000" smtClean="0">
+                <a:latin typeface="Consolas" panose="020B0609020204030204" pitchFamily="49" charset="0"/>
+              </a:rPr>
+              <a:t>struct </a:t>
             </a:r>
             <a:r>
               <a:rPr lang="en-US" sz="2000">
                 <a:latin typeface="Consolas" panose="020B0609020204030204" pitchFamily="49" charset="0"/>
               </a:rPr>
-              <a:t>product</a:t>
-            </a:r>
-            <a:r>
-              <a:rPr lang="en-US" sz="2000" smtClean="0">
-                <a:latin typeface="Consolas" panose="020B0609020204030204" pitchFamily="49" charset="0"/>
-              </a:rPr>
-              <a:t>&gt;</a:t>
-            </a:r>
-            <a:r>
-              <a:rPr lang="ru-RU" sz="2000" smtClean="0">
-                <a:latin typeface="Consolas" panose="020B0609020204030204" pitchFamily="49" charset="0"/>
-              </a:rPr>
-              <a:t> </a:t>
-            </a:r>
-            <a:r>
-              <a:rPr lang="en-US" sz="2000" smtClean="0">
-                <a:latin typeface="Consolas" panose="020B0609020204030204" pitchFamily="49" charset="0"/>
-              </a:rPr>
-              <a:t>struct </a:t>
-            </a:r>
-            <a:r>
-              <a:rPr lang="en-US" sz="2000">
-                <a:latin typeface="Consolas" panose="020B0609020204030204" pitchFamily="49" charset="0"/>
-              </a:rPr>
-              <a:t>fact_rec &lt;n, n, </a:t>
-            </a:r>
-            <a:r>
-              <a:rPr lang="en-US" sz="2000">
-                <a:latin typeface="Consolas" panose="020B0609020204030204" pitchFamily="49" charset="0"/>
-              </a:rPr>
-              <a:t>product</a:t>
+              <a:t>fact_rec &lt;n, n, product</a:t>
             </a:r>
             <a:r>
               <a:rPr lang="en-US" sz="2000" smtClean="0">
@@ -16603,13 +20172,7 @@
               <a:rPr lang="en-US" sz="2000">
                 <a:latin typeface="Consolas" panose="020B0609020204030204" pitchFamily="49" charset="0"/>
               </a:rPr>
-              <a:t>{ value = product * </a:t>
-            </a:r>
-            <a:r>
-              <a:rPr lang="en-US" sz="2000">
-                <a:latin typeface="Consolas" panose="020B0609020204030204" pitchFamily="49" charset="0"/>
-              </a:rPr>
-              <a:t>n </a:t>
+              <a:t>{ value = product * n </a:t>
             </a:r>
             <a:r>
               <a:rPr lang="en-US" sz="2000" smtClean="0">
@@ -16652,13 +20215,7 @@
               <a:rPr lang="en-US" sz="2000">
                 <a:latin typeface="Consolas" panose="020B0609020204030204" pitchFamily="49" charset="0"/>
               </a:rPr>
-              <a:t>&lt;int </a:t>
-            </a:r>
-            <a:r>
-              <a:rPr lang="en-US" sz="2000">
-                <a:latin typeface="Consolas" panose="020B0609020204030204" pitchFamily="49" charset="0"/>
-              </a:rPr>
-              <a:t>n</a:t>
+              <a:t>&lt;int n</a:t>
             </a:r>
             <a:r>
               <a:rPr lang="en-US" sz="2000" smtClean="0">
@@ -16711,13 +20268,7 @@
               <a:rPr lang="en-US" sz="2000">
                 <a:latin typeface="Consolas" panose="020B0609020204030204" pitchFamily="49" charset="0"/>
               </a:rPr>
-              <a:t>enum { value = fact_rec &lt;n, 1, 1&gt; :: </a:t>
-            </a:r>
-            <a:r>
-              <a:rPr lang="en-US" sz="2000">
-                <a:latin typeface="Consolas" panose="020B0609020204030204" pitchFamily="49" charset="0"/>
-              </a:rPr>
-              <a:t>value </a:t>
+              <a:t>enum { value = fact_rec &lt;n, 1, 1&gt; :: value </a:t>
             </a:r>
             <a:r>
               <a:rPr lang="en-US" sz="2000" smtClean="0">

</xml_diff>